<commit_message>
adicionando imagem do rompimento das barreiras de seguranca
</commit_message>
<xml_diff>
--- a/Figures/CSB.pptx
+++ b/Figures/CSB.pptx
@@ -2986,13 +2986,13 @@
           <p:nvPr>
             <p:extLst>
               <p:ext uri="{D42A27DB-BD31-4B8C-83A1-F6EECF244321}">
-                <p14:modId xmlns:p14="http://schemas.microsoft.com/office/powerpoint/2010/main" val="1465376800"/>
+                <p14:modId xmlns:p14="http://schemas.microsoft.com/office/powerpoint/2010/main" val="3382853903"/>
               </p:ext>
             </p:extLst>
           </p:nvPr>
         </p:nvGraphicFramePr>
         <p:xfrm>
-          <a:off x="2958670" y="2540435"/>
+          <a:off x="266986" y="2540435"/>
           <a:ext cx="5418666" cy="3286098"/>
         </p:xfrm>
         <a:graphic>
@@ -3405,7 +3405,7 @@
         </p:nvSpPr>
         <p:spPr>
           <a:xfrm>
-            <a:off x="2958670" y="1031467"/>
+            <a:off x="266986" y="1031467"/>
             <a:ext cx="391885" cy="290285"/>
           </a:xfrm>
           <a:prstGeom prst="rect">
@@ -3462,7 +3462,7 @@
         </p:nvSpPr>
         <p:spPr>
           <a:xfrm>
-            <a:off x="3553756" y="1002436"/>
+            <a:off x="862072" y="1002436"/>
             <a:ext cx="1751877" cy="369332"/>
           </a:xfrm>
           <a:prstGeom prst="rect">
@@ -3504,7 +3504,7 @@
         </p:nvSpPr>
         <p:spPr>
           <a:xfrm>
-            <a:off x="2958670" y="1532210"/>
+            <a:off x="266986" y="1532210"/>
             <a:ext cx="391885" cy="290285"/>
           </a:xfrm>
           <a:prstGeom prst="rect">
@@ -3561,7 +3561,7 @@
         </p:nvSpPr>
         <p:spPr>
           <a:xfrm>
-            <a:off x="3553755" y="1500252"/>
+            <a:off x="862071" y="1500252"/>
             <a:ext cx="1919031" cy="369332"/>
           </a:xfrm>
           <a:prstGeom prst="rect">
@@ -3611,7 +3611,7 @@
         </p:blipFill>
         <p:spPr>
           <a:xfrm>
-            <a:off x="337450" y="0"/>
+            <a:off x="-2354234" y="0"/>
             <a:ext cx="2041071" cy="6858000"/>
           </a:xfrm>
           <a:prstGeom prst="rect">
@@ -3619,6 +3619,338 @@
           </a:prstGeom>
         </p:spPr>
       </p:pic>
+      <p:pic>
+        <p:nvPicPr>
+          <p:cNvPr id="3" name="Imagem 2">
+            <a:extLst>
+              <a:ext uri="{FF2B5EF4-FFF2-40B4-BE49-F238E27FC236}">
+                <a16:creationId xmlns:a16="http://schemas.microsoft.com/office/drawing/2014/main" id="{96A157AB-B51D-4551-8CF5-BCB194EF1DF5}"/>
+              </a:ext>
+            </a:extLst>
+          </p:cNvPr>
+          <p:cNvPicPr>
+            <a:picLocks noChangeAspect="1"/>
+          </p:cNvPicPr>
+          <p:nvPr/>
+        </p:nvPicPr>
+        <p:blipFill rotWithShape="1">
+          <a:blip r:embed="rId3">
+            <a:clrChange>
+              <a:clrFrom>
+                <a:srgbClr val="FFFFFF"/>
+              </a:clrFrom>
+              <a:clrTo>
+                <a:srgbClr val="FFFFFF">
+                  <a:alpha val="0"/>
+                </a:srgbClr>
+              </a:clrTo>
+            </a:clrChange>
+            <a:extLst>
+              <a:ext uri="{28A0092B-C50C-407E-A947-70E740481C1C}">
+                <a14:useLocalDpi xmlns:a14="http://schemas.microsoft.com/office/drawing/2010/main" val="0"/>
+              </a:ext>
+            </a:extLst>
+          </a:blip>
+          <a:srcRect b="4531"/>
+          <a:stretch/>
+        </p:blipFill>
+        <p:spPr>
+          <a:xfrm>
+            <a:off x="5685652" y="179041"/>
+            <a:ext cx="4977951" cy="6376305"/>
+          </a:xfrm>
+          <a:prstGeom prst="rect">
+            <a:avLst/>
+          </a:prstGeom>
+        </p:spPr>
+      </p:pic>
+      <p:sp>
+        <p:nvSpPr>
+          <p:cNvPr id="4" name="Retângulo 3">
+            <a:extLst>
+              <a:ext uri="{FF2B5EF4-FFF2-40B4-BE49-F238E27FC236}">
+                <a16:creationId xmlns:a16="http://schemas.microsoft.com/office/drawing/2014/main" id="{5B68E858-2F29-441F-8068-6A2106A5F8A9}"/>
+              </a:ext>
+            </a:extLst>
+          </p:cNvPr>
+          <p:cNvSpPr/>
+          <p:nvPr/>
+        </p:nvSpPr>
+        <p:spPr>
+          <a:xfrm>
+            <a:off x="8840789" y="4793084"/>
+            <a:ext cx="1552892" cy="369332"/>
+          </a:xfrm>
+          <a:prstGeom prst="rect">
+            <a:avLst/>
+          </a:prstGeom>
+          <a:solidFill>
+            <a:schemeClr val="bg1"/>
+          </a:solidFill>
+        </p:spPr>
+        <p:txBody>
+          <a:bodyPr wrap="square">
+            <a:spAutoFit/>
+          </a:bodyPr>
+          <a:lstStyle/>
+          <a:p>
+            <a:pPr algn="ctr"/>
+            <a:r>
+              <a:rPr lang="pt-BR" dirty="0">
+                <a:latin typeface="Times New Roman" panose="02020603050405020304" pitchFamily="18" charset="0"/>
+                <a:cs typeface="Times New Roman" panose="02020603050405020304" pitchFamily="18" charset="0"/>
+              </a:rPr>
+              <a:t>Comunicação</a:t>
+            </a:r>
+            <a:endParaRPr lang="en-US" dirty="0">
+              <a:latin typeface="Times New Roman" panose="02020603050405020304" pitchFamily="18" charset="0"/>
+              <a:cs typeface="Times New Roman" panose="02020603050405020304" pitchFamily="18" charset="0"/>
+            </a:endParaRPr>
+          </a:p>
+        </p:txBody>
+      </p:sp>
+      <p:sp>
+        <p:nvSpPr>
+          <p:cNvPr id="13" name="Retângulo 12">
+            <a:extLst>
+              <a:ext uri="{FF2B5EF4-FFF2-40B4-BE49-F238E27FC236}">
+                <a16:creationId xmlns:a16="http://schemas.microsoft.com/office/drawing/2014/main" id="{3BE67F76-4C53-4FA6-B106-865E67479FA4}"/>
+              </a:ext>
+            </a:extLst>
+          </p:cNvPr>
+          <p:cNvSpPr/>
+          <p:nvPr/>
+        </p:nvSpPr>
+        <p:spPr>
+          <a:xfrm>
+            <a:off x="5573168" y="2936901"/>
+            <a:ext cx="2183992" cy="369332"/>
+          </a:xfrm>
+          <a:prstGeom prst="rect">
+            <a:avLst/>
+          </a:prstGeom>
+          <a:solidFill>
+            <a:schemeClr val="bg1"/>
+          </a:solidFill>
+        </p:spPr>
+        <p:txBody>
+          <a:bodyPr wrap="square">
+            <a:spAutoFit/>
+          </a:bodyPr>
+          <a:lstStyle/>
+          <a:p>
+            <a:pPr algn="ctr"/>
+            <a:r>
+              <a:rPr lang="pt-BR" dirty="0">
+                <a:latin typeface="Times New Roman" panose="02020603050405020304" pitchFamily="18" charset="0"/>
+                <a:cs typeface="Times New Roman" panose="02020603050405020304" pitchFamily="18" charset="0"/>
+              </a:rPr>
+              <a:t>Válvula de segurança</a:t>
+            </a:r>
+            <a:endParaRPr lang="en-US" dirty="0">
+              <a:latin typeface="Times New Roman" panose="02020603050405020304" pitchFamily="18" charset="0"/>
+              <a:cs typeface="Times New Roman" panose="02020603050405020304" pitchFamily="18" charset="0"/>
+            </a:endParaRPr>
+          </a:p>
+        </p:txBody>
+      </p:sp>
+      <p:sp>
+        <p:nvSpPr>
+          <p:cNvPr id="14" name="Retângulo 13">
+            <a:extLst>
+              <a:ext uri="{FF2B5EF4-FFF2-40B4-BE49-F238E27FC236}">
+                <a16:creationId xmlns:a16="http://schemas.microsoft.com/office/drawing/2014/main" id="{D58BAEA0-28EC-4C94-97E1-125F36868D1E}"/>
+              </a:ext>
+            </a:extLst>
+          </p:cNvPr>
+          <p:cNvSpPr/>
+          <p:nvPr/>
+        </p:nvSpPr>
+        <p:spPr>
+          <a:xfrm>
+            <a:off x="5916087" y="4007459"/>
+            <a:ext cx="1841073" cy="923330"/>
+          </a:xfrm>
+          <a:prstGeom prst="rect">
+            <a:avLst/>
+          </a:prstGeom>
+          <a:solidFill>
+            <a:schemeClr val="bg1"/>
+          </a:solidFill>
+        </p:spPr>
+        <p:txBody>
+          <a:bodyPr wrap="square">
+            <a:spAutoFit/>
+          </a:bodyPr>
+          <a:lstStyle/>
+          <a:p>
+            <a:pPr algn="ctr"/>
+            <a:r>
+              <a:rPr lang="pt-BR" dirty="0">
+                <a:latin typeface="Times New Roman" panose="02020603050405020304" pitchFamily="18" charset="0"/>
+                <a:cs typeface="Times New Roman" panose="02020603050405020304" pitchFamily="18" charset="0"/>
+              </a:rPr>
+              <a:t>Furo no tubo de produção para intervenção </a:t>
+            </a:r>
+            <a:endParaRPr lang="en-US" dirty="0">
+              <a:latin typeface="Times New Roman" panose="02020603050405020304" pitchFamily="18" charset="0"/>
+              <a:cs typeface="Times New Roman" panose="02020603050405020304" pitchFamily="18" charset="0"/>
+            </a:endParaRPr>
+          </a:p>
+        </p:txBody>
+      </p:sp>
+      <p:sp>
+        <p:nvSpPr>
+          <p:cNvPr id="15" name="Retângulo 14">
+            <a:extLst>
+              <a:ext uri="{FF2B5EF4-FFF2-40B4-BE49-F238E27FC236}">
+                <a16:creationId xmlns:a16="http://schemas.microsoft.com/office/drawing/2014/main" id="{15163D38-DB81-4AA0-B725-44BDF69FE3E1}"/>
+              </a:ext>
+            </a:extLst>
+          </p:cNvPr>
+          <p:cNvSpPr/>
+          <p:nvPr/>
+        </p:nvSpPr>
+        <p:spPr>
+          <a:xfrm>
+            <a:off x="6933904" y="2302429"/>
+            <a:ext cx="689112" cy="369332"/>
+          </a:xfrm>
+          <a:prstGeom prst="rect">
+            <a:avLst/>
+          </a:prstGeom>
+          <a:solidFill>
+            <a:schemeClr val="bg1"/>
+          </a:solidFill>
+        </p:spPr>
+        <p:txBody>
+          <a:bodyPr wrap="square">
+            <a:spAutoFit/>
+          </a:bodyPr>
+          <a:lstStyle/>
+          <a:p>
+            <a:pPr algn="ctr"/>
+            <a:endParaRPr lang="en-US" dirty="0">
+              <a:latin typeface="Times New Roman" panose="02020603050405020304" pitchFamily="18" charset="0"/>
+              <a:cs typeface="Times New Roman" panose="02020603050405020304" pitchFamily="18" charset="0"/>
+            </a:endParaRPr>
+          </a:p>
+        </p:txBody>
+      </p:sp>
+      <p:sp>
+        <p:nvSpPr>
+          <p:cNvPr id="16" name="Retângulo 15">
+            <a:extLst>
+              <a:ext uri="{FF2B5EF4-FFF2-40B4-BE49-F238E27FC236}">
+                <a16:creationId xmlns:a16="http://schemas.microsoft.com/office/drawing/2014/main" id="{1A209679-FA37-4D0E-96C2-F3480E66C559}"/>
+              </a:ext>
+            </a:extLst>
+          </p:cNvPr>
+          <p:cNvSpPr/>
+          <p:nvPr/>
+        </p:nvSpPr>
+        <p:spPr>
+          <a:xfrm>
+            <a:off x="7068048" y="2641003"/>
+            <a:ext cx="689112" cy="369332"/>
+          </a:xfrm>
+          <a:prstGeom prst="rect">
+            <a:avLst/>
+          </a:prstGeom>
+          <a:solidFill>
+            <a:schemeClr val="bg1"/>
+          </a:solidFill>
+        </p:spPr>
+        <p:txBody>
+          <a:bodyPr wrap="square">
+            <a:spAutoFit/>
+          </a:bodyPr>
+          <a:lstStyle/>
+          <a:p>
+            <a:pPr algn="ctr"/>
+            <a:endParaRPr lang="en-US" dirty="0">
+              <a:latin typeface="Times New Roman" panose="02020603050405020304" pitchFamily="18" charset="0"/>
+              <a:cs typeface="Times New Roman" panose="02020603050405020304" pitchFamily="18" charset="0"/>
+            </a:endParaRPr>
+          </a:p>
+        </p:txBody>
+      </p:sp>
+      <p:sp>
+        <p:nvSpPr>
+          <p:cNvPr id="17" name="Retângulo 16">
+            <a:extLst>
+              <a:ext uri="{FF2B5EF4-FFF2-40B4-BE49-F238E27FC236}">
+                <a16:creationId xmlns:a16="http://schemas.microsoft.com/office/drawing/2014/main" id="{663E70CF-6807-4370-939A-D424B9C96B1C}"/>
+              </a:ext>
+            </a:extLst>
+          </p:cNvPr>
+          <p:cNvSpPr/>
+          <p:nvPr/>
+        </p:nvSpPr>
+        <p:spPr>
+          <a:xfrm>
+            <a:off x="7140959" y="3406801"/>
+            <a:ext cx="689112" cy="369332"/>
+          </a:xfrm>
+          <a:prstGeom prst="rect">
+            <a:avLst/>
+          </a:prstGeom>
+          <a:solidFill>
+            <a:schemeClr val="bg1"/>
+          </a:solidFill>
+        </p:spPr>
+        <p:txBody>
+          <a:bodyPr wrap="square">
+            <a:spAutoFit/>
+          </a:bodyPr>
+          <a:lstStyle/>
+          <a:p>
+            <a:pPr algn="ctr"/>
+            <a:endParaRPr lang="en-US" dirty="0">
+              <a:latin typeface="Times New Roman" panose="02020603050405020304" pitchFamily="18" charset="0"/>
+              <a:cs typeface="Times New Roman" panose="02020603050405020304" pitchFamily="18" charset="0"/>
+            </a:endParaRPr>
+          </a:p>
+        </p:txBody>
+      </p:sp>
+      <p:sp>
+        <p:nvSpPr>
+          <p:cNvPr id="18" name="Retângulo 17">
+            <a:extLst>
+              <a:ext uri="{FF2B5EF4-FFF2-40B4-BE49-F238E27FC236}">
+                <a16:creationId xmlns:a16="http://schemas.microsoft.com/office/drawing/2014/main" id="{E599F848-6BE6-40B0-9532-E9DF4094F568}"/>
+              </a:ext>
+            </a:extLst>
+          </p:cNvPr>
+          <p:cNvSpPr/>
+          <p:nvPr/>
+        </p:nvSpPr>
+        <p:spPr>
+          <a:xfrm>
+            <a:off x="6615826" y="5045670"/>
+            <a:ext cx="1377554" cy="369332"/>
+          </a:xfrm>
+          <a:prstGeom prst="rect">
+            <a:avLst/>
+          </a:prstGeom>
+          <a:solidFill>
+            <a:schemeClr val="bg1"/>
+          </a:solidFill>
+        </p:spPr>
+        <p:txBody>
+          <a:bodyPr wrap="square">
+            <a:spAutoFit/>
+          </a:bodyPr>
+          <a:lstStyle/>
+          <a:p>
+            <a:pPr algn="ctr"/>
+            <a:endParaRPr lang="en-US" dirty="0">
+              <a:latin typeface="Times New Roman" panose="02020603050405020304" pitchFamily="18" charset="0"/>
+              <a:cs typeface="Times New Roman" panose="02020603050405020304" pitchFamily="18" charset="0"/>
+            </a:endParaRPr>
+          </a:p>
+        </p:txBody>
+      </p:sp>
     </p:spTree>
     <p:extLst>
       <p:ext uri="{BB962C8B-B14F-4D97-AF65-F5344CB8AC3E}">
@@ -3894,21 +4226,6 @@
 </file>
 
 <file path=customXml/item1.xml><?xml version="1.0" encoding="utf-8"?>
-<p:properties xmlns:p="http://schemas.microsoft.com/office/2006/metadata/properties" xmlns:xsi="http://www.w3.org/2001/XMLSchema-instance" xmlns:pc="http://schemas.microsoft.com/office/infopath/2007/PartnerControls">
-  <documentManagement/>
-</p:properties>
-</file>
-
-<file path=customXml/item2.xml><?xml version="1.0" encoding="utf-8"?>
-<?mso-contentType ?>
-<FormTemplates xmlns="http://schemas.microsoft.com/sharepoint/v3/contenttype/forms">
-  <Display>DocumentLibraryForm</Display>
-  <Edit>DocumentLibraryForm</Edit>
-  <New>DocumentLibraryForm</New>
-</FormTemplates>
-</file>
-
-<file path=customXml/item3.xml><?xml version="1.0" encoding="utf-8"?>
 <ct:contentTypeSchema xmlns:ct="http://schemas.microsoft.com/office/2006/metadata/contentType" xmlns:ma="http://schemas.microsoft.com/office/2006/metadata/properties/metaAttributes" ct:_="" ma:_="" ma:contentTypeName="Documento" ma:contentTypeID="0x010100081710BB376E7941914DCE66FEA91E1F" ma:contentTypeVersion="10" ma:contentTypeDescription="Crie um novo documento." ma:contentTypeScope="" ma:versionID="58913e177e8a955f1d199717620b7ded">
   <xsd:schema xmlns:xsd="http://www.w3.org/2001/XMLSchema" xmlns:xs="http://www.w3.org/2001/XMLSchema" xmlns:p="http://schemas.microsoft.com/office/2006/metadata/properties" xmlns:ns3="f62671e9-89eb-4f99-a5f6-db3359988c00" xmlns:ns4="4134815b-eabf-46ac-844d-9b0690bd8711" targetNamespace="http://schemas.microsoft.com/office/2006/metadata/properties" ma:root="true" ma:fieldsID="8959957db32c8c64e0ce54d1c5e443a9" ns3:_="" ns4:_="">
     <xsd:import namespace="f62671e9-89eb-4f99-a5f6-db3359988c00"/>
@@ -4111,32 +4428,22 @@
 </ct:contentTypeSchema>
 </file>
 
-<file path=customXml/itemProps1.xml><?xml version="1.0" encoding="utf-8"?>
-<ds:datastoreItem xmlns:ds="http://schemas.openxmlformats.org/officeDocument/2006/customXml" ds:itemID="{EF9B0293-AE68-4754-86B7-17138D7CE134}">
-  <ds:schemaRefs>
-    <ds:schemaRef ds:uri="http://schemas.openxmlformats.org/package/2006/metadata/core-properties"/>
-    <ds:schemaRef ds:uri="http://purl.org/dc/elements/1.1/"/>
-    <ds:schemaRef ds:uri="http://schemas.microsoft.com/office/2006/metadata/properties"/>
-    <ds:schemaRef ds:uri="http://schemas.microsoft.com/office/2006/documentManagement/types"/>
-    <ds:schemaRef ds:uri="f62671e9-89eb-4f99-a5f6-db3359988c00"/>
-    <ds:schemaRef ds:uri="http://www.w3.org/XML/1998/namespace"/>
-    <ds:schemaRef ds:uri="http://purl.org/dc/terms/"/>
-    <ds:schemaRef ds:uri="http://schemas.microsoft.com/office/infopath/2007/PartnerControls"/>
-    <ds:schemaRef ds:uri="4134815b-eabf-46ac-844d-9b0690bd8711"/>
-    <ds:schemaRef ds:uri="http://purl.org/dc/dcmitype/"/>
-  </ds:schemaRefs>
-</ds:datastoreItem>
+<file path=customXml/item2.xml><?xml version="1.0" encoding="utf-8"?>
+<?mso-contentType ?>
+<FormTemplates xmlns="http://schemas.microsoft.com/sharepoint/v3/contenttype/forms">
+  <Display>DocumentLibraryForm</Display>
+  <Edit>DocumentLibraryForm</Edit>
+  <New>DocumentLibraryForm</New>
+</FormTemplates>
 </file>
 
-<file path=customXml/itemProps2.xml><?xml version="1.0" encoding="utf-8"?>
-<ds:datastoreItem xmlns:ds="http://schemas.openxmlformats.org/officeDocument/2006/customXml" ds:itemID="{8B91528D-EFA8-4E4A-B420-BD2A0D21BF73}">
-  <ds:schemaRefs>
-    <ds:schemaRef ds:uri="http://schemas.microsoft.com/sharepoint/v3/contenttype/forms"/>
-  </ds:schemaRefs>
-</ds:datastoreItem>
+<file path=customXml/item3.xml><?xml version="1.0" encoding="utf-8"?>
+<p:properties xmlns:p="http://schemas.microsoft.com/office/2006/metadata/properties" xmlns:xsi="http://www.w3.org/2001/XMLSchema-instance" xmlns:pc="http://schemas.microsoft.com/office/infopath/2007/PartnerControls">
+  <documentManagement/>
+</p:properties>
 </file>
 
-<file path=customXml/itemProps3.xml><?xml version="1.0" encoding="utf-8"?>
+<file path=customXml/itemProps1.xml><?xml version="1.0" encoding="utf-8"?>
 <ds:datastoreItem xmlns:ds="http://schemas.openxmlformats.org/officeDocument/2006/customXml" ds:itemID="{8C35DC09-B6BC-4815-8006-072362A6FB71}">
   <ds:schemaRefs>
     <ds:schemaRef ds:uri="http://schemas.microsoft.com/office/2006/metadata/contentType"/>
@@ -4153,4 +4460,29 @@
     <ds:schemaRef ds:uri="http://schemas.microsoft.com/internal/obd"/>
   </ds:schemaRefs>
 </ds:datastoreItem>
+</file>
+
+<file path=customXml/itemProps2.xml><?xml version="1.0" encoding="utf-8"?>
+<ds:datastoreItem xmlns:ds="http://schemas.openxmlformats.org/officeDocument/2006/customXml" ds:itemID="{8B91528D-EFA8-4E4A-B420-BD2A0D21BF73}">
+  <ds:schemaRefs>
+    <ds:schemaRef ds:uri="http://schemas.microsoft.com/sharepoint/v3/contenttype/forms"/>
+  </ds:schemaRefs>
+</ds:datastoreItem>
+</file>
+
+<file path=customXml/itemProps3.xml><?xml version="1.0" encoding="utf-8"?>
+<ds:datastoreItem xmlns:ds="http://schemas.openxmlformats.org/officeDocument/2006/customXml" ds:itemID="{EF9B0293-AE68-4754-86B7-17138D7CE134}">
+  <ds:schemaRefs>
+    <ds:schemaRef ds:uri="http://schemas.openxmlformats.org/package/2006/metadata/core-properties"/>
+    <ds:schemaRef ds:uri="http://purl.org/dc/elements/1.1/"/>
+    <ds:schemaRef ds:uri="http://schemas.microsoft.com/office/2006/metadata/properties"/>
+    <ds:schemaRef ds:uri="http://schemas.microsoft.com/office/2006/documentManagement/types"/>
+    <ds:schemaRef ds:uri="f62671e9-89eb-4f99-a5f6-db3359988c00"/>
+    <ds:schemaRef ds:uri="http://www.w3.org/XML/1998/namespace"/>
+    <ds:schemaRef ds:uri="http://purl.org/dc/terms/"/>
+    <ds:schemaRef ds:uri="http://schemas.microsoft.com/office/infopath/2007/PartnerControls"/>
+    <ds:schemaRef ds:uri="4134815b-eabf-46ac-844d-9b0690bd8711"/>
+    <ds:schemaRef ds:uri="http://purl.org/dc/dcmitype/"/>
+  </ds:schemaRefs>
+</ds:datastoreItem>
 </file>
</xml_diff>

<commit_message>
Ajustando a figura do grafico + figura do kick evoluindo para blowoout
</commit_message>
<xml_diff>
--- a/Figures/CSB.pptx
+++ b/Figures/CSB.pptx
@@ -6,6 +6,7 @@
   </p:sldMasterIdLst>
   <p:sldIdLst>
     <p:sldId id="256" r:id="rId5"/>
+    <p:sldId id="257" r:id="rId6"/>
   </p:sldIdLst>
   <p:sldSz cx="8999538" cy="6858000"/>
   <p:notesSz cx="6858000" cy="9144000"/>
@@ -110,6 +111,1013 @@
     </p:ext>
   </p:extLst>
 </p:presentation>
+</file>
+
+<file path=ppt/charts/chart1.xml><?xml version="1.0" encoding="utf-8"?>
+<c:chartSpace xmlns:c="http://schemas.openxmlformats.org/drawingml/2006/chart" xmlns:a="http://schemas.openxmlformats.org/drawingml/2006/main" xmlns:r="http://schemas.openxmlformats.org/officeDocument/2006/relationships" xmlns:c16r2="http://schemas.microsoft.com/office/drawing/2015/06/chart">
+  <c:date1904 val="0"/>
+  <c:lang val="pt-BR"/>
+  <c:roundedCorners val="0"/>
+  <mc:AlternateContent xmlns:mc="http://schemas.openxmlformats.org/markup-compatibility/2006">
+    <mc:Choice xmlns:c14="http://schemas.microsoft.com/office/drawing/2007/8/2/chart" Requires="c14">
+      <c14:style val="102"/>
+    </mc:Choice>
+    <mc:Fallback>
+      <c:style val="2"/>
+    </mc:Fallback>
+  </mc:AlternateContent>
+  <c:clrMapOvr bg1="lt1" tx1="dk1" bg2="lt2" tx2="dk2" accent1="accent1" accent2="accent2" accent3="accent3" accent4="accent4" accent5="accent5" accent6="accent6" hlink="hlink" folHlink="folHlink"/>
+  <c:chart>
+    <c:title>
+      <c:tx>
+        <c:rich>
+          <a:bodyPr rot="0" spcFirstLastPara="1" vertOverflow="ellipsis" vert="horz" wrap="square" anchor="ctr" anchorCtr="1"/>
+          <a:lstStyle/>
+          <a:p>
+            <a:pPr>
+              <a:defRPr sz="2160" b="0" i="0" u="none" strike="noStrike" kern="1200" spc="0" baseline="0">
+                <a:solidFill>
+                  <a:sysClr val="windowText" lastClr="000000"/>
+                </a:solidFill>
+                <a:latin typeface="Times New Roman" panose="02020603050405020304" pitchFamily="18" charset="0"/>
+                <a:ea typeface="+mn-ea"/>
+                <a:cs typeface="Times New Roman" panose="02020603050405020304" pitchFamily="18" charset="0"/>
+              </a:defRPr>
+            </a:pPr>
+            <a:r>
+              <a:rPr lang="pt-BR" dirty="0" err="1"/>
+              <a:t>Blowout</a:t>
+            </a:r>
+            <a:r>
+              <a:rPr lang="pt-BR" dirty="0"/>
+              <a:t> por ciclo de vida do poço </a:t>
+            </a:r>
+            <a:br>
+              <a:rPr lang="pt-BR" dirty="0"/>
+            </a:br>
+            <a:r>
+              <a:rPr lang="pt-BR" dirty="0"/>
+              <a:t>de1980</a:t>
+            </a:r>
+            <a:r>
+              <a:rPr lang="pt-BR" baseline="0" dirty="0"/>
+              <a:t> até 2014 – GOM, UK, e NCS </a:t>
+            </a:r>
+            <a:endParaRPr lang="pt-BR" dirty="0"/>
+          </a:p>
+        </c:rich>
+      </c:tx>
+      <c:layout>
+        <c:manualLayout>
+          <c:xMode val="edge"/>
+          <c:yMode val="edge"/>
+          <c:x val="3.0400510549107557E-2"/>
+          <c:y val="0"/>
+        </c:manualLayout>
+      </c:layout>
+      <c:overlay val="0"/>
+      <c:spPr>
+        <a:noFill/>
+        <a:ln>
+          <a:noFill/>
+        </a:ln>
+        <a:effectLst/>
+      </c:spPr>
+      <c:txPr>
+        <a:bodyPr rot="0" spcFirstLastPara="1" vertOverflow="ellipsis" vert="horz" wrap="square" anchor="ctr" anchorCtr="1"/>
+        <a:lstStyle/>
+        <a:p>
+          <a:pPr>
+            <a:defRPr sz="2160" b="0" i="0" u="none" strike="noStrike" kern="1200" spc="0" baseline="0">
+              <a:solidFill>
+                <a:sysClr val="windowText" lastClr="000000"/>
+              </a:solidFill>
+              <a:latin typeface="Times New Roman" panose="02020603050405020304" pitchFamily="18" charset="0"/>
+              <a:ea typeface="+mn-ea"/>
+              <a:cs typeface="Times New Roman" panose="02020603050405020304" pitchFamily="18" charset="0"/>
+            </a:defRPr>
+          </a:pPr>
+          <a:endParaRPr lang="pt-BR"/>
+        </a:p>
+      </c:txPr>
+    </c:title>
+    <c:autoTitleDeleted val="0"/>
+    <c:plotArea>
+      <c:layout>
+        <c:manualLayout>
+          <c:layoutTarget val="inner"/>
+          <c:xMode val="edge"/>
+          <c:yMode val="edge"/>
+          <c:x val="7.4720125304819043E-2"/>
+          <c:y val="0.27836544634697163"/>
+          <c:w val="0.46604386802499942"/>
+          <c:h val="0.67912131694826927"/>
+        </c:manualLayout>
+      </c:layout>
+      <c:pieChart>
+        <c:varyColors val="1"/>
+        <c:ser>
+          <c:idx val="0"/>
+          <c:order val="0"/>
+          <c:dPt>
+            <c:idx val="0"/>
+            <c:bubble3D val="0"/>
+            <c:spPr>
+              <a:solidFill>
+                <a:schemeClr val="accent1"/>
+              </a:solidFill>
+              <a:ln w="19050">
+                <a:solidFill>
+                  <a:schemeClr val="lt1"/>
+                </a:solidFill>
+              </a:ln>
+              <a:effectLst/>
+            </c:spPr>
+            <c:extLst>
+              <c:ext xmlns:c16="http://schemas.microsoft.com/office/drawing/2014/chart" uri="{C3380CC4-5D6E-409C-BE32-E72D297353CC}">
+                <c16:uniqueId val="{00000001-D12F-4F99-A4B0-E8D3CB55FDF6}"/>
+              </c:ext>
+            </c:extLst>
+          </c:dPt>
+          <c:dPt>
+            <c:idx val="1"/>
+            <c:bubble3D val="0"/>
+            <c:spPr>
+              <a:solidFill>
+                <a:schemeClr val="accent1">
+                  <a:lumMod val="50000"/>
+                </a:schemeClr>
+              </a:solidFill>
+              <a:ln w="19050">
+                <a:solidFill>
+                  <a:schemeClr val="lt1"/>
+                </a:solidFill>
+              </a:ln>
+              <a:effectLst/>
+            </c:spPr>
+            <c:extLst>
+              <c:ext xmlns:c16="http://schemas.microsoft.com/office/drawing/2014/chart" uri="{C3380CC4-5D6E-409C-BE32-E72D297353CC}">
+                <c16:uniqueId val="{00000003-D12F-4F99-A4B0-E8D3CB55FDF6}"/>
+              </c:ext>
+            </c:extLst>
+          </c:dPt>
+          <c:dPt>
+            <c:idx val="2"/>
+            <c:bubble3D val="0"/>
+            <c:spPr>
+              <a:solidFill>
+                <a:schemeClr val="tx2">
+                  <a:lumMod val="60000"/>
+                  <a:lumOff val="40000"/>
+                </a:schemeClr>
+              </a:solidFill>
+              <a:ln w="19050">
+                <a:solidFill>
+                  <a:schemeClr val="lt1"/>
+                </a:solidFill>
+              </a:ln>
+              <a:effectLst/>
+            </c:spPr>
+            <c:extLst>
+              <c:ext xmlns:c16="http://schemas.microsoft.com/office/drawing/2014/chart" uri="{C3380CC4-5D6E-409C-BE32-E72D297353CC}">
+                <c16:uniqueId val="{00000005-D12F-4F99-A4B0-E8D3CB55FDF6}"/>
+              </c:ext>
+            </c:extLst>
+          </c:dPt>
+          <c:dPt>
+            <c:idx val="3"/>
+            <c:bubble3D val="0"/>
+            <c:spPr>
+              <a:solidFill>
+                <a:srgbClr val="00B0F0"/>
+              </a:solidFill>
+              <a:ln w="19050">
+                <a:solidFill>
+                  <a:schemeClr val="lt1"/>
+                </a:solidFill>
+              </a:ln>
+              <a:effectLst/>
+            </c:spPr>
+            <c:extLst>
+              <c:ext xmlns:c16="http://schemas.microsoft.com/office/drawing/2014/chart" uri="{C3380CC4-5D6E-409C-BE32-E72D297353CC}">
+                <c16:uniqueId val="{00000007-D12F-4F99-A4B0-E8D3CB55FDF6}"/>
+              </c:ext>
+            </c:extLst>
+          </c:dPt>
+          <c:dLbls>
+            <c:dLbl>
+              <c:idx val="0"/>
+              <c:layout>
+                <c:manualLayout>
+                  <c:x val="4.232272528433946E-2"/>
+                  <c:y val="2.9820282881306514E-2"/>
+                </c:manualLayout>
+              </c:layout>
+              <c:showLegendKey val="0"/>
+              <c:showVal val="1"/>
+              <c:showCatName val="0"/>
+              <c:showSerName val="0"/>
+              <c:showPercent val="0"/>
+              <c:showBubbleSize val="0"/>
+              <c:extLst>
+                <c:ext xmlns:c15="http://schemas.microsoft.com/office/drawing/2012/chart" uri="{CE6537A1-D6FC-4f65-9D91-7224C49458BB}"/>
+                <c:ext xmlns:c16="http://schemas.microsoft.com/office/drawing/2014/chart" uri="{C3380CC4-5D6E-409C-BE32-E72D297353CC}">
+                  <c16:uniqueId val="{00000001-D12F-4F99-A4B0-E8D3CB55FDF6}"/>
+                </c:ext>
+              </c:extLst>
+            </c:dLbl>
+            <c:dLbl>
+              <c:idx val="1"/>
+              <c:layout>
+                <c:manualLayout>
+                  <c:x val="6.4109798775153102E-3"/>
+                  <c:y val="-3.1896325459317587E-2"/>
+                </c:manualLayout>
+              </c:layout>
+              <c:showLegendKey val="0"/>
+              <c:showVal val="1"/>
+              <c:showCatName val="0"/>
+              <c:showSerName val="0"/>
+              <c:showPercent val="0"/>
+              <c:showBubbleSize val="0"/>
+              <c:extLst>
+                <c:ext xmlns:c15="http://schemas.microsoft.com/office/drawing/2012/chart" uri="{CE6537A1-D6FC-4f65-9D91-7224C49458BB}"/>
+                <c:ext xmlns:c16="http://schemas.microsoft.com/office/drawing/2014/chart" uri="{C3380CC4-5D6E-409C-BE32-E72D297353CC}">
+                  <c16:uniqueId val="{00000003-D12F-4F99-A4B0-E8D3CB55FDF6}"/>
+                </c:ext>
+              </c:extLst>
+            </c:dLbl>
+            <c:dLbl>
+              <c:idx val="2"/>
+              <c:layout>
+                <c:manualLayout>
+                  <c:x val="-1.7715988626421698E-2"/>
+                  <c:y val="-5.1018883056284631E-2"/>
+                </c:manualLayout>
+              </c:layout>
+              <c:showLegendKey val="0"/>
+              <c:showVal val="1"/>
+              <c:showCatName val="0"/>
+              <c:showSerName val="0"/>
+              <c:showPercent val="0"/>
+              <c:showBubbleSize val="0"/>
+              <c:extLst>
+                <c:ext xmlns:c15="http://schemas.microsoft.com/office/drawing/2012/chart" uri="{CE6537A1-D6FC-4f65-9D91-7224C49458BB}"/>
+                <c:ext xmlns:c16="http://schemas.microsoft.com/office/drawing/2014/chart" uri="{C3380CC4-5D6E-409C-BE32-E72D297353CC}">
+                  <c16:uniqueId val="{00000005-D12F-4F99-A4B0-E8D3CB55FDF6}"/>
+                </c:ext>
+              </c:extLst>
+            </c:dLbl>
+            <c:spPr>
+              <a:noFill/>
+              <a:ln>
+                <a:noFill/>
+              </a:ln>
+              <a:effectLst/>
+            </c:spPr>
+            <c:txPr>
+              <a:bodyPr rot="0" spcFirstLastPara="1" vertOverflow="ellipsis" vert="horz" wrap="square" anchor="ctr" anchorCtr="1"/>
+              <a:lstStyle/>
+              <a:p>
+                <a:pPr>
+                  <a:defRPr sz="1800" b="0" i="0" u="none" strike="noStrike" kern="1200" baseline="0">
+                    <a:solidFill>
+                      <a:sysClr val="windowText" lastClr="000000"/>
+                    </a:solidFill>
+                    <a:latin typeface="Times New Roman" panose="02020603050405020304" pitchFamily="18" charset="0"/>
+                    <a:ea typeface="+mn-ea"/>
+                    <a:cs typeface="Times New Roman" panose="02020603050405020304" pitchFamily="18" charset="0"/>
+                  </a:defRPr>
+                </a:pPr>
+                <a:endParaRPr lang="pt-BR"/>
+              </a:p>
+            </c:txPr>
+            <c:showLegendKey val="0"/>
+            <c:showVal val="1"/>
+            <c:showCatName val="0"/>
+            <c:showSerName val="0"/>
+            <c:showPercent val="0"/>
+            <c:showBubbleSize val="0"/>
+            <c:showLeaderLines val="1"/>
+            <c:leaderLines>
+              <c:spPr>
+                <a:ln w="9525" cap="flat" cmpd="sng" algn="ctr">
+                  <a:solidFill>
+                    <a:schemeClr val="tx1">
+                      <a:lumMod val="35000"/>
+                      <a:lumOff val="65000"/>
+                    </a:schemeClr>
+                  </a:solidFill>
+                  <a:round/>
+                </a:ln>
+                <a:effectLst/>
+              </c:spPr>
+            </c:leaderLines>
+            <c:extLst>
+              <c:ext xmlns:c15="http://schemas.microsoft.com/office/drawing/2012/chart" uri="{CE6537A1-D6FC-4f65-9D91-7224C49458BB}"/>
+            </c:extLst>
+          </c:dLbls>
+          <c:cat>
+            <c:strRef>
+              <c:f>Planilha1!$C$11:$C$14</c:f>
+              <c:strCache>
+                <c:ptCount val="4"/>
+                <c:pt idx="0">
+                  <c:v>Produção</c:v>
+                </c:pt>
+                <c:pt idx="1">
+                  <c:v>Pefuração</c:v>
+                </c:pt>
+                <c:pt idx="2">
+                  <c:v>Completação e Intervenção</c:v>
+                </c:pt>
+                <c:pt idx="3">
+                  <c:v>Abandono do poço</c:v>
+                </c:pt>
+              </c:strCache>
+            </c:strRef>
+          </c:cat>
+          <c:val>
+            <c:numRef>
+              <c:f>Planilha1!$D$11:$D$14</c:f>
+              <c:numCache>
+                <c:formatCode>0%</c:formatCode>
+                <c:ptCount val="4"/>
+                <c:pt idx="0">
+                  <c:v>0.11</c:v>
+                </c:pt>
+                <c:pt idx="1">
+                  <c:v>0.55000000000000004</c:v>
+                </c:pt>
+                <c:pt idx="2">
+                  <c:v>0.33</c:v>
+                </c:pt>
+                <c:pt idx="3">
+                  <c:v>0.01</c:v>
+                </c:pt>
+              </c:numCache>
+            </c:numRef>
+          </c:val>
+          <c:extLst>
+            <c:ext xmlns:c16="http://schemas.microsoft.com/office/drawing/2014/chart" uri="{C3380CC4-5D6E-409C-BE32-E72D297353CC}">
+              <c16:uniqueId val="{00000008-D12F-4F99-A4B0-E8D3CB55FDF6}"/>
+            </c:ext>
+          </c:extLst>
+        </c:ser>
+        <c:dLbls>
+          <c:showLegendKey val="0"/>
+          <c:showVal val="0"/>
+          <c:showCatName val="0"/>
+          <c:showSerName val="0"/>
+          <c:showPercent val="0"/>
+          <c:showBubbleSize val="0"/>
+          <c:showLeaderLines val="1"/>
+        </c:dLbls>
+        <c:firstSliceAng val="0"/>
+      </c:pieChart>
+      <c:spPr>
+        <a:noFill/>
+        <a:ln>
+          <a:noFill/>
+        </a:ln>
+        <a:effectLst/>
+      </c:spPr>
+    </c:plotArea>
+    <c:legend>
+      <c:legendPos val="r"/>
+      <c:layout>
+        <c:manualLayout>
+          <c:xMode val="edge"/>
+          <c:yMode val="edge"/>
+          <c:x val="0.60321425516493121"/>
+          <c:y val="0.2741293703784829"/>
+          <c:w val="0.38306361790539467"/>
+          <c:h val="0.61198020914371176"/>
+        </c:manualLayout>
+      </c:layout>
+      <c:overlay val="0"/>
+      <c:spPr>
+        <a:noFill/>
+        <a:ln>
+          <a:noFill/>
+        </a:ln>
+        <a:effectLst/>
+      </c:spPr>
+      <c:txPr>
+        <a:bodyPr rot="0" spcFirstLastPara="1" vertOverflow="ellipsis" vert="horz" wrap="square" anchor="ctr" anchorCtr="1"/>
+        <a:lstStyle/>
+        <a:p>
+          <a:pPr>
+            <a:defRPr sz="1800" b="0" i="0" u="none" strike="noStrike" kern="1200" baseline="0">
+              <a:solidFill>
+                <a:sysClr val="windowText" lastClr="000000"/>
+              </a:solidFill>
+              <a:latin typeface="Times New Roman" panose="02020603050405020304" pitchFamily="18" charset="0"/>
+              <a:ea typeface="+mn-ea"/>
+              <a:cs typeface="Times New Roman" panose="02020603050405020304" pitchFamily="18" charset="0"/>
+            </a:defRPr>
+          </a:pPr>
+          <a:endParaRPr lang="pt-BR"/>
+        </a:p>
+      </c:txPr>
+    </c:legend>
+    <c:plotVisOnly val="1"/>
+    <c:dispBlanksAs val="gap"/>
+    <c:extLst>
+      <c:ext xmlns:c16r3="http://schemas.microsoft.com/office/drawing/2017/03/chart" uri="{56B9EC1D-385E-4148-901F-78D8002777C0}">
+        <c16r3:dataDisplayOptions16>
+          <c16r3:dispNaAsBlank val="1"/>
+        </c16r3:dataDisplayOptions16>
+      </c:ext>
+    </c:extLst>
+    <c:showDLblsOverMax val="0"/>
+  </c:chart>
+  <c:spPr>
+    <a:noFill/>
+    <a:ln>
+      <a:noFill/>
+    </a:ln>
+    <a:effectLst/>
+  </c:spPr>
+  <c:txPr>
+    <a:bodyPr/>
+    <a:lstStyle/>
+    <a:p>
+      <a:pPr>
+        <a:defRPr sz="1800">
+          <a:solidFill>
+            <a:sysClr val="windowText" lastClr="000000"/>
+          </a:solidFill>
+          <a:latin typeface="Times New Roman" panose="02020603050405020304" pitchFamily="18" charset="0"/>
+          <a:cs typeface="Times New Roman" panose="02020603050405020304" pitchFamily="18" charset="0"/>
+        </a:defRPr>
+      </a:pPr>
+      <a:endParaRPr lang="pt-BR"/>
+    </a:p>
+  </c:txPr>
+  <c:externalData r:id="rId4">
+    <c:autoUpdate val="0"/>
+  </c:externalData>
+</c:chartSpace>
+</file>
+
+<file path=ppt/charts/colors1.xml><?xml version="1.0" encoding="utf-8"?>
+<cs:colorStyle xmlns:cs="http://schemas.microsoft.com/office/drawing/2012/chartStyle" xmlns:a="http://schemas.openxmlformats.org/drawingml/2006/main" meth="cycle" id="10">
+  <a:schemeClr val="accent1"/>
+  <a:schemeClr val="accent2"/>
+  <a:schemeClr val="accent3"/>
+  <a:schemeClr val="accent4"/>
+  <a:schemeClr val="accent5"/>
+  <a:schemeClr val="accent6"/>
+  <cs:variation/>
+  <cs:variation>
+    <a:lumMod val="60000"/>
+  </cs:variation>
+  <cs:variation>
+    <a:lumMod val="80000"/>
+    <a:lumOff val="20000"/>
+  </cs:variation>
+  <cs:variation>
+    <a:lumMod val="80000"/>
+  </cs:variation>
+  <cs:variation>
+    <a:lumMod val="60000"/>
+    <a:lumOff val="40000"/>
+  </cs:variation>
+  <cs:variation>
+    <a:lumMod val="50000"/>
+  </cs:variation>
+  <cs:variation>
+    <a:lumMod val="70000"/>
+    <a:lumOff val="30000"/>
+  </cs:variation>
+  <cs:variation>
+    <a:lumMod val="70000"/>
+  </cs:variation>
+  <cs:variation>
+    <a:lumMod val="50000"/>
+    <a:lumOff val="50000"/>
+  </cs:variation>
+</cs:colorStyle>
+</file>
+
+<file path=ppt/charts/style1.xml><?xml version="1.0" encoding="utf-8"?>
+<cs:chartStyle xmlns:cs="http://schemas.microsoft.com/office/drawing/2012/chartStyle" xmlns:a="http://schemas.openxmlformats.org/drawingml/2006/main" id="251">
+  <cs:axisTitle>
+    <cs:lnRef idx="0"/>
+    <cs:fillRef idx="0"/>
+    <cs:effectRef idx="0"/>
+    <cs:fontRef idx="minor">
+      <a:schemeClr val="tx1">
+        <a:lumMod val="65000"/>
+        <a:lumOff val="35000"/>
+      </a:schemeClr>
+    </cs:fontRef>
+    <cs:defRPr sz="1000" kern="1200"/>
+  </cs:axisTitle>
+  <cs:categoryAxis>
+    <cs:lnRef idx="0"/>
+    <cs:fillRef idx="0"/>
+    <cs:effectRef idx="0"/>
+    <cs:fontRef idx="minor">
+      <a:schemeClr val="tx1">
+        <a:lumMod val="65000"/>
+        <a:lumOff val="35000"/>
+      </a:schemeClr>
+    </cs:fontRef>
+    <cs:spPr>
+      <a:ln w="9525" cap="flat" cmpd="sng" algn="ctr">
+        <a:solidFill>
+          <a:schemeClr val="tx1">
+            <a:lumMod val="15000"/>
+            <a:lumOff val="85000"/>
+          </a:schemeClr>
+        </a:solidFill>
+        <a:round/>
+      </a:ln>
+    </cs:spPr>
+    <cs:defRPr sz="900" kern="1200"/>
+  </cs:categoryAxis>
+  <cs:chartArea mods="allowNoFillOverride allowNoLineOverride">
+    <cs:lnRef idx="0"/>
+    <cs:fillRef idx="0"/>
+    <cs:effectRef idx="0"/>
+    <cs:fontRef idx="minor">
+      <a:schemeClr val="tx1"/>
+    </cs:fontRef>
+    <cs:spPr>
+      <a:solidFill>
+        <a:schemeClr val="bg1"/>
+      </a:solidFill>
+      <a:ln w="9525" cap="flat" cmpd="sng" algn="ctr">
+        <a:solidFill>
+          <a:schemeClr val="tx1">
+            <a:lumMod val="15000"/>
+            <a:lumOff val="85000"/>
+          </a:schemeClr>
+        </a:solidFill>
+        <a:round/>
+      </a:ln>
+    </cs:spPr>
+    <cs:defRPr sz="900" kern="1200"/>
+  </cs:chartArea>
+  <cs:dataLabel>
+    <cs:lnRef idx="0"/>
+    <cs:fillRef idx="0"/>
+    <cs:effectRef idx="0"/>
+    <cs:fontRef idx="minor">
+      <a:schemeClr val="tx1">
+        <a:lumMod val="75000"/>
+        <a:lumOff val="25000"/>
+      </a:schemeClr>
+    </cs:fontRef>
+    <cs:defRPr sz="900" kern="1200"/>
+  </cs:dataLabel>
+  <cs:dataLabelCallout>
+    <cs:lnRef idx="0"/>
+    <cs:fillRef idx="0"/>
+    <cs:effectRef idx="0"/>
+    <cs:fontRef idx="minor">
+      <a:schemeClr val="dk1">
+        <a:lumMod val="65000"/>
+        <a:lumOff val="35000"/>
+      </a:schemeClr>
+    </cs:fontRef>
+    <cs:spPr>
+      <a:solidFill>
+        <a:schemeClr val="lt1"/>
+      </a:solidFill>
+      <a:ln>
+        <a:solidFill>
+          <a:schemeClr val="dk1">
+            <a:lumMod val="25000"/>
+            <a:lumOff val="75000"/>
+          </a:schemeClr>
+        </a:solidFill>
+      </a:ln>
+    </cs:spPr>
+    <cs:defRPr sz="900" kern="1200"/>
+    <cs:bodyPr rot="0" spcFirstLastPara="1" vertOverflow="clip" horzOverflow="clip" vert="horz" wrap="square" lIns="36576" tIns="18288" rIns="36576" bIns="18288" anchor="ctr" anchorCtr="1">
+      <a:spAutoFit/>
+    </cs:bodyPr>
+  </cs:dataLabelCallout>
+  <cs:dataPoint>
+    <cs:lnRef idx="0"/>
+    <cs:fillRef idx="1">
+      <cs:styleClr val="auto"/>
+    </cs:fillRef>
+    <cs:effectRef idx="0"/>
+    <cs:fontRef idx="minor">
+      <a:schemeClr val="tx1"/>
+    </cs:fontRef>
+    <cs:spPr>
+      <a:ln w="19050">
+        <a:solidFill>
+          <a:schemeClr val="lt1"/>
+        </a:solidFill>
+      </a:ln>
+    </cs:spPr>
+  </cs:dataPoint>
+  <cs:dataPoint3D>
+    <cs:lnRef idx="0"/>
+    <cs:fillRef idx="1">
+      <cs:styleClr val="auto"/>
+    </cs:fillRef>
+    <cs:effectRef idx="0"/>
+    <cs:fontRef idx="minor">
+      <a:schemeClr val="tx1"/>
+    </cs:fontRef>
+    <cs:spPr>
+      <a:ln w="25400">
+        <a:solidFill>
+          <a:schemeClr val="lt1"/>
+        </a:solidFill>
+      </a:ln>
+    </cs:spPr>
+  </cs:dataPoint3D>
+  <cs:dataPointLine>
+    <cs:lnRef idx="0">
+      <cs:styleClr val="auto"/>
+    </cs:lnRef>
+    <cs:fillRef idx="0"/>
+    <cs:effectRef idx="0"/>
+    <cs:fontRef idx="minor">
+      <a:schemeClr val="tx1"/>
+    </cs:fontRef>
+    <cs:spPr>
+      <a:ln w="28575" cap="rnd">
+        <a:solidFill>
+          <a:schemeClr val="phClr"/>
+        </a:solidFill>
+        <a:round/>
+      </a:ln>
+    </cs:spPr>
+  </cs:dataPointLine>
+  <cs:dataPointMarker>
+    <cs:lnRef idx="0">
+      <cs:styleClr val="auto"/>
+    </cs:lnRef>
+    <cs:fillRef idx="1">
+      <cs:styleClr val="auto"/>
+    </cs:fillRef>
+    <cs:effectRef idx="0"/>
+    <cs:fontRef idx="minor">
+      <a:schemeClr val="tx1"/>
+    </cs:fontRef>
+    <cs:spPr>
+      <a:ln w="9525">
+        <a:solidFill>
+          <a:schemeClr val="phClr"/>
+        </a:solidFill>
+      </a:ln>
+    </cs:spPr>
+  </cs:dataPointMarker>
+  <cs:dataPointMarkerLayout symbol="circle" size="5"/>
+  <cs:dataPointWireframe>
+    <cs:lnRef idx="0">
+      <cs:styleClr val="auto"/>
+    </cs:lnRef>
+    <cs:fillRef idx="0"/>
+    <cs:effectRef idx="0"/>
+    <cs:fontRef idx="minor">
+      <a:schemeClr val="tx1"/>
+    </cs:fontRef>
+    <cs:spPr>
+      <a:ln w="9525" cap="rnd">
+        <a:solidFill>
+          <a:schemeClr val="phClr"/>
+        </a:solidFill>
+        <a:round/>
+      </a:ln>
+    </cs:spPr>
+  </cs:dataPointWireframe>
+  <cs:dataTable>
+    <cs:lnRef idx="0"/>
+    <cs:fillRef idx="0"/>
+    <cs:effectRef idx="0"/>
+    <cs:fontRef idx="minor">
+      <a:schemeClr val="tx1">
+        <a:lumMod val="65000"/>
+        <a:lumOff val="35000"/>
+      </a:schemeClr>
+    </cs:fontRef>
+    <cs:spPr>
+      <a:noFill/>
+      <a:ln w="9525" cap="flat" cmpd="sng" algn="ctr">
+        <a:solidFill>
+          <a:schemeClr val="tx1">
+            <a:lumMod val="15000"/>
+            <a:lumOff val="85000"/>
+          </a:schemeClr>
+        </a:solidFill>
+        <a:round/>
+      </a:ln>
+    </cs:spPr>
+    <cs:defRPr sz="900" kern="1200"/>
+  </cs:dataTable>
+  <cs:downBar>
+    <cs:lnRef idx="0"/>
+    <cs:fillRef idx="0"/>
+    <cs:effectRef idx="0"/>
+    <cs:fontRef idx="minor">
+      <a:schemeClr val="tx1"/>
+    </cs:fontRef>
+    <cs:spPr>
+      <a:solidFill>
+        <a:schemeClr val="dk1">
+          <a:lumMod val="75000"/>
+          <a:lumOff val="25000"/>
+        </a:schemeClr>
+      </a:solidFill>
+      <a:ln w="9525" cap="flat" cmpd="sng" algn="ctr">
+        <a:solidFill>
+          <a:schemeClr val="tx1">
+            <a:lumMod val="65000"/>
+            <a:lumOff val="35000"/>
+          </a:schemeClr>
+        </a:solidFill>
+        <a:round/>
+      </a:ln>
+    </cs:spPr>
+  </cs:downBar>
+  <cs:dropLine>
+    <cs:lnRef idx="0"/>
+    <cs:fillRef idx="0"/>
+    <cs:effectRef idx="0"/>
+    <cs:fontRef idx="minor">
+      <a:schemeClr val="tx1"/>
+    </cs:fontRef>
+    <cs:spPr>
+      <a:ln w="9525" cap="flat" cmpd="sng" algn="ctr">
+        <a:solidFill>
+          <a:schemeClr val="tx1">
+            <a:lumMod val="35000"/>
+            <a:lumOff val="65000"/>
+          </a:schemeClr>
+        </a:solidFill>
+        <a:round/>
+      </a:ln>
+    </cs:spPr>
+  </cs:dropLine>
+  <cs:errorBar>
+    <cs:lnRef idx="0"/>
+    <cs:fillRef idx="0"/>
+    <cs:effectRef idx="0"/>
+    <cs:fontRef idx="minor">
+      <a:schemeClr val="tx1"/>
+    </cs:fontRef>
+    <cs:spPr>
+      <a:ln w="9525" cap="flat" cmpd="sng" algn="ctr">
+        <a:solidFill>
+          <a:schemeClr val="tx1">
+            <a:lumMod val="65000"/>
+            <a:lumOff val="35000"/>
+          </a:schemeClr>
+        </a:solidFill>
+        <a:round/>
+      </a:ln>
+    </cs:spPr>
+  </cs:errorBar>
+  <cs:floor>
+    <cs:lnRef idx="0"/>
+    <cs:fillRef idx="0"/>
+    <cs:effectRef idx="0"/>
+    <cs:fontRef idx="minor">
+      <a:schemeClr val="tx1"/>
+    </cs:fontRef>
+    <cs:spPr>
+      <a:noFill/>
+      <a:ln>
+        <a:noFill/>
+      </a:ln>
+    </cs:spPr>
+  </cs:floor>
+  <cs:gridlineMajor>
+    <cs:lnRef idx="0"/>
+    <cs:fillRef idx="0"/>
+    <cs:effectRef idx="0"/>
+    <cs:fontRef idx="minor">
+      <a:schemeClr val="tx1"/>
+    </cs:fontRef>
+    <cs:spPr>
+      <a:ln w="9525" cap="flat" cmpd="sng" algn="ctr">
+        <a:solidFill>
+          <a:schemeClr val="tx1">
+            <a:lumMod val="15000"/>
+            <a:lumOff val="85000"/>
+          </a:schemeClr>
+        </a:solidFill>
+        <a:round/>
+      </a:ln>
+    </cs:spPr>
+  </cs:gridlineMajor>
+  <cs:gridlineMinor>
+    <cs:lnRef idx="0"/>
+    <cs:fillRef idx="0"/>
+    <cs:effectRef idx="0"/>
+    <cs:fontRef idx="minor">
+      <a:schemeClr val="tx1"/>
+    </cs:fontRef>
+    <cs:spPr>
+      <a:ln w="9525" cap="flat" cmpd="sng" algn="ctr">
+        <a:solidFill>
+          <a:schemeClr val="tx1">
+            <a:lumMod val="5000"/>
+            <a:lumOff val="95000"/>
+          </a:schemeClr>
+        </a:solidFill>
+        <a:round/>
+      </a:ln>
+    </cs:spPr>
+  </cs:gridlineMinor>
+  <cs:hiLoLine>
+    <cs:lnRef idx="0"/>
+    <cs:fillRef idx="0"/>
+    <cs:effectRef idx="0"/>
+    <cs:fontRef idx="minor">
+      <a:schemeClr val="tx1"/>
+    </cs:fontRef>
+    <cs:spPr>
+      <a:ln w="9525" cap="flat" cmpd="sng" algn="ctr">
+        <a:solidFill>
+          <a:schemeClr val="tx1">
+            <a:lumMod val="50000"/>
+            <a:lumOff val="50000"/>
+          </a:schemeClr>
+        </a:solidFill>
+        <a:round/>
+      </a:ln>
+    </cs:spPr>
+  </cs:hiLoLine>
+  <cs:leaderLine>
+    <cs:lnRef idx="0"/>
+    <cs:fillRef idx="0"/>
+    <cs:effectRef idx="0"/>
+    <cs:fontRef idx="minor">
+      <a:schemeClr val="tx1"/>
+    </cs:fontRef>
+    <cs:spPr>
+      <a:ln w="9525" cap="flat" cmpd="sng" algn="ctr">
+        <a:solidFill>
+          <a:schemeClr val="tx1">
+            <a:lumMod val="35000"/>
+            <a:lumOff val="65000"/>
+          </a:schemeClr>
+        </a:solidFill>
+        <a:round/>
+      </a:ln>
+    </cs:spPr>
+  </cs:leaderLine>
+  <cs:legend>
+    <cs:lnRef idx="0"/>
+    <cs:fillRef idx="0"/>
+    <cs:effectRef idx="0"/>
+    <cs:fontRef idx="minor">
+      <a:schemeClr val="tx1">
+        <a:lumMod val="65000"/>
+        <a:lumOff val="35000"/>
+      </a:schemeClr>
+    </cs:fontRef>
+    <cs:defRPr sz="900" kern="1200"/>
+  </cs:legend>
+  <cs:plotArea mods="allowNoFillOverride allowNoLineOverride">
+    <cs:lnRef idx="0"/>
+    <cs:fillRef idx="0"/>
+    <cs:effectRef idx="0"/>
+    <cs:fontRef idx="minor">
+      <a:schemeClr val="tx1"/>
+    </cs:fontRef>
+  </cs:plotArea>
+  <cs:plotArea3D mods="allowNoFillOverride allowNoLineOverride">
+    <cs:lnRef idx="0"/>
+    <cs:fillRef idx="0"/>
+    <cs:effectRef idx="0"/>
+    <cs:fontRef idx="minor">
+      <a:schemeClr val="tx1"/>
+    </cs:fontRef>
+  </cs:plotArea3D>
+  <cs:seriesAxis>
+    <cs:lnRef idx="0"/>
+    <cs:fillRef idx="0"/>
+    <cs:effectRef idx="0"/>
+    <cs:fontRef idx="minor">
+      <a:schemeClr val="tx1">
+        <a:lumMod val="65000"/>
+        <a:lumOff val="35000"/>
+      </a:schemeClr>
+    </cs:fontRef>
+    <cs:defRPr sz="900" kern="1200"/>
+  </cs:seriesAxis>
+  <cs:seriesLine>
+    <cs:lnRef idx="0"/>
+    <cs:fillRef idx="0"/>
+    <cs:effectRef idx="0"/>
+    <cs:fontRef idx="minor">
+      <a:schemeClr val="tx1"/>
+    </cs:fontRef>
+    <cs:spPr>
+      <a:ln w="9525" cap="flat" cmpd="sng" algn="ctr">
+        <a:solidFill>
+          <a:schemeClr val="tx1">
+            <a:lumMod val="35000"/>
+            <a:lumOff val="65000"/>
+          </a:schemeClr>
+        </a:solidFill>
+        <a:round/>
+      </a:ln>
+    </cs:spPr>
+  </cs:seriesLine>
+  <cs:title>
+    <cs:lnRef idx="0"/>
+    <cs:fillRef idx="0"/>
+    <cs:effectRef idx="0"/>
+    <cs:fontRef idx="minor">
+      <a:schemeClr val="tx1">
+        <a:lumMod val="65000"/>
+        <a:lumOff val="35000"/>
+      </a:schemeClr>
+    </cs:fontRef>
+    <cs:defRPr sz="1400" b="0" kern="1200" spc="0" baseline="0"/>
+  </cs:title>
+  <cs:trendline>
+    <cs:lnRef idx="0">
+      <cs:styleClr val="auto"/>
+    </cs:lnRef>
+    <cs:fillRef idx="0"/>
+    <cs:effectRef idx="0"/>
+    <cs:fontRef idx="minor">
+      <a:schemeClr val="tx1"/>
+    </cs:fontRef>
+    <cs:spPr>
+      <a:ln w="19050" cap="rnd">
+        <a:solidFill>
+          <a:schemeClr val="phClr"/>
+        </a:solidFill>
+        <a:prstDash val="sysDot"/>
+      </a:ln>
+    </cs:spPr>
+  </cs:trendline>
+  <cs:trendlineLabel>
+    <cs:lnRef idx="0"/>
+    <cs:fillRef idx="0"/>
+    <cs:effectRef idx="0"/>
+    <cs:fontRef idx="minor">
+      <a:schemeClr val="tx1">
+        <a:lumMod val="65000"/>
+        <a:lumOff val="35000"/>
+      </a:schemeClr>
+    </cs:fontRef>
+    <cs:defRPr sz="900" kern="1200"/>
+  </cs:trendlineLabel>
+  <cs:upBar>
+    <cs:lnRef idx="0"/>
+    <cs:fillRef idx="0"/>
+    <cs:effectRef idx="0"/>
+    <cs:fontRef idx="minor">
+      <a:schemeClr val="tx1"/>
+    </cs:fontRef>
+    <cs:spPr>
+      <a:solidFill>
+        <a:schemeClr val="lt1"/>
+      </a:solidFill>
+      <a:ln w="9525" cap="flat" cmpd="sng" algn="ctr">
+        <a:solidFill>
+          <a:schemeClr val="tx1">
+            <a:lumMod val="65000"/>
+            <a:lumOff val="35000"/>
+          </a:schemeClr>
+        </a:solidFill>
+        <a:round/>
+      </a:ln>
+    </cs:spPr>
+  </cs:upBar>
+  <cs:valueAxis>
+    <cs:lnRef idx="0"/>
+    <cs:fillRef idx="0"/>
+    <cs:effectRef idx="0"/>
+    <cs:fontRef idx="minor">
+      <a:schemeClr val="tx1">
+        <a:lumMod val="65000"/>
+        <a:lumOff val="35000"/>
+      </a:schemeClr>
+    </cs:fontRef>
+    <cs:defRPr sz="900" kern="1200"/>
+  </cs:valueAxis>
+  <cs:wall>
+    <cs:lnRef idx="0"/>
+    <cs:fillRef idx="0"/>
+    <cs:effectRef idx="0"/>
+    <cs:fontRef idx="minor">
+      <a:schemeClr val="tx1"/>
+    </cs:fontRef>
+    <cs:spPr>
+      <a:noFill/>
+      <a:ln>
+        <a:noFill/>
+      </a:ln>
+    </cs:spPr>
+  </cs:wall>
+</cs:chartStyle>
 </file>
 
 <file path=ppt/slideLayouts/slideLayout1.xml><?xml version="1.0" encoding="utf-8"?>
@@ -3619,12 +4627,42 @@
           </a:prstGeom>
         </p:spPr>
       </p:pic>
+    </p:spTree>
+    <p:extLst>
+      <p:ext uri="{BB962C8B-B14F-4D97-AF65-F5344CB8AC3E}">
+        <p14:creationId xmlns:p14="http://schemas.microsoft.com/office/powerpoint/2010/main" val="470549694"/>
+      </p:ext>
+    </p:extLst>
+  </p:cSld>
+  <p:clrMapOvr>
+    <a:masterClrMapping/>
+  </p:clrMapOvr>
+</p:sld>
+</file>
+
+<file path=ppt/slides/slide2.xml><?xml version="1.0" encoding="utf-8"?>
+<p:sld xmlns:a="http://schemas.openxmlformats.org/drawingml/2006/main" xmlns:r="http://schemas.openxmlformats.org/officeDocument/2006/relationships" xmlns:p="http://schemas.openxmlformats.org/presentationml/2006/main">
+  <p:cSld>
+    <p:spTree>
+      <p:nvGrpSpPr>
+        <p:cNvPr id="1" name=""/>
+        <p:cNvGrpSpPr/>
+        <p:nvPr/>
+      </p:nvGrpSpPr>
+      <p:grpSpPr>
+        <a:xfrm>
+          <a:off x="0" y="0"/>
+          <a:ext cx="0" cy="0"/>
+          <a:chOff x="0" y="0"/>
+          <a:chExt cx="0" cy="0"/>
+        </a:xfrm>
+      </p:grpSpPr>
       <p:pic>
         <p:nvPicPr>
-          <p:cNvPr id="3" name="Imagem 2">
+          <p:cNvPr id="4" name="Imagem 3">
             <a:extLst>
               <a:ext uri="{FF2B5EF4-FFF2-40B4-BE49-F238E27FC236}">
-                <a16:creationId xmlns:a16="http://schemas.microsoft.com/office/drawing/2014/main" id="{96A157AB-B51D-4551-8CF5-BCB194EF1DF5}"/>
+                <a16:creationId xmlns:a16="http://schemas.microsoft.com/office/drawing/2014/main" id="{1A820B30-E96C-49D8-A668-4FC28807BE5D}"/>
               </a:ext>
             </a:extLst>
           </p:cNvPr>
@@ -3634,7 +4672,7 @@
           <p:nvPr/>
         </p:nvPicPr>
         <p:blipFill rotWithShape="1">
-          <a:blip r:embed="rId3">
+          <a:blip r:embed="rId2">
             <a:clrChange>
               <a:clrFrom>
                 <a:srgbClr val="FFFFFF"/>
@@ -3656,7 +4694,7 @@
         </p:blipFill>
         <p:spPr>
           <a:xfrm>
-            <a:off x="5685652" y="179041"/>
+            <a:off x="5222013" y="240847"/>
             <a:ext cx="4977951" cy="6376305"/>
           </a:xfrm>
           <a:prstGeom prst="rect">
@@ -3666,10 +4704,10 @@
       </p:pic>
       <p:sp>
         <p:nvSpPr>
-          <p:cNvPr id="4" name="Retângulo 3">
+          <p:cNvPr id="5" name="Retângulo 4">
             <a:extLst>
               <a:ext uri="{FF2B5EF4-FFF2-40B4-BE49-F238E27FC236}">
-                <a16:creationId xmlns:a16="http://schemas.microsoft.com/office/drawing/2014/main" id="{5B68E858-2F29-441F-8068-6A2106A5F8A9}"/>
+                <a16:creationId xmlns:a16="http://schemas.microsoft.com/office/drawing/2014/main" id="{776BC486-5FF6-41D3-8DCE-7932323AC183}"/>
               </a:ext>
             </a:extLst>
           </p:cNvPr>
@@ -3678,7 +4716,7 @@
         </p:nvSpPr>
         <p:spPr>
           <a:xfrm>
-            <a:off x="8840789" y="4793084"/>
+            <a:off x="8377150" y="4867769"/>
             <a:ext cx="1552892" cy="369332"/>
           </a:xfrm>
           <a:prstGeom prst="rect">
@@ -3711,10 +4749,10 @@
       </p:sp>
       <p:sp>
         <p:nvSpPr>
-          <p:cNvPr id="13" name="Retângulo 12">
+          <p:cNvPr id="6" name="Retângulo 5">
             <a:extLst>
               <a:ext uri="{FF2B5EF4-FFF2-40B4-BE49-F238E27FC236}">
-                <a16:creationId xmlns:a16="http://schemas.microsoft.com/office/drawing/2014/main" id="{3BE67F76-4C53-4FA6-B106-865E67479FA4}"/>
+                <a16:creationId xmlns:a16="http://schemas.microsoft.com/office/drawing/2014/main" id="{6E322648-5D80-40ED-9E36-6369A63A4243}"/>
               </a:ext>
             </a:extLst>
           </p:cNvPr>
@@ -3723,7 +4761,7 @@
         </p:nvSpPr>
         <p:spPr>
           <a:xfrm>
-            <a:off x="5573168" y="2936901"/>
+            <a:off x="5109529" y="3011586"/>
             <a:ext cx="2183992" cy="369332"/>
           </a:xfrm>
           <a:prstGeom prst="rect">
@@ -3756,10 +4794,10 @@
       </p:sp>
       <p:sp>
         <p:nvSpPr>
-          <p:cNvPr id="14" name="Retângulo 13">
+          <p:cNvPr id="7" name="Retângulo 6">
             <a:extLst>
               <a:ext uri="{FF2B5EF4-FFF2-40B4-BE49-F238E27FC236}">
-                <a16:creationId xmlns:a16="http://schemas.microsoft.com/office/drawing/2014/main" id="{D58BAEA0-28EC-4C94-97E1-125F36868D1E}"/>
+                <a16:creationId xmlns:a16="http://schemas.microsoft.com/office/drawing/2014/main" id="{3A459584-80FE-4F17-B25D-E3FDD0C27D92}"/>
               </a:ext>
             </a:extLst>
           </p:cNvPr>
@@ -3768,7 +4806,7 @@
         </p:nvSpPr>
         <p:spPr>
           <a:xfrm>
-            <a:off x="5916087" y="4007459"/>
+            <a:off x="5452448" y="4082144"/>
             <a:ext cx="1841073" cy="923330"/>
           </a:xfrm>
           <a:prstGeom prst="rect">
@@ -3801,10 +4839,10 @@
       </p:sp>
       <p:sp>
         <p:nvSpPr>
-          <p:cNvPr id="15" name="Retângulo 14">
+          <p:cNvPr id="8" name="Retângulo 7">
             <a:extLst>
               <a:ext uri="{FF2B5EF4-FFF2-40B4-BE49-F238E27FC236}">
-                <a16:creationId xmlns:a16="http://schemas.microsoft.com/office/drawing/2014/main" id="{15163D38-DB81-4AA0-B725-44BDF69FE3E1}"/>
+                <a16:creationId xmlns:a16="http://schemas.microsoft.com/office/drawing/2014/main" id="{1C216944-E9D5-4F08-A909-797A536CCE22}"/>
               </a:ext>
             </a:extLst>
           </p:cNvPr>
@@ -3813,7 +4851,7 @@
         </p:nvSpPr>
         <p:spPr>
           <a:xfrm>
-            <a:off x="6933904" y="2302429"/>
+            <a:off x="6470265" y="2377114"/>
             <a:ext cx="689112" cy="369332"/>
           </a:xfrm>
           <a:prstGeom prst="rect">
@@ -3839,10 +4877,10 @@
       </p:sp>
       <p:sp>
         <p:nvSpPr>
-          <p:cNvPr id="16" name="Retângulo 15">
+          <p:cNvPr id="9" name="Retângulo 8">
             <a:extLst>
               <a:ext uri="{FF2B5EF4-FFF2-40B4-BE49-F238E27FC236}">
-                <a16:creationId xmlns:a16="http://schemas.microsoft.com/office/drawing/2014/main" id="{1A209679-FA37-4D0E-96C2-F3480E66C559}"/>
+                <a16:creationId xmlns:a16="http://schemas.microsoft.com/office/drawing/2014/main" id="{B570C209-DDA5-4C1A-87E7-CDA1FE311BFB}"/>
               </a:ext>
             </a:extLst>
           </p:cNvPr>
@@ -3851,7 +4889,7 @@
         </p:nvSpPr>
         <p:spPr>
           <a:xfrm>
-            <a:off x="7068048" y="2641003"/>
+            <a:off x="6604409" y="2715688"/>
             <a:ext cx="689112" cy="369332"/>
           </a:xfrm>
           <a:prstGeom prst="rect">
@@ -3877,10 +4915,10 @@
       </p:sp>
       <p:sp>
         <p:nvSpPr>
-          <p:cNvPr id="17" name="Retângulo 16">
+          <p:cNvPr id="10" name="Retângulo 9">
             <a:extLst>
               <a:ext uri="{FF2B5EF4-FFF2-40B4-BE49-F238E27FC236}">
-                <a16:creationId xmlns:a16="http://schemas.microsoft.com/office/drawing/2014/main" id="{663E70CF-6807-4370-939A-D424B9C96B1C}"/>
+                <a16:creationId xmlns:a16="http://schemas.microsoft.com/office/drawing/2014/main" id="{EA291A10-BC1A-4E6E-9AFE-29460A2A6A3C}"/>
               </a:ext>
             </a:extLst>
           </p:cNvPr>
@@ -3889,7 +4927,7 @@
         </p:nvSpPr>
         <p:spPr>
           <a:xfrm>
-            <a:off x="7140959" y="3406801"/>
+            <a:off x="6677320" y="3481486"/>
             <a:ext cx="689112" cy="369332"/>
           </a:xfrm>
           <a:prstGeom prst="rect">
@@ -3915,10 +4953,10 @@
       </p:sp>
       <p:sp>
         <p:nvSpPr>
-          <p:cNvPr id="18" name="Retângulo 17">
+          <p:cNvPr id="11" name="Retângulo 10">
             <a:extLst>
               <a:ext uri="{FF2B5EF4-FFF2-40B4-BE49-F238E27FC236}">
-                <a16:creationId xmlns:a16="http://schemas.microsoft.com/office/drawing/2014/main" id="{E599F848-6BE6-40B0-9532-E9DF4094F568}"/>
+                <a16:creationId xmlns:a16="http://schemas.microsoft.com/office/drawing/2014/main" id="{9074F76E-284B-4A7E-AB98-0F10F66BFD24}"/>
               </a:ext>
             </a:extLst>
           </p:cNvPr>
@@ -3927,7 +4965,7 @@
         </p:nvSpPr>
         <p:spPr>
           <a:xfrm>
-            <a:off x="6615826" y="5045670"/>
+            <a:off x="6152187" y="5120355"/>
             <a:ext cx="1377554" cy="369332"/>
           </a:xfrm>
           <a:prstGeom prst="rect">
@@ -3951,10 +4989,113 @@
           </a:p>
         </p:txBody>
       </p:sp>
+      <p:graphicFrame>
+        <p:nvGraphicFramePr>
+          <p:cNvPr id="12" name="Gráfico 11">
+            <a:extLst>
+              <a:ext uri="{FF2B5EF4-FFF2-40B4-BE49-F238E27FC236}">
+                <a16:creationId xmlns:a16="http://schemas.microsoft.com/office/drawing/2014/main" id="{A85135C1-DB76-436C-935B-F5B41F152F93}"/>
+              </a:ext>
+            </a:extLst>
+          </p:cNvPr>
+          <p:cNvGraphicFramePr>
+            <a:graphicFrameLocks/>
+          </p:cNvGraphicFramePr>
+          <p:nvPr>
+            <p:extLst>
+              <p:ext uri="{D42A27DB-BD31-4B8C-83A1-F6EECF244321}">
+                <p14:modId xmlns:p14="http://schemas.microsoft.com/office/powerpoint/2010/main" val="3095378767"/>
+              </p:ext>
+            </p:extLst>
+          </p:nvPr>
+        </p:nvGraphicFramePr>
+        <p:xfrm>
+          <a:off x="-1131288" y="1068317"/>
+          <a:ext cx="6173745" cy="4236704"/>
+        </p:xfrm>
+        <a:graphic>
+          <a:graphicData uri="http://schemas.openxmlformats.org/drawingml/2006/chart">
+            <c:chart xmlns:c="http://schemas.openxmlformats.org/drawingml/2006/chart" xmlns:r="http://schemas.openxmlformats.org/officeDocument/2006/relationships" r:id="rId3"/>
+          </a:graphicData>
+        </a:graphic>
+      </p:graphicFrame>
+      <p:sp>
+        <p:nvSpPr>
+          <p:cNvPr id="13" name="Retângulo 12">
+            <a:extLst>
+              <a:ext uri="{FF2B5EF4-FFF2-40B4-BE49-F238E27FC236}">
+                <a16:creationId xmlns:a16="http://schemas.microsoft.com/office/drawing/2014/main" id="{4DC7A0DD-4F97-40F3-B30A-E5A9F95272DF}"/>
+              </a:ext>
+            </a:extLst>
+          </p:cNvPr>
+          <p:cNvSpPr/>
+          <p:nvPr/>
+        </p:nvSpPr>
+        <p:spPr>
+          <a:xfrm>
+            <a:off x="-1282496" y="5420351"/>
+            <a:ext cx="4869522" cy="369332"/>
+          </a:xfrm>
+          <a:prstGeom prst="rect">
+            <a:avLst/>
+          </a:prstGeom>
+          <a:solidFill>
+            <a:schemeClr val="bg1"/>
+          </a:solidFill>
+        </p:spPr>
+        <p:txBody>
+          <a:bodyPr wrap="square">
+            <a:spAutoFit/>
+          </a:bodyPr>
+          <a:lstStyle/>
+          <a:p>
+            <a:pPr algn="ctr"/>
+            <a:r>
+              <a:rPr lang="pt-BR" dirty="0">
+                <a:latin typeface="Times New Roman" panose="02020603050405020304" pitchFamily="18" charset="0"/>
+                <a:cs typeface="Times New Roman" panose="02020603050405020304" pitchFamily="18" charset="0"/>
+              </a:rPr>
+              <a:t>Fonte: </a:t>
+            </a:r>
+            <a:r>
+              <a:rPr lang="pt-BR" i="1" dirty="0">
+                <a:latin typeface="Times New Roman" panose="02020603050405020304" pitchFamily="18" charset="0"/>
+                <a:cs typeface="Times New Roman" panose="02020603050405020304" pitchFamily="18" charset="0"/>
+              </a:rPr>
+              <a:t>SINTEF Offshore </a:t>
+            </a:r>
+            <a:r>
+              <a:rPr lang="pt-BR" i="1" dirty="0" err="1">
+                <a:latin typeface="Times New Roman" panose="02020603050405020304" pitchFamily="18" charset="0"/>
+                <a:cs typeface="Times New Roman" panose="02020603050405020304" pitchFamily="18" charset="0"/>
+              </a:rPr>
+              <a:t>Blowout</a:t>
+            </a:r>
+            <a:r>
+              <a:rPr lang="pt-BR" i="1" dirty="0">
+                <a:latin typeface="Times New Roman" panose="02020603050405020304" pitchFamily="18" charset="0"/>
+                <a:cs typeface="Times New Roman" panose="02020603050405020304" pitchFamily="18" charset="0"/>
+              </a:rPr>
+              <a:t> </a:t>
+            </a:r>
+            <a:r>
+              <a:rPr lang="pt-BR" i="1" dirty="0" err="1">
+                <a:latin typeface="Times New Roman" panose="02020603050405020304" pitchFamily="18" charset="0"/>
+                <a:cs typeface="Times New Roman" panose="02020603050405020304" pitchFamily="18" charset="0"/>
+              </a:rPr>
+              <a:t>Database</a:t>
+            </a:r>
+            <a:endParaRPr lang="en-US" i="1" dirty="0">
+              <a:latin typeface="Times New Roman" panose="02020603050405020304" pitchFamily="18" charset="0"/>
+              <a:cs typeface="Times New Roman" panose="02020603050405020304" pitchFamily="18" charset="0"/>
+            </a:endParaRPr>
+          </a:p>
+        </p:txBody>
+      </p:sp>
     </p:spTree>
     <p:extLst>
       <p:ext uri="{BB962C8B-B14F-4D97-AF65-F5344CB8AC3E}">
-        <p14:creationId xmlns:p14="http://schemas.microsoft.com/office/powerpoint/2010/main" val="470549694"/>
+        <p14:creationId xmlns:p14="http://schemas.microsoft.com/office/powerpoint/2010/main" val="4110083320"/>
       </p:ext>
     </p:extLst>
   </p:cSld>
@@ -4225,7 +5366,308 @@
 </a:theme>
 </file>
 
+<file path=ppt/theme/themeOverride1.xml><?xml version="1.0" encoding="utf-8"?>
+<a:themeOverride xmlns:a="http://schemas.openxmlformats.org/drawingml/2006/main">
+  <a:clrScheme name="Office">
+    <a:dk1>
+      <a:sysClr val="windowText" lastClr="000000"/>
+    </a:dk1>
+    <a:lt1>
+      <a:sysClr val="window" lastClr="FFFFFF"/>
+    </a:lt1>
+    <a:dk2>
+      <a:srgbClr val="44546A"/>
+    </a:dk2>
+    <a:lt2>
+      <a:srgbClr val="E7E6E6"/>
+    </a:lt2>
+    <a:accent1>
+      <a:srgbClr val="4472C4"/>
+    </a:accent1>
+    <a:accent2>
+      <a:srgbClr val="ED7D31"/>
+    </a:accent2>
+    <a:accent3>
+      <a:srgbClr val="A5A5A5"/>
+    </a:accent3>
+    <a:accent4>
+      <a:srgbClr val="FFC000"/>
+    </a:accent4>
+    <a:accent5>
+      <a:srgbClr val="5B9BD5"/>
+    </a:accent5>
+    <a:accent6>
+      <a:srgbClr val="70AD47"/>
+    </a:accent6>
+    <a:hlink>
+      <a:srgbClr val="0563C1"/>
+    </a:hlink>
+    <a:folHlink>
+      <a:srgbClr val="954F72"/>
+    </a:folHlink>
+  </a:clrScheme>
+  <a:fontScheme name="Office">
+    <a:majorFont>
+      <a:latin typeface="Calibri Light" panose="020F0302020204030204"/>
+      <a:ea typeface=""/>
+      <a:cs typeface=""/>
+      <a:font script="Jpan" typeface="游ゴシック Light"/>
+      <a:font script="Hang" typeface="맑은 고딕"/>
+      <a:font script="Hans" typeface="等线 Light"/>
+      <a:font script="Hant" typeface="新細明體"/>
+      <a:font script="Arab" typeface="Times New Roman"/>
+      <a:font script="Hebr" typeface="Times New Roman"/>
+      <a:font script="Thai" typeface="Tahoma"/>
+      <a:font script="Ethi" typeface="Nyala"/>
+      <a:font script="Beng" typeface="Vrinda"/>
+      <a:font script="Gujr" typeface="Shruti"/>
+      <a:font script="Khmr" typeface="MoolBoran"/>
+      <a:font script="Knda" typeface="Tunga"/>
+      <a:font script="Guru" typeface="Raavi"/>
+      <a:font script="Cans" typeface="Euphemia"/>
+      <a:font script="Cher" typeface="Plantagenet Cherokee"/>
+      <a:font script="Yiii" typeface="Microsoft Yi Baiti"/>
+      <a:font script="Tibt" typeface="Microsoft Himalaya"/>
+      <a:font script="Thaa" typeface="MV Boli"/>
+      <a:font script="Deva" typeface="Mangal"/>
+      <a:font script="Telu" typeface="Gautami"/>
+      <a:font script="Taml" typeface="Latha"/>
+      <a:font script="Syrc" typeface="Estrangelo Edessa"/>
+      <a:font script="Orya" typeface="Kalinga"/>
+      <a:font script="Mlym" typeface="Kartika"/>
+      <a:font script="Laoo" typeface="DokChampa"/>
+      <a:font script="Sinh" typeface="Iskoola Pota"/>
+      <a:font script="Mong" typeface="Mongolian Baiti"/>
+      <a:font script="Viet" typeface="Times New Roman"/>
+      <a:font script="Uigh" typeface="Microsoft Uighur"/>
+      <a:font script="Geor" typeface="Sylfaen"/>
+      <a:font script="Armn" typeface="Arial"/>
+      <a:font script="Bugi" typeface="Leelawadee UI"/>
+      <a:font script="Bopo" typeface="Microsoft JhengHei"/>
+      <a:font script="Java" typeface="Javanese Text"/>
+      <a:font script="Lisu" typeface="Segoe UI"/>
+      <a:font script="Mymr" typeface="Myanmar Text"/>
+      <a:font script="Nkoo" typeface="Ebrima"/>
+      <a:font script="Olck" typeface="Nirmala UI"/>
+      <a:font script="Osma" typeface="Ebrima"/>
+      <a:font script="Phag" typeface="Phagspa"/>
+      <a:font script="Syrn" typeface="Estrangelo Edessa"/>
+      <a:font script="Syrj" typeface="Estrangelo Edessa"/>
+      <a:font script="Syre" typeface="Estrangelo Edessa"/>
+      <a:font script="Sora" typeface="Nirmala UI"/>
+      <a:font script="Tale" typeface="Microsoft Tai Le"/>
+      <a:font script="Talu" typeface="Microsoft New Tai Lue"/>
+      <a:font script="Tfng" typeface="Ebrima"/>
+    </a:majorFont>
+    <a:minorFont>
+      <a:latin typeface="Calibri" panose="020F0502020204030204"/>
+      <a:ea typeface=""/>
+      <a:cs typeface=""/>
+      <a:font script="Jpan" typeface="游ゴシック"/>
+      <a:font script="Hang" typeface="맑은 고딕"/>
+      <a:font script="Hans" typeface="等线"/>
+      <a:font script="Hant" typeface="新細明體"/>
+      <a:font script="Arab" typeface="Arial"/>
+      <a:font script="Hebr" typeface="Arial"/>
+      <a:font script="Thai" typeface="Tahoma"/>
+      <a:font script="Ethi" typeface="Nyala"/>
+      <a:font script="Beng" typeface="Vrinda"/>
+      <a:font script="Gujr" typeface="Shruti"/>
+      <a:font script="Khmr" typeface="DaunPenh"/>
+      <a:font script="Knda" typeface="Tunga"/>
+      <a:font script="Guru" typeface="Raavi"/>
+      <a:font script="Cans" typeface="Euphemia"/>
+      <a:font script="Cher" typeface="Plantagenet Cherokee"/>
+      <a:font script="Yiii" typeface="Microsoft Yi Baiti"/>
+      <a:font script="Tibt" typeface="Microsoft Himalaya"/>
+      <a:font script="Thaa" typeface="MV Boli"/>
+      <a:font script="Deva" typeface="Mangal"/>
+      <a:font script="Telu" typeface="Gautami"/>
+      <a:font script="Taml" typeface="Latha"/>
+      <a:font script="Syrc" typeface="Estrangelo Edessa"/>
+      <a:font script="Orya" typeface="Kalinga"/>
+      <a:font script="Mlym" typeface="Kartika"/>
+      <a:font script="Laoo" typeface="DokChampa"/>
+      <a:font script="Sinh" typeface="Iskoola Pota"/>
+      <a:font script="Mong" typeface="Mongolian Baiti"/>
+      <a:font script="Viet" typeface="Arial"/>
+      <a:font script="Uigh" typeface="Microsoft Uighur"/>
+      <a:font script="Geor" typeface="Sylfaen"/>
+      <a:font script="Armn" typeface="Arial"/>
+      <a:font script="Bugi" typeface="Leelawadee UI"/>
+      <a:font script="Bopo" typeface="Microsoft JhengHei"/>
+      <a:font script="Java" typeface="Javanese Text"/>
+      <a:font script="Lisu" typeface="Segoe UI"/>
+      <a:font script="Mymr" typeface="Myanmar Text"/>
+      <a:font script="Nkoo" typeface="Ebrima"/>
+      <a:font script="Olck" typeface="Nirmala UI"/>
+      <a:font script="Osma" typeface="Ebrima"/>
+      <a:font script="Phag" typeface="Phagspa"/>
+      <a:font script="Syrn" typeface="Estrangelo Edessa"/>
+      <a:font script="Syrj" typeface="Estrangelo Edessa"/>
+      <a:font script="Syre" typeface="Estrangelo Edessa"/>
+      <a:font script="Sora" typeface="Nirmala UI"/>
+      <a:font script="Tale" typeface="Microsoft Tai Le"/>
+      <a:font script="Talu" typeface="Microsoft New Tai Lue"/>
+      <a:font script="Tfng" typeface="Ebrima"/>
+    </a:minorFont>
+  </a:fontScheme>
+  <a:fmtScheme name="Office">
+    <a:fillStyleLst>
+      <a:solidFill>
+        <a:schemeClr val="phClr"/>
+      </a:solidFill>
+      <a:gradFill rotWithShape="1">
+        <a:gsLst>
+          <a:gs pos="0">
+            <a:schemeClr val="phClr">
+              <a:lumMod val="110000"/>
+              <a:satMod val="105000"/>
+              <a:tint val="67000"/>
+            </a:schemeClr>
+          </a:gs>
+          <a:gs pos="50000">
+            <a:schemeClr val="phClr">
+              <a:lumMod val="105000"/>
+              <a:satMod val="103000"/>
+              <a:tint val="73000"/>
+            </a:schemeClr>
+          </a:gs>
+          <a:gs pos="100000">
+            <a:schemeClr val="phClr">
+              <a:lumMod val="105000"/>
+              <a:satMod val="109000"/>
+              <a:tint val="81000"/>
+            </a:schemeClr>
+          </a:gs>
+        </a:gsLst>
+        <a:lin ang="5400000" scaled="0"/>
+      </a:gradFill>
+      <a:gradFill rotWithShape="1">
+        <a:gsLst>
+          <a:gs pos="0">
+            <a:schemeClr val="phClr">
+              <a:satMod val="103000"/>
+              <a:lumMod val="102000"/>
+              <a:tint val="94000"/>
+            </a:schemeClr>
+          </a:gs>
+          <a:gs pos="50000">
+            <a:schemeClr val="phClr">
+              <a:satMod val="110000"/>
+              <a:lumMod val="100000"/>
+              <a:shade val="100000"/>
+            </a:schemeClr>
+          </a:gs>
+          <a:gs pos="100000">
+            <a:schemeClr val="phClr">
+              <a:lumMod val="99000"/>
+              <a:satMod val="120000"/>
+              <a:shade val="78000"/>
+            </a:schemeClr>
+          </a:gs>
+        </a:gsLst>
+        <a:lin ang="5400000" scaled="0"/>
+      </a:gradFill>
+    </a:fillStyleLst>
+    <a:lnStyleLst>
+      <a:ln w="6350" cap="flat" cmpd="sng" algn="ctr">
+        <a:solidFill>
+          <a:schemeClr val="phClr"/>
+        </a:solidFill>
+        <a:prstDash val="solid"/>
+        <a:miter lim="800000"/>
+      </a:ln>
+      <a:ln w="12700" cap="flat" cmpd="sng" algn="ctr">
+        <a:solidFill>
+          <a:schemeClr val="phClr"/>
+        </a:solidFill>
+        <a:prstDash val="solid"/>
+        <a:miter lim="800000"/>
+      </a:ln>
+      <a:ln w="19050" cap="flat" cmpd="sng" algn="ctr">
+        <a:solidFill>
+          <a:schemeClr val="phClr"/>
+        </a:solidFill>
+        <a:prstDash val="solid"/>
+        <a:miter lim="800000"/>
+      </a:ln>
+    </a:lnStyleLst>
+    <a:effectStyleLst>
+      <a:effectStyle>
+        <a:effectLst/>
+      </a:effectStyle>
+      <a:effectStyle>
+        <a:effectLst/>
+      </a:effectStyle>
+      <a:effectStyle>
+        <a:effectLst>
+          <a:outerShdw blurRad="57150" dist="19050" dir="5400000" algn="ctr" rotWithShape="0">
+            <a:srgbClr val="000000">
+              <a:alpha val="63000"/>
+            </a:srgbClr>
+          </a:outerShdw>
+        </a:effectLst>
+      </a:effectStyle>
+    </a:effectStyleLst>
+    <a:bgFillStyleLst>
+      <a:solidFill>
+        <a:schemeClr val="phClr"/>
+      </a:solidFill>
+      <a:solidFill>
+        <a:schemeClr val="phClr">
+          <a:tint val="95000"/>
+          <a:satMod val="170000"/>
+        </a:schemeClr>
+      </a:solidFill>
+      <a:gradFill rotWithShape="1">
+        <a:gsLst>
+          <a:gs pos="0">
+            <a:schemeClr val="phClr">
+              <a:tint val="93000"/>
+              <a:satMod val="150000"/>
+              <a:shade val="98000"/>
+              <a:lumMod val="102000"/>
+            </a:schemeClr>
+          </a:gs>
+          <a:gs pos="50000">
+            <a:schemeClr val="phClr">
+              <a:tint val="98000"/>
+              <a:satMod val="130000"/>
+              <a:shade val="90000"/>
+              <a:lumMod val="103000"/>
+            </a:schemeClr>
+          </a:gs>
+          <a:gs pos="100000">
+            <a:schemeClr val="phClr">
+              <a:shade val="63000"/>
+              <a:satMod val="120000"/>
+            </a:schemeClr>
+          </a:gs>
+        </a:gsLst>
+        <a:lin ang="5400000" scaled="0"/>
+      </a:gradFill>
+    </a:bgFillStyleLst>
+  </a:fmtScheme>
+</a:themeOverride>
+</file>
+
 <file path=customXml/item1.xml><?xml version="1.0" encoding="utf-8"?>
+<p:properties xmlns:p="http://schemas.microsoft.com/office/2006/metadata/properties" xmlns:xsi="http://www.w3.org/2001/XMLSchema-instance" xmlns:pc="http://schemas.microsoft.com/office/infopath/2007/PartnerControls">
+  <documentManagement/>
+</p:properties>
+</file>
+
+<file path=customXml/item2.xml><?xml version="1.0" encoding="utf-8"?>
+<?mso-contentType ?>
+<FormTemplates xmlns="http://schemas.microsoft.com/sharepoint/v3/contenttype/forms">
+  <Display>DocumentLibraryForm</Display>
+  <Edit>DocumentLibraryForm</Edit>
+  <New>DocumentLibraryForm</New>
+</FormTemplates>
+</file>
+
+<file path=customXml/item3.xml><?xml version="1.0" encoding="utf-8"?>
 <ct:contentTypeSchema xmlns:ct="http://schemas.microsoft.com/office/2006/metadata/contentType" xmlns:ma="http://schemas.microsoft.com/office/2006/metadata/properties/metaAttributes" ct:_="" ma:_="" ma:contentTypeName="Documento" ma:contentTypeID="0x010100081710BB376E7941914DCE66FEA91E1F" ma:contentTypeVersion="10" ma:contentTypeDescription="Crie um novo documento." ma:contentTypeScope="" ma:versionID="58913e177e8a955f1d199717620b7ded">
   <xsd:schema xmlns:xsd="http://www.w3.org/2001/XMLSchema" xmlns:xs="http://www.w3.org/2001/XMLSchema" xmlns:p="http://schemas.microsoft.com/office/2006/metadata/properties" xmlns:ns3="f62671e9-89eb-4f99-a5f6-db3359988c00" xmlns:ns4="4134815b-eabf-46ac-844d-9b0690bd8711" targetNamespace="http://schemas.microsoft.com/office/2006/metadata/properties" ma:root="true" ma:fieldsID="8959957db32c8c64e0ce54d1c5e443a9" ns3:_="" ns4:_="">
     <xsd:import namespace="f62671e9-89eb-4f99-a5f6-db3359988c00"/>
@@ -4428,22 +5870,32 @@
 </ct:contentTypeSchema>
 </file>
 
-<file path=customXml/item2.xml><?xml version="1.0" encoding="utf-8"?>
-<?mso-contentType ?>
-<FormTemplates xmlns="http://schemas.microsoft.com/sharepoint/v3/contenttype/forms">
-  <Display>DocumentLibraryForm</Display>
-  <Edit>DocumentLibraryForm</Edit>
-  <New>DocumentLibraryForm</New>
-</FormTemplates>
+<file path=customXml/itemProps1.xml><?xml version="1.0" encoding="utf-8"?>
+<ds:datastoreItem xmlns:ds="http://schemas.openxmlformats.org/officeDocument/2006/customXml" ds:itemID="{EF9B0293-AE68-4754-86B7-17138D7CE134}">
+  <ds:schemaRefs>
+    <ds:schemaRef ds:uri="http://schemas.openxmlformats.org/package/2006/metadata/core-properties"/>
+    <ds:schemaRef ds:uri="http://purl.org/dc/elements/1.1/"/>
+    <ds:schemaRef ds:uri="http://schemas.microsoft.com/office/2006/metadata/properties"/>
+    <ds:schemaRef ds:uri="http://schemas.microsoft.com/office/2006/documentManagement/types"/>
+    <ds:schemaRef ds:uri="f62671e9-89eb-4f99-a5f6-db3359988c00"/>
+    <ds:schemaRef ds:uri="http://www.w3.org/XML/1998/namespace"/>
+    <ds:schemaRef ds:uri="http://purl.org/dc/terms/"/>
+    <ds:schemaRef ds:uri="http://schemas.microsoft.com/office/infopath/2007/PartnerControls"/>
+    <ds:schemaRef ds:uri="4134815b-eabf-46ac-844d-9b0690bd8711"/>
+    <ds:schemaRef ds:uri="http://purl.org/dc/dcmitype/"/>
+  </ds:schemaRefs>
+</ds:datastoreItem>
 </file>
 
-<file path=customXml/item3.xml><?xml version="1.0" encoding="utf-8"?>
-<p:properties xmlns:p="http://schemas.microsoft.com/office/2006/metadata/properties" xmlns:xsi="http://www.w3.org/2001/XMLSchema-instance" xmlns:pc="http://schemas.microsoft.com/office/infopath/2007/PartnerControls">
-  <documentManagement/>
-</p:properties>
+<file path=customXml/itemProps2.xml><?xml version="1.0" encoding="utf-8"?>
+<ds:datastoreItem xmlns:ds="http://schemas.openxmlformats.org/officeDocument/2006/customXml" ds:itemID="{8B91528D-EFA8-4E4A-B420-BD2A0D21BF73}">
+  <ds:schemaRefs>
+    <ds:schemaRef ds:uri="http://schemas.microsoft.com/sharepoint/v3/contenttype/forms"/>
+  </ds:schemaRefs>
+</ds:datastoreItem>
 </file>
 
-<file path=customXml/itemProps1.xml><?xml version="1.0" encoding="utf-8"?>
+<file path=customXml/itemProps3.xml><?xml version="1.0" encoding="utf-8"?>
 <ds:datastoreItem xmlns:ds="http://schemas.openxmlformats.org/officeDocument/2006/customXml" ds:itemID="{8C35DC09-B6BC-4815-8006-072362A6FB71}">
   <ds:schemaRefs>
     <ds:schemaRef ds:uri="http://schemas.microsoft.com/office/2006/metadata/contentType"/>
@@ -4460,29 +5912,4 @@
     <ds:schemaRef ds:uri="http://schemas.microsoft.com/internal/obd"/>
   </ds:schemaRefs>
 </ds:datastoreItem>
-</file>
-
-<file path=customXml/itemProps2.xml><?xml version="1.0" encoding="utf-8"?>
-<ds:datastoreItem xmlns:ds="http://schemas.openxmlformats.org/officeDocument/2006/customXml" ds:itemID="{8B91528D-EFA8-4E4A-B420-BD2A0D21BF73}">
-  <ds:schemaRefs>
-    <ds:schemaRef ds:uri="http://schemas.microsoft.com/sharepoint/v3/contenttype/forms"/>
-  </ds:schemaRefs>
-</ds:datastoreItem>
-</file>
-
-<file path=customXml/itemProps3.xml><?xml version="1.0" encoding="utf-8"?>
-<ds:datastoreItem xmlns:ds="http://schemas.openxmlformats.org/officeDocument/2006/customXml" ds:itemID="{EF9B0293-AE68-4754-86B7-17138D7CE134}">
-  <ds:schemaRefs>
-    <ds:schemaRef ds:uri="http://schemas.openxmlformats.org/package/2006/metadata/core-properties"/>
-    <ds:schemaRef ds:uri="http://purl.org/dc/elements/1.1/"/>
-    <ds:schemaRef ds:uri="http://schemas.microsoft.com/office/2006/metadata/properties"/>
-    <ds:schemaRef ds:uri="http://schemas.microsoft.com/office/2006/documentManagement/types"/>
-    <ds:schemaRef ds:uri="f62671e9-89eb-4f99-a5f6-db3359988c00"/>
-    <ds:schemaRef ds:uri="http://www.w3.org/XML/1998/namespace"/>
-    <ds:schemaRef ds:uri="http://purl.org/dc/terms/"/>
-    <ds:schemaRef ds:uri="http://schemas.microsoft.com/office/infopath/2007/PartnerControls"/>
-    <ds:schemaRef ds:uri="4134815b-eabf-46ac-844d-9b0690bd8711"/>
-    <ds:schemaRef ds:uri="http://purl.org/dc/dcmitype/"/>
-  </ds:schemaRefs>
-</ds:datastoreItem>
 </file>
</xml_diff>

<commit_message>
Atualizando a figura, tabela e parte do texto referentes ao caso de estudo
</commit_message>
<xml_diff>
--- a/Figures/CSB.pptx
+++ b/Figures/CSB.pptx
@@ -7,6 +7,7 @@
   <p:sldIdLst>
     <p:sldId id="256" r:id="rId5"/>
     <p:sldId id="257" r:id="rId6"/>
+    <p:sldId id="258" r:id="rId7"/>
   </p:sldIdLst>
   <p:sldSz cx="8999538" cy="6858000"/>
   <p:notesSz cx="6858000" cy="9144000"/>
@@ -1251,7 +1252,7 @@
           <a:p>
             <a:fld id="{8CC99A7E-B1AE-4506-A2DA-CB18CF0C56CD}" type="datetimeFigureOut">
               <a:rPr lang="en-US" smtClean="0"/>
-              <a:t>3/4/2022</a:t>
+              <a:t>3/5/2022</a:t>
             </a:fld>
             <a:endParaRPr lang="en-US"/>
           </a:p>
@@ -1421,7 +1422,7 @@
           <a:p>
             <a:fld id="{8CC99A7E-B1AE-4506-A2DA-CB18CF0C56CD}" type="datetimeFigureOut">
               <a:rPr lang="en-US" smtClean="0"/>
-              <a:t>3/4/2022</a:t>
+              <a:t>3/5/2022</a:t>
             </a:fld>
             <a:endParaRPr lang="en-US"/>
           </a:p>
@@ -1601,7 +1602,7 @@
           <a:p>
             <a:fld id="{8CC99A7E-B1AE-4506-A2DA-CB18CF0C56CD}" type="datetimeFigureOut">
               <a:rPr lang="en-US" smtClean="0"/>
-              <a:t>3/4/2022</a:t>
+              <a:t>3/5/2022</a:t>
             </a:fld>
             <a:endParaRPr lang="en-US"/>
           </a:p>
@@ -1771,7 +1772,7 @@
           <a:p>
             <a:fld id="{8CC99A7E-B1AE-4506-A2DA-CB18CF0C56CD}" type="datetimeFigureOut">
               <a:rPr lang="en-US" smtClean="0"/>
-              <a:t>3/4/2022</a:t>
+              <a:t>3/5/2022</a:t>
             </a:fld>
             <a:endParaRPr lang="en-US"/>
           </a:p>
@@ -2015,7 +2016,7 @@
           <a:p>
             <a:fld id="{8CC99A7E-B1AE-4506-A2DA-CB18CF0C56CD}" type="datetimeFigureOut">
               <a:rPr lang="en-US" smtClean="0"/>
-              <a:t>3/4/2022</a:t>
+              <a:t>3/5/2022</a:t>
             </a:fld>
             <a:endParaRPr lang="en-US"/>
           </a:p>
@@ -2247,7 +2248,7 @@
           <a:p>
             <a:fld id="{8CC99A7E-B1AE-4506-A2DA-CB18CF0C56CD}" type="datetimeFigureOut">
               <a:rPr lang="en-US" smtClean="0"/>
-              <a:t>3/4/2022</a:t>
+              <a:t>3/5/2022</a:t>
             </a:fld>
             <a:endParaRPr lang="en-US"/>
           </a:p>
@@ -2614,7 +2615,7 @@
           <a:p>
             <a:fld id="{8CC99A7E-B1AE-4506-A2DA-CB18CF0C56CD}" type="datetimeFigureOut">
               <a:rPr lang="en-US" smtClean="0"/>
-              <a:t>3/4/2022</a:t>
+              <a:t>3/5/2022</a:t>
             </a:fld>
             <a:endParaRPr lang="en-US"/>
           </a:p>
@@ -2732,7 +2733,7 @@
           <a:p>
             <a:fld id="{8CC99A7E-B1AE-4506-A2DA-CB18CF0C56CD}" type="datetimeFigureOut">
               <a:rPr lang="en-US" smtClean="0"/>
-              <a:t>3/4/2022</a:t>
+              <a:t>3/5/2022</a:t>
             </a:fld>
             <a:endParaRPr lang="en-US"/>
           </a:p>
@@ -2827,7 +2828,7 @@
           <a:p>
             <a:fld id="{8CC99A7E-B1AE-4506-A2DA-CB18CF0C56CD}" type="datetimeFigureOut">
               <a:rPr lang="en-US" smtClean="0"/>
-              <a:t>3/4/2022</a:t>
+              <a:t>3/5/2022</a:t>
             </a:fld>
             <a:endParaRPr lang="en-US"/>
           </a:p>
@@ -3104,7 +3105,7 @@
           <a:p>
             <a:fld id="{8CC99A7E-B1AE-4506-A2DA-CB18CF0C56CD}" type="datetimeFigureOut">
               <a:rPr lang="en-US" smtClean="0"/>
-              <a:t>3/4/2022</a:t>
+              <a:t>3/5/2022</a:t>
             </a:fld>
             <a:endParaRPr lang="en-US"/>
           </a:p>
@@ -3361,7 +3362,7 @@
           <a:p>
             <a:fld id="{8CC99A7E-B1AE-4506-A2DA-CB18CF0C56CD}" type="datetimeFigureOut">
               <a:rPr lang="en-US" smtClean="0"/>
-              <a:t>3/4/2022</a:t>
+              <a:t>3/5/2022</a:t>
             </a:fld>
             <a:endParaRPr lang="en-US"/>
           </a:p>
@@ -3574,7 +3575,7 @@
           <a:p>
             <a:fld id="{8CC99A7E-B1AE-4506-A2DA-CB18CF0C56CD}" type="datetimeFigureOut">
               <a:rPr lang="en-US" smtClean="0"/>
-              <a:t>3/4/2022</a:t>
+              <a:t>3/5/2022</a:t>
             </a:fld>
             <a:endParaRPr lang="en-US"/>
           </a:p>
@@ -5105,6 +5106,2439 @@
 </p:sld>
 </file>
 
+<file path=ppt/slides/slide3.xml><?xml version="1.0" encoding="utf-8"?>
+<p:sld xmlns:a="http://schemas.openxmlformats.org/drawingml/2006/main" xmlns:r="http://schemas.openxmlformats.org/officeDocument/2006/relationships" xmlns:p="http://schemas.openxmlformats.org/presentationml/2006/main">
+  <p:cSld>
+    <p:spTree>
+      <p:nvGrpSpPr>
+        <p:cNvPr id="1" name=""/>
+        <p:cNvGrpSpPr/>
+        <p:nvPr/>
+      </p:nvGrpSpPr>
+      <p:grpSpPr>
+        <a:xfrm>
+          <a:off x="0" y="0"/>
+          <a:ext cx="0" cy="0"/>
+          <a:chOff x="0" y="0"/>
+          <a:chExt cx="0" cy="0"/>
+        </a:xfrm>
+      </p:grpSpPr>
+      <p:sp>
+        <p:nvSpPr>
+          <p:cNvPr id="59" name="Retângulo 58">
+            <a:extLst>
+              <a:ext uri="{FF2B5EF4-FFF2-40B4-BE49-F238E27FC236}">
+                <a16:creationId xmlns:a16="http://schemas.microsoft.com/office/drawing/2014/main" id="{D211BDF3-4B82-4D44-ABCC-8F8FF98B40A8}"/>
+              </a:ext>
+            </a:extLst>
+          </p:cNvPr>
+          <p:cNvSpPr/>
+          <p:nvPr/>
+        </p:nvSpPr>
+        <p:spPr>
+          <a:xfrm flipH="1">
+            <a:off x="3128732" y="4244176"/>
+            <a:ext cx="103994" cy="1586649"/>
+          </a:xfrm>
+          <a:prstGeom prst="rect">
+            <a:avLst/>
+          </a:prstGeom>
+          <a:solidFill>
+            <a:schemeClr val="tx1">
+              <a:lumMod val="50000"/>
+              <a:lumOff val="50000"/>
+            </a:schemeClr>
+          </a:solidFill>
+          <a:ln>
+            <a:noFill/>
+          </a:ln>
+        </p:spPr>
+        <p:style>
+          <a:lnRef idx="2">
+            <a:schemeClr val="accent1">
+              <a:shade val="50000"/>
+            </a:schemeClr>
+          </a:lnRef>
+          <a:fillRef idx="1">
+            <a:schemeClr val="accent1"/>
+          </a:fillRef>
+          <a:effectRef idx="0">
+            <a:schemeClr val="accent1"/>
+          </a:effectRef>
+          <a:fontRef idx="minor">
+            <a:schemeClr val="lt1"/>
+          </a:fontRef>
+        </p:style>
+        <p:txBody>
+          <a:bodyPr rtlCol="0" anchor="ctr"/>
+          <a:lstStyle/>
+          <a:p>
+            <a:pPr algn="ctr"/>
+            <a:endParaRPr lang="pt-BR"/>
+          </a:p>
+        </p:txBody>
+      </p:sp>
+      <p:sp>
+        <p:nvSpPr>
+          <p:cNvPr id="58" name="Retângulo 57">
+            <a:extLst>
+              <a:ext uri="{FF2B5EF4-FFF2-40B4-BE49-F238E27FC236}">
+                <a16:creationId xmlns:a16="http://schemas.microsoft.com/office/drawing/2014/main" id="{2BFBAE39-30BC-465A-8EEE-8F01596F21ED}"/>
+              </a:ext>
+            </a:extLst>
+          </p:cNvPr>
+          <p:cNvSpPr/>
+          <p:nvPr/>
+        </p:nvSpPr>
+        <p:spPr>
+          <a:xfrm flipH="1">
+            <a:off x="3089949" y="3450427"/>
+            <a:ext cx="155794" cy="897681"/>
+          </a:xfrm>
+          <a:prstGeom prst="rect">
+            <a:avLst/>
+          </a:prstGeom>
+          <a:solidFill>
+            <a:schemeClr val="tx1">
+              <a:lumMod val="50000"/>
+              <a:lumOff val="50000"/>
+            </a:schemeClr>
+          </a:solidFill>
+          <a:ln>
+            <a:noFill/>
+          </a:ln>
+        </p:spPr>
+        <p:style>
+          <a:lnRef idx="2">
+            <a:schemeClr val="accent1">
+              <a:shade val="50000"/>
+            </a:schemeClr>
+          </a:lnRef>
+          <a:fillRef idx="1">
+            <a:schemeClr val="accent1"/>
+          </a:fillRef>
+          <a:effectRef idx="0">
+            <a:schemeClr val="accent1"/>
+          </a:effectRef>
+          <a:fontRef idx="minor">
+            <a:schemeClr val="lt1"/>
+          </a:fontRef>
+        </p:style>
+        <p:txBody>
+          <a:bodyPr rtlCol="0" anchor="ctr"/>
+          <a:lstStyle/>
+          <a:p>
+            <a:pPr algn="ctr"/>
+            <a:endParaRPr lang="pt-BR"/>
+          </a:p>
+        </p:txBody>
+      </p:sp>
+      <p:sp>
+        <p:nvSpPr>
+          <p:cNvPr id="5" name="Retângulo 4">
+            <a:extLst>
+              <a:ext uri="{FF2B5EF4-FFF2-40B4-BE49-F238E27FC236}">
+                <a16:creationId xmlns:a16="http://schemas.microsoft.com/office/drawing/2014/main" id="{9C022F42-DB81-4A4F-A7D3-671F10BCACC3}"/>
+              </a:ext>
+            </a:extLst>
+          </p:cNvPr>
+          <p:cNvSpPr/>
+          <p:nvPr/>
+        </p:nvSpPr>
+        <p:spPr>
+          <a:xfrm flipH="1">
+            <a:off x="2924220" y="2555882"/>
+            <a:ext cx="155794" cy="278586"/>
+          </a:xfrm>
+          <a:prstGeom prst="rect">
+            <a:avLst/>
+          </a:prstGeom>
+          <a:solidFill>
+            <a:schemeClr val="tx1">
+              <a:lumMod val="50000"/>
+              <a:lumOff val="50000"/>
+            </a:schemeClr>
+          </a:solidFill>
+          <a:ln>
+            <a:noFill/>
+          </a:ln>
+        </p:spPr>
+        <p:style>
+          <a:lnRef idx="2">
+            <a:schemeClr val="accent1">
+              <a:shade val="50000"/>
+            </a:schemeClr>
+          </a:lnRef>
+          <a:fillRef idx="1">
+            <a:schemeClr val="accent1"/>
+          </a:fillRef>
+          <a:effectRef idx="0">
+            <a:schemeClr val="accent1"/>
+          </a:effectRef>
+          <a:fontRef idx="minor">
+            <a:schemeClr val="lt1"/>
+          </a:fontRef>
+        </p:style>
+        <p:txBody>
+          <a:bodyPr rtlCol="0" anchor="ctr"/>
+          <a:lstStyle/>
+          <a:p>
+            <a:pPr algn="ctr"/>
+            <a:endParaRPr lang="pt-BR"/>
+          </a:p>
+        </p:txBody>
+      </p:sp>
+      <p:sp>
+        <p:nvSpPr>
+          <p:cNvPr id="22" name="CaixaDeTexto 21">
+            <a:extLst>
+              <a:ext uri="{FF2B5EF4-FFF2-40B4-BE49-F238E27FC236}">
+                <a16:creationId xmlns:a16="http://schemas.microsoft.com/office/drawing/2014/main" id="{C0297C74-6EF4-48B9-B68F-B23EE5EDDFFC}"/>
+              </a:ext>
+            </a:extLst>
+          </p:cNvPr>
+          <p:cNvSpPr txBox="1"/>
+          <p:nvPr/>
+        </p:nvSpPr>
+        <p:spPr>
+          <a:xfrm>
+            <a:off x="4518369" y="1272602"/>
+            <a:ext cx="3015569" cy="646331"/>
+          </a:xfrm>
+          <a:prstGeom prst="rect">
+            <a:avLst/>
+          </a:prstGeom>
+          <a:noFill/>
+        </p:spPr>
+        <p:txBody>
+          <a:bodyPr wrap="none" rtlCol="0">
+            <a:spAutoFit/>
+          </a:bodyPr>
+          <a:lstStyle/>
+          <a:p>
+            <a:r>
+              <a:rPr lang="pt-BR" dirty="0"/>
+              <a:t>400,00 m 20” – H40, 94 </a:t>
+            </a:r>
+            <a:r>
+              <a:rPr lang="pt-BR" dirty="0" err="1"/>
+              <a:t>lb</a:t>
+            </a:r>
+            <a:r>
+              <a:rPr lang="pt-BR" dirty="0"/>
+              <a:t>/</a:t>
+            </a:r>
+            <a:r>
+              <a:rPr lang="pt-BR" dirty="0" err="1"/>
+              <a:t>ft</a:t>
+            </a:r>
+            <a:r>
+              <a:rPr lang="pt-BR" dirty="0"/>
+              <a:t>   </a:t>
+            </a:r>
+            <a:br>
+              <a:rPr lang="pt-BR" dirty="0"/>
+            </a:br>
+            <a:r>
+              <a:rPr lang="pt-BR" dirty="0"/>
+              <a:t>Revestimento Condutor</a:t>
+            </a:r>
+          </a:p>
+        </p:txBody>
+      </p:sp>
+      <p:sp>
+        <p:nvSpPr>
+          <p:cNvPr id="23" name="CaixaDeTexto 22">
+            <a:extLst>
+              <a:ext uri="{FF2B5EF4-FFF2-40B4-BE49-F238E27FC236}">
+                <a16:creationId xmlns:a16="http://schemas.microsoft.com/office/drawing/2014/main" id="{DD04A7C1-8A91-4849-BE96-23A72A02852B}"/>
+              </a:ext>
+            </a:extLst>
+          </p:cNvPr>
+          <p:cNvSpPr txBox="1"/>
+          <p:nvPr/>
+        </p:nvSpPr>
+        <p:spPr>
+          <a:xfrm>
+            <a:off x="4162173" y="2448621"/>
+            <a:ext cx="3326552" cy="646331"/>
+          </a:xfrm>
+          <a:prstGeom prst="rect">
+            <a:avLst/>
+          </a:prstGeom>
+          <a:noFill/>
+        </p:spPr>
+        <p:txBody>
+          <a:bodyPr wrap="none" rtlCol="0">
+            <a:spAutoFit/>
+          </a:bodyPr>
+          <a:lstStyle/>
+          <a:p>
+            <a:r>
+              <a:rPr lang="pt-BR" dirty="0"/>
+              <a:t>1400,00 m 13 3/8” – K55, 61 </a:t>
+            </a:r>
+            <a:r>
+              <a:rPr lang="pt-BR" dirty="0" err="1"/>
+              <a:t>lb</a:t>
+            </a:r>
+            <a:r>
+              <a:rPr lang="pt-BR" dirty="0"/>
+              <a:t>/</a:t>
+            </a:r>
+            <a:r>
+              <a:rPr lang="pt-BR" dirty="0" err="1"/>
+              <a:t>ft</a:t>
+            </a:r>
+            <a:endParaRPr lang="pt-BR" dirty="0"/>
+          </a:p>
+          <a:p>
+            <a:r>
+              <a:rPr lang="pt-BR" dirty="0"/>
+              <a:t>Revestimento de Superfície</a:t>
+            </a:r>
+          </a:p>
+        </p:txBody>
+      </p:sp>
+      <p:sp>
+        <p:nvSpPr>
+          <p:cNvPr id="24" name="CaixaDeTexto 23">
+            <a:extLst>
+              <a:ext uri="{FF2B5EF4-FFF2-40B4-BE49-F238E27FC236}">
+                <a16:creationId xmlns:a16="http://schemas.microsoft.com/office/drawing/2014/main" id="{D4B019DE-79EB-41CF-B8B4-6B72738757EB}"/>
+              </a:ext>
+            </a:extLst>
+          </p:cNvPr>
+          <p:cNvSpPr txBox="1"/>
+          <p:nvPr/>
+        </p:nvSpPr>
+        <p:spPr>
+          <a:xfrm>
+            <a:off x="3911205" y="3708954"/>
+            <a:ext cx="2836033" cy="646331"/>
+          </a:xfrm>
+          <a:prstGeom prst="rect">
+            <a:avLst/>
+          </a:prstGeom>
+          <a:noFill/>
+        </p:spPr>
+        <p:txBody>
+          <a:bodyPr wrap="none" rtlCol="0">
+            <a:spAutoFit/>
+          </a:bodyPr>
+          <a:lstStyle/>
+          <a:p>
+            <a:r>
+              <a:rPr lang="pt-BR" dirty="0"/>
+              <a:t>2400,00 m 7” – C75, 20 </a:t>
+            </a:r>
+            <a:r>
+              <a:rPr lang="pt-BR" dirty="0" err="1"/>
+              <a:t>lb</a:t>
+            </a:r>
+            <a:r>
+              <a:rPr lang="pt-BR" dirty="0"/>
+              <a:t>/</a:t>
+            </a:r>
+            <a:r>
+              <a:rPr lang="pt-BR" dirty="0" err="1"/>
+              <a:t>ft</a:t>
+            </a:r>
+            <a:br>
+              <a:rPr lang="pt-BR" dirty="0"/>
+            </a:br>
+            <a:r>
+              <a:rPr lang="pt-BR" dirty="0"/>
+              <a:t>Revestimento Intermediário</a:t>
+            </a:r>
+          </a:p>
+        </p:txBody>
+      </p:sp>
+      <p:sp>
+        <p:nvSpPr>
+          <p:cNvPr id="25" name="Retângulo 24">
+            <a:extLst>
+              <a:ext uri="{FF2B5EF4-FFF2-40B4-BE49-F238E27FC236}">
+                <a16:creationId xmlns:a16="http://schemas.microsoft.com/office/drawing/2014/main" id="{A3D6F606-A16C-445E-B74E-EDA1FE549F2C}"/>
+              </a:ext>
+            </a:extLst>
+          </p:cNvPr>
+          <p:cNvSpPr/>
+          <p:nvPr/>
+        </p:nvSpPr>
+        <p:spPr>
+          <a:xfrm flipH="1">
+            <a:off x="2754258" y="1328728"/>
+            <a:ext cx="155268" cy="1504945"/>
+          </a:xfrm>
+          <a:prstGeom prst="rect">
+            <a:avLst/>
+          </a:prstGeom>
+          <a:solidFill>
+            <a:schemeClr val="tx1">
+              <a:lumMod val="50000"/>
+              <a:lumOff val="50000"/>
+            </a:schemeClr>
+          </a:solidFill>
+          <a:ln>
+            <a:noFill/>
+          </a:ln>
+        </p:spPr>
+        <p:style>
+          <a:lnRef idx="2">
+            <a:schemeClr val="accent1">
+              <a:shade val="50000"/>
+            </a:schemeClr>
+          </a:lnRef>
+          <a:fillRef idx="1">
+            <a:schemeClr val="accent1"/>
+          </a:fillRef>
+          <a:effectRef idx="0">
+            <a:schemeClr val="accent1"/>
+          </a:effectRef>
+          <a:fontRef idx="minor">
+            <a:schemeClr val="lt1"/>
+          </a:fontRef>
+        </p:style>
+        <p:txBody>
+          <a:bodyPr rtlCol="0" anchor="ctr"/>
+          <a:lstStyle/>
+          <a:p>
+            <a:pPr algn="ctr"/>
+            <a:endParaRPr lang="pt-BR"/>
+          </a:p>
+        </p:txBody>
+      </p:sp>
+      <p:sp>
+        <p:nvSpPr>
+          <p:cNvPr id="26" name="Retângulo 25">
+            <a:extLst>
+              <a:ext uri="{FF2B5EF4-FFF2-40B4-BE49-F238E27FC236}">
+                <a16:creationId xmlns:a16="http://schemas.microsoft.com/office/drawing/2014/main" id="{E014B2A3-4882-4B6D-8F23-62B43EBA39A5}"/>
+              </a:ext>
+            </a:extLst>
+          </p:cNvPr>
+          <p:cNvSpPr/>
+          <p:nvPr/>
+        </p:nvSpPr>
+        <p:spPr>
+          <a:xfrm flipH="1">
+            <a:off x="2449466" y="1309681"/>
+            <a:ext cx="304793" cy="171442"/>
+          </a:xfrm>
+          <a:prstGeom prst="rect">
+            <a:avLst/>
+          </a:prstGeom>
+          <a:solidFill>
+            <a:schemeClr val="tx1">
+              <a:lumMod val="50000"/>
+              <a:lumOff val="50000"/>
+            </a:schemeClr>
+          </a:solidFill>
+          <a:ln>
+            <a:noFill/>
+          </a:ln>
+        </p:spPr>
+        <p:style>
+          <a:lnRef idx="2">
+            <a:schemeClr val="accent1">
+              <a:shade val="50000"/>
+            </a:schemeClr>
+          </a:lnRef>
+          <a:fillRef idx="1">
+            <a:schemeClr val="accent1"/>
+          </a:fillRef>
+          <a:effectRef idx="0">
+            <a:schemeClr val="accent1"/>
+          </a:effectRef>
+          <a:fontRef idx="minor">
+            <a:schemeClr val="lt1"/>
+          </a:fontRef>
+        </p:style>
+        <p:txBody>
+          <a:bodyPr rtlCol="0" anchor="ctr"/>
+          <a:lstStyle/>
+          <a:p>
+            <a:pPr algn="ctr"/>
+            <a:endParaRPr lang="pt-BR"/>
+          </a:p>
+        </p:txBody>
+      </p:sp>
+      <p:sp>
+        <p:nvSpPr>
+          <p:cNvPr id="27" name="Retângulo 26">
+            <a:extLst>
+              <a:ext uri="{FF2B5EF4-FFF2-40B4-BE49-F238E27FC236}">
+                <a16:creationId xmlns:a16="http://schemas.microsoft.com/office/drawing/2014/main" id="{B283EE36-2066-4737-9D32-9594201FFCBE}"/>
+              </a:ext>
+            </a:extLst>
+          </p:cNvPr>
+          <p:cNvSpPr/>
+          <p:nvPr/>
+        </p:nvSpPr>
+        <p:spPr>
+          <a:xfrm flipH="1">
+            <a:off x="3020038" y="2552706"/>
+            <a:ext cx="49493" cy="1795445"/>
+          </a:xfrm>
+          <a:prstGeom prst="rect">
+            <a:avLst/>
+          </a:prstGeom>
+          <a:solidFill>
+            <a:schemeClr val="tx1">
+              <a:lumMod val="50000"/>
+              <a:lumOff val="50000"/>
+            </a:schemeClr>
+          </a:solidFill>
+          <a:ln>
+            <a:noFill/>
+          </a:ln>
+        </p:spPr>
+        <p:style>
+          <a:lnRef idx="2">
+            <a:schemeClr val="accent1">
+              <a:shade val="50000"/>
+            </a:schemeClr>
+          </a:lnRef>
+          <a:fillRef idx="1">
+            <a:schemeClr val="accent1"/>
+          </a:fillRef>
+          <a:effectRef idx="0">
+            <a:schemeClr val="accent1"/>
+          </a:effectRef>
+          <a:fontRef idx="minor">
+            <a:schemeClr val="lt1"/>
+          </a:fontRef>
+        </p:style>
+        <p:txBody>
+          <a:bodyPr rtlCol="0" anchor="ctr"/>
+          <a:lstStyle/>
+          <a:p>
+            <a:pPr algn="ctr"/>
+            <a:endParaRPr lang="pt-BR"/>
+          </a:p>
+        </p:txBody>
+      </p:sp>
+      <p:cxnSp>
+        <p:nvCxnSpPr>
+          <p:cNvPr id="28" name="Conector reto 27">
+            <a:extLst>
+              <a:ext uri="{FF2B5EF4-FFF2-40B4-BE49-F238E27FC236}">
+                <a16:creationId xmlns:a16="http://schemas.microsoft.com/office/drawing/2014/main" id="{3C642421-486C-42BD-896D-364CD845AD17}"/>
+              </a:ext>
+            </a:extLst>
+          </p:cNvPr>
+          <p:cNvCxnSpPr>
+            <a:cxnSpLocks/>
+          </p:cNvCxnSpPr>
+          <p:nvPr/>
+        </p:nvCxnSpPr>
+        <p:spPr>
+          <a:xfrm flipH="1">
+            <a:off x="3085740" y="1328729"/>
+            <a:ext cx="0" cy="3019425"/>
+          </a:xfrm>
+          <a:prstGeom prst="line">
+            <a:avLst/>
+          </a:prstGeom>
+          <a:ln w="38100">
+            <a:solidFill>
+              <a:srgbClr val="780000"/>
+            </a:solidFill>
+          </a:ln>
+        </p:spPr>
+        <p:style>
+          <a:lnRef idx="1">
+            <a:schemeClr val="accent2"/>
+          </a:lnRef>
+          <a:fillRef idx="0">
+            <a:schemeClr val="accent2"/>
+          </a:fillRef>
+          <a:effectRef idx="0">
+            <a:schemeClr val="accent2"/>
+          </a:effectRef>
+          <a:fontRef idx="minor">
+            <a:schemeClr val="tx1"/>
+          </a:fontRef>
+        </p:style>
+      </p:cxnSp>
+      <p:cxnSp>
+        <p:nvCxnSpPr>
+          <p:cNvPr id="29" name="Conector reto 28">
+            <a:extLst>
+              <a:ext uri="{FF2B5EF4-FFF2-40B4-BE49-F238E27FC236}">
+                <a16:creationId xmlns:a16="http://schemas.microsoft.com/office/drawing/2014/main" id="{5A781FAA-EC62-4818-84CC-AAEC8F5B290A}"/>
+              </a:ext>
+            </a:extLst>
+          </p:cNvPr>
+          <p:cNvCxnSpPr>
+            <a:cxnSpLocks/>
+          </p:cNvCxnSpPr>
+          <p:nvPr/>
+        </p:nvCxnSpPr>
+        <p:spPr>
+          <a:xfrm flipH="1">
+            <a:off x="2909527" y="1328729"/>
+            <a:ext cx="0" cy="1504950"/>
+          </a:xfrm>
+          <a:prstGeom prst="line">
+            <a:avLst/>
+          </a:prstGeom>
+          <a:ln w="38100">
+            <a:solidFill>
+              <a:srgbClr val="780000"/>
+            </a:solidFill>
+          </a:ln>
+        </p:spPr>
+        <p:style>
+          <a:lnRef idx="1">
+            <a:schemeClr val="accent2"/>
+          </a:lnRef>
+          <a:fillRef idx="0">
+            <a:schemeClr val="accent2"/>
+          </a:fillRef>
+          <a:effectRef idx="0">
+            <a:schemeClr val="accent2"/>
+          </a:effectRef>
+          <a:fontRef idx="minor">
+            <a:schemeClr val="tx1"/>
+          </a:fontRef>
+        </p:style>
+      </p:cxnSp>
+      <p:cxnSp>
+        <p:nvCxnSpPr>
+          <p:cNvPr id="30" name="Conector reto 29">
+            <a:extLst>
+              <a:ext uri="{FF2B5EF4-FFF2-40B4-BE49-F238E27FC236}">
+                <a16:creationId xmlns:a16="http://schemas.microsoft.com/office/drawing/2014/main" id="{A5C053BC-1542-42B9-8296-6D6347D807D1}"/>
+              </a:ext>
+            </a:extLst>
+          </p:cNvPr>
+          <p:cNvCxnSpPr>
+            <a:cxnSpLocks/>
+          </p:cNvCxnSpPr>
+          <p:nvPr/>
+        </p:nvCxnSpPr>
+        <p:spPr>
+          <a:xfrm flipH="1">
+            <a:off x="2623777" y="1328729"/>
+            <a:ext cx="0" cy="152400"/>
+          </a:xfrm>
+          <a:prstGeom prst="line">
+            <a:avLst/>
+          </a:prstGeom>
+          <a:ln w="38100">
+            <a:solidFill>
+              <a:srgbClr val="780000"/>
+            </a:solidFill>
+          </a:ln>
+        </p:spPr>
+        <p:style>
+          <a:lnRef idx="1">
+            <a:schemeClr val="accent2"/>
+          </a:lnRef>
+          <a:fillRef idx="0">
+            <a:schemeClr val="accent2"/>
+          </a:fillRef>
+          <a:effectRef idx="0">
+            <a:schemeClr val="accent2"/>
+          </a:effectRef>
+          <a:fontRef idx="minor">
+            <a:schemeClr val="tx1"/>
+          </a:fontRef>
+        </p:style>
+      </p:cxnSp>
+      <p:sp>
+        <p:nvSpPr>
+          <p:cNvPr id="31" name="Triângulo Retângulo 30">
+            <a:extLst>
+              <a:ext uri="{FF2B5EF4-FFF2-40B4-BE49-F238E27FC236}">
+                <a16:creationId xmlns:a16="http://schemas.microsoft.com/office/drawing/2014/main" id="{E2211230-3973-4D94-B751-F6F632248AC7}"/>
+              </a:ext>
+            </a:extLst>
+          </p:cNvPr>
+          <p:cNvSpPr/>
+          <p:nvPr/>
+        </p:nvSpPr>
+        <p:spPr>
+          <a:xfrm flipH="1">
+            <a:off x="2552339" y="1402548"/>
+            <a:ext cx="71438" cy="71438"/>
+          </a:xfrm>
+          <a:prstGeom prst="rtTriangle">
+            <a:avLst/>
+          </a:prstGeom>
+          <a:solidFill>
+            <a:srgbClr val="780000"/>
+          </a:solidFill>
+          <a:ln>
+            <a:solidFill>
+              <a:srgbClr val="780000"/>
+            </a:solidFill>
+          </a:ln>
+        </p:spPr>
+        <p:style>
+          <a:lnRef idx="2">
+            <a:schemeClr val="accent1">
+              <a:shade val="50000"/>
+            </a:schemeClr>
+          </a:lnRef>
+          <a:fillRef idx="1">
+            <a:schemeClr val="accent1"/>
+          </a:fillRef>
+          <a:effectRef idx="0">
+            <a:schemeClr val="accent1"/>
+          </a:effectRef>
+          <a:fontRef idx="minor">
+            <a:schemeClr val="lt1"/>
+          </a:fontRef>
+        </p:style>
+        <p:txBody>
+          <a:bodyPr rtlCol="0" anchor="ctr"/>
+          <a:lstStyle/>
+          <a:p>
+            <a:pPr algn="ctr"/>
+            <a:endParaRPr lang="pt-BR"/>
+          </a:p>
+        </p:txBody>
+      </p:sp>
+      <p:sp>
+        <p:nvSpPr>
+          <p:cNvPr id="32" name="Triângulo Retângulo 31">
+            <a:extLst>
+              <a:ext uri="{FF2B5EF4-FFF2-40B4-BE49-F238E27FC236}">
+                <a16:creationId xmlns:a16="http://schemas.microsoft.com/office/drawing/2014/main" id="{DDE9F869-1A94-487D-8D7D-878B1E598979}"/>
+              </a:ext>
+            </a:extLst>
+          </p:cNvPr>
+          <p:cNvSpPr/>
+          <p:nvPr/>
+        </p:nvSpPr>
+        <p:spPr>
+          <a:xfrm flipH="1">
+            <a:off x="2838089" y="2755097"/>
+            <a:ext cx="71438" cy="71438"/>
+          </a:xfrm>
+          <a:prstGeom prst="rtTriangle">
+            <a:avLst/>
+          </a:prstGeom>
+          <a:solidFill>
+            <a:srgbClr val="780000"/>
+          </a:solidFill>
+          <a:ln>
+            <a:solidFill>
+              <a:srgbClr val="780000"/>
+            </a:solidFill>
+          </a:ln>
+        </p:spPr>
+        <p:style>
+          <a:lnRef idx="2">
+            <a:schemeClr val="accent1">
+              <a:shade val="50000"/>
+            </a:schemeClr>
+          </a:lnRef>
+          <a:fillRef idx="1">
+            <a:schemeClr val="accent1"/>
+          </a:fillRef>
+          <a:effectRef idx="0">
+            <a:schemeClr val="accent1"/>
+          </a:effectRef>
+          <a:fontRef idx="minor">
+            <a:schemeClr val="lt1"/>
+          </a:fontRef>
+        </p:style>
+        <p:txBody>
+          <a:bodyPr rtlCol="0" anchor="ctr"/>
+          <a:lstStyle/>
+          <a:p>
+            <a:pPr algn="ctr"/>
+            <a:endParaRPr lang="pt-BR"/>
+          </a:p>
+        </p:txBody>
+      </p:sp>
+      <p:sp>
+        <p:nvSpPr>
+          <p:cNvPr id="33" name="Triângulo Retângulo 32">
+            <a:extLst>
+              <a:ext uri="{FF2B5EF4-FFF2-40B4-BE49-F238E27FC236}">
+                <a16:creationId xmlns:a16="http://schemas.microsoft.com/office/drawing/2014/main" id="{9A6FF1A9-226A-4AD4-B331-A20A22F5FC86}"/>
+              </a:ext>
+            </a:extLst>
+          </p:cNvPr>
+          <p:cNvSpPr/>
+          <p:nvPr/>
+        </p:nvSpPr>
+        <p:spPr>
+          <a:xfrm flipH="1">
+            <a:off x="3025743" y="4269573"/>
+            <a:ext cx="71438" cy="71438"/>
+          </a:xfrm>
+          <a:prstGeom prst="rtTriangle">
+            <a:avLst/>
+          </a:prstGeom>
+          <a:solidFill>
+            <a:srgbClr val="780000"/>
+          </a:solidFill>
+          <a:ln>
+            <a:solidFill>
+              <a:srgbClr val="780000"/>
+            </a:solidFill>
+          </a:ln>
+        </p:spPr>
+        <p:style>
+          <a:lnRef idx="2">
+            <a:schemeClr val="accent1">
+              <a:shade val="50000"/>
+            </a:schemeClr>
+          </a:lnRef>
+          <a:fillRef idx="1">
+            <a:schemeClr val="accent1"/>
+          </a:fillRef>
+          <a:effectRef idx="0">
+            <a:schemeClr val="accent1"/>
+          </a:effectRef>
+          <a:fontRef idx="minor">
+            <a:schemeClr val="lt1"/>
+          </a:fontRef>
+        </p:style>
+        <p:txBody>
+          <a:bodyPr rtlCol="0" anchor="ctr"/>
+          <a:lstStyle/>
+          <a:p>
+            <a:pPr algn="ctr"/>
+            <a:endParaRPr lang="pt-BR"/>
+          </a:p>
+        </p:txBody>
+      </p:sp>
+      <p:cxnSp>
+        <p:nvCxnSpPr>
+          <p:cNvPr id="34" name="Conector reto 33">
+            <a:extLst>
+              <a:ext uri="{FF2B5EF4-FFF2-40B4-BE49-F238E27FC236}">
+                <a16:creationId xmlns:a16="http://schemas.microsoft.com/office/drawing/2014/main" id="{EAF32D5D-0774-4CD2-9479-DD55509DD5B6}"/>
+              </a:ext>
+            </a:extLst>
+          </p:cNvPr>
+          <p:cNvCxnSpPr>
+            <a:cxnSpLocks/>
+          </p:cNvCxnSpPr>
+          <p:nvPr/>
+        </p:nvCxnSpPr>
+        <p:spPr>
+          <a:xfrm flipH="1">
+            <a:off x="2609489" y="1328729"/>
+            <a:ext cx="644072" cy="0"/>
+          </a:xfrm>
+          <a:prstGeom prst="line">
+            <a:avLst/>
+          </a:prstGeom>
+          <a:ln w="38100">
+            <a:solidFill>
+              <a:srgbClr val="780000"/>
+            </a:solidFill>
+          </a:ln>
+        </p:spPr>
+        <p:style>
+          <a:lnRef idx="1">
+            <a:schemeClr val="accent2"/>
+          </a:lnRef>
+          <a:fillRef idx="0">
+            <a:schemeClr val="accent2"/>
+          </a:fillRef>
+          <a:effectRef idx="0">
+            <a:schemeClr val="accent2"/>
+          </a:effectRef>
+          <a:fontRef idx="minor">
+            <a:schemeClr val="tx1"/>
+          </a:fontRef>
+        </p:style>
+      </p:cxnSp>
+      <p:cxnSp>
+        <p:nvCxnSpPr>
+          <p:cNvPr id="35" name="Conector reto 34">
+            <a:extLst>
+              <a:ext uri="{FF2B5EF4-FFF2-40B4-BE49-F238E27FC236}">
+                <a16:creationId xmlns:a16="http://schemas.microsoft.com/office/drawing/2014/main" id="{17AF566A-FD0F-41F8-9027-4130CE6138A4}"/>
+              </a:ext>
+            </a:extLst>
+          </p:cNvPr>
+          <p:cNvCxnSpPr>
+            <a:cxnSpLocks/>
+          </p:cNvCxnSpPr>
+          <p:nvPr/>
+        </p:nvCxnSpPr>
+        <p:spPr>
+          <a:xfrm flipH="1" flipV="1">
+            <a:off x="3020041" y="2833679"/>
+            <a:ext cx="0" cy="1519233"/>
+          </a:xfrm>
+          <a:prstGeom prst="line">
+            <a:avLst/>
+          </a:prstGeom>
+        </p:spPr>
+        <p:style>
+          <a:lnRef idx="1">
+            <a:schemeClr val="dk1"/>
+          </a:lnRef>
+          <a:fillRef idx="0">
+            <a:schemeClr val="dk1"/>
+          </a:fillRef>
+          <a:effectRef idx="0">
+            <a:schemeClr val="dk1"/>
+          </a:effectRef>
+          <a:fontRef idx="minor">
+            <a:schemeClr val="tx1"/>
+          </a:fontRef>
+        </p:style>
+      </p:cxnSp>
+      <p:cxnSp>
+        <p:nvCxnSpPr>
+          <p:cNvPr id="36" name="Conector reto 35">
+            <a:extLst>
+              <a:ext uri="{FF2B5EF4-FFF2-40B4-BE49-F238E27FC236}">
+                <a16:creationId xmlns:a16="http://schemas.microsoft.com/office/drawing/2014/main" id="{90B2AB2B-DEDE-4483-A064-7BAABFAD86B7}"/>
+              </a:ext>
+            </a:extLst>
+          </p:cNvPr>
+          <p:cNvCxnSpPr>
+            <a:cxnSpLocks/>
+          </p:cNvCxnSpPr>
+          <p:nvPr/>
+        </p:nvCxnSpPr>
+        <p:spPr>
+          <a:xfrm flipH="1" flipV="1">
+            <a:off x="2754258" y="1481124"/>
+            <a:ext cx="0" cy="1352549"/>
+          </a:xfrm>
+          <a:prstGeom prst="line">
+            <a:avLst/>
+          </a:prstGeom>
+        </p:spPr>
+        <p:style>
+          <a:lnRef idx="1">
+            <a:schemeClr val="dk1"/>
+          </a:lnRef>
+          <a:fillRef idx="0">
+            <a:schemeClr val="dk1"/>
+          </a:fillRef>
+          <a:effectRef idx="0">
+            <a:schemeClr val="dk1"/>
+          </a:effectRef>
+          <a:fontRef idx="minor">
+            <a:schemeClr val="tx1"/>
+          </a:fontRef>
+        </p:style>
+      </p:cxnSp>
+      <p:cxnSp>
+        <p:nvCxnSpPr>
+          <p:cNvPr id="37" name="Conector reto 36">
+            <a:extLst>
+              <a:ext uri="{FF2B5EF4-FFF2-40B4-BE49-F238E27FC236}">
+                <a16:creationId xmlns:a16="http://schemas.microsoft.com/office/drawing/2014/main" id="{8378DFD1-7B87-4F3D-A485-521860404179}"/>
+              </a:ext>
+            </a:extLst>
+          </p:cNvPr>
+          <p:cNvCxnSpPr>
+            <a:cxnSpLocks/>
+          </p:cNvCxnSpPr>
+          <p:nvPr/>
+        </p:nvCxnSpPr>
+        <p:spPr>
+          <a:xfrm flipV="1">
+            <a:off x="2445183" y="1481118"/>
+            <a:ext cx="309074" cy="5"/>
+          </a:xfrm>
+          <a:prstGeom prst="line">
+            <a:avLst/>
+          </a:prstGeom>
+        </p:spPr>
+        <p:style>
+          <a:lnRef idx="1">
+            <a:schemeClr val="dk1"/>
+          </a:lnRef>
+          <a:fillRef idx="0">
+            <a:schemeClr val="dk1"/>
+          </a:fillRef>
+          <a:effectRef idx="0">
+            <a:schemeClr val="dk1"/>
+          </a:effectRef>
+          <a:fontRef idx="minor">
+            <a:schemeClr val="tx1"/>
+          </a:fontRef>
+        </p:style>
+      </p:cxnSp>
+      <p:cxnSp>
+        <p:nvCxnSpPr>
+          <p:cNvPr id="38" name="Conector reto 37">
+            <a:extLst>
+              <a:ext uri="{FF2B5EF4-FFF2-40B4-BE49-F238E27FC236}">
+                <a16:creationId xmlns:a16="http://schemas.microsoft.com/office/drawing/2014/main" id="{D4B09859-4C41-411D-8632-366E32F04B2F}"/>
+              </a:ext>
+            </a:extLst>
+          </p:cNvPr>
+          <p:cNvCxnSpPr>
+            <a:cxnSpLocks/>
+          </p:cNvCxnSpPr>
+          <p:nvPr/>
+        </p:nvCxnSpPr>
+        <p:spPr>
+          <a:xfrm flipH="1" flipV="1">
+            <a:off x="2446596" y="1307301"/>
+            <a:ext cx="1" cy="180000"/>
+          </a:xfrm>
+          <a:prstGeom prst="line">
+            <a:avLst/>
+          </a:prstGeom>
+        </p:spPr>
+        <p:style>
+          <a:lnRef idx="1">
+            <a:schemeClr val="dk1"/>
+          </a:lnRef>
+          <a:fillRef idx="0">
+            <a:schemeClr val="dk1"/>
+          </a:fillRef>
+          <a:effectRef idx="0">
+            <a:schemeClr val="dk1"/>
+          </a:effectRef>
+          <a:fontRef idx="minor">
+            <a:schemeClr val="tx1"/>
+          </a:fontRef>
+        </p:style>
+      </p:cxnSp>
+      <p:cxnSp>
+        <p:nvCxnSpPr>
+          <p:cNvPr id="39" name="Conector reto 38">
+            <a:extLst>
+              <a:ext uri="{FF2B5EF4-FFF2-40B4-BE49-F238E27FC236}">
+                <a16:creationId xmlns:a16="http://schemas.microsoft.com/office/drawing/2014/main" id="{6BD8A26C-D4D0-4C13-9A85-D17C1349CAD6}"/>
+              </a:ext>
+            </a:extLst>
+          </p:cNvPr>
+          <p:cNvCxnSpPr>
+            <a:cxnSpLocks/>
+          </p:cNvCxnSpPr>
+          <p:nvPr/>
+        </p:nvCxnSpPr>
+        <p:spPr>
+          <a:xfrm flipV="1">
+            <a:off x="2747626" y="2833671"/>
+            <a:ext cx="273443" cy="1"/>
+          </a:xfrm>
+          <a:prstGeom prst="line">
+            <a:avLst/>
+          </a:prstGeom>
+        </p:spPr>
+        <p:style>
+          <a:lnRef idx="1">
+            <a:schemeClr val="dk1"/>
+          </a:lnRef>
+          <a:fillRef idx="0">
+            <a:schemeClr val="dk1"/>
+          </a:fillRef>
+          <a:effectRef idx="0">
+            <a:schemeClr val="dk1"/>
+          </a:effectRef>
+          <a:fontRef idx="minor">
+            <a:schemeClr val="tx1"/>
+          </a:fontRef>
+        </p:style>
+      </p:cxnSp>
+      <p:sp>
+        <p:nvSpPr>
+          <p:cNvPr id="41" name="CaixaDeTexto 40">
+            <a:extLst>
+              <a:ext uri="{FF2B5EF4-FFF2-40B4-BE49-F238E27FC236}">
+                <a16:creationId xmlns:a16="http://schemas.microsoft.com/office/drawing/2014/main" id="{981F2C70-B441-4B6E-98BD-38F7D5DCD39B}"/>
+              </a:ext>
+            </a:extLst>
+          </p:cNvPr>
+          <p:cNvSpPr txBox="1"/>
+          <p:nvPr/>
+        </p:nvSpPr>
+        <p:spPr>
+          <a:xfrm>
+            <a:off x="1145415" y="2385764"/>
+            <a:ext cx="1616020" cy="369332"/>
+          </a:xfrm>
+          <a:prstGeom prst="rect">
+            <a:avLst/>
+          </a:prstGeom>
+          <a:noFill/>
+        </p:spPr>
+        <p:txBody>
+          <a:bodyPr wrap="none" rtlCol="0">
+            <a:spAutoFit/>
+          </a:bodyPr>
+          <a:lstStyle/>
+          <a:p>
+            <a:r>
+              <a:rPr lang="pt-BR" dirty="0"/>
+              <a:t>TOC 1200,00 m</a:t>
+            </a:r>
+          </a:p>
+        </p:txBody>
+      </p:sp>
+      <p:cxnSp>
+        <p:nvCxnSpPr>
+          <p:cNvPr id="44" name="Conector reto 43">
+            <a:extLst>
+              <a:ext uri="{FF2B5EF4-FFF2-40B4-BE49-F238E27FC236}">
+                <a16:creationId xmlns:a16="http://schemas.microsoft.com/office/drawing/2014/main" id="{28D23DC9-304F-4C41-8E56-CA38B219F72D}"/>
+              </a:ext>
+            </a:extLst>
+          </p:cNvPr>
+          <p:cNvCxnSpPr>
+            <a:cxnSpLocks/>
+          </p:cNvCxnSpPr>
+          <p:nvPr/>
+        </p:nvCxnSpPr>
+        <p:spPr>
+          <a:xfrm>
+            <a:off x="3238140" y="1328728"/>
+            <a:ext cx="0" cy="4495796"/>
+          </a:xfrm>
+          <a:prstGeom prst="line">
+            <a:avLst/>
+          </a:prstGeom>
+          <a:ln w="38100">
+            <a:solidFill>
+              <a:srgbClr val="780000"/>
+            </a:solidFill>
+          </a:ln>
+        </p:spPr>
+        <p:style>
+          <a:lnRef idx="1">
+            <a:schemeClr val="accent2"/>
+          </a:lnRef>
+          <a:fillRef idx="0">
+            <a:schemeClr val="accent2"/>
+          </a:fillRef>
+          <a:effectRef idx="0">
+            <a:schemeClr val="accent2"/>
+          </a:effectRef>
+          <a:fontRef idx="minor">
+            <a:schemeClr val="tx1"/>
+          </a:fontRef>
+        </p:style>
+      </p:cxnSp>
+      <p:sp>
+        <p:nvSpPr>
+          <p:cNvPr id="45" name="Triângulo Retângulo 44">
+            <a:extLst>
+              <a:ext uri="{FF2B5EF4-FFF2-40B4-BE49-F238E27FC236}">
+                <a16:creationId xmlns:a16="http://schemas.microsoft.com/office/drawing/2014/main" id="{7917226A-1B49-4E9D-993E-0F11187DA296}"/>
+              </a:ext>
+            </a:extLst>
+          </p:cNvPr>
+          <p:cNvSpPr/>
+          <p:nvPr/>
+        </p:nvSpPr>
+        <p:spPr>
+          <a:xfrm flipH="1">
+            <a:off x="3177361" y="5750709"/>
+            <a:ext cx="71438" cy="71438"/>
+          </a:xfrm>
+          <a:prstGeom prst="rtTriangle">
+            <a:avLst/>
+          </a:prstGeom>
+          <a:solidFill>
+            <a:srgbClr val="780000"/>
+          </a:solidFill>
+          <a:ln>
+            <a:solidFill>
+              <a:srgbClr val="780000"/>
+            </a:solidFill>
+          </a:ln>
+        </p:spPr>
+        <p:style>
+          <a:lnRef idx="2">
+            <a:schemeClr val="accent1">
+              <a:shade val="50000"/>
+            </a:schemeClr>
+          </a:lnRef>
+          <a:fillRef idx="1">
+            <a:schemeClr val="accent1"/>
+          </a:fillRef>
+          <a:effectRef idx="0">
+            <a:schemeClr val="accent1"/>
+          </a:effectRef>
+          <a:fontRef idx="minor">
+            <a:schemeClr val="lt1"/>
+          </a:fontRef>
+        </p:style>
+        <p:txBody>
+          <a:bodyPr rtlCol="0" anchor="ctr"/>
+          <a:lstStyle/>
+          <a:p>
+            <a:pPr algn="ctr"/>
+            <a:endParaRPr lang="pt-BR"/>
+          </a:p>
+        </p:txBody>
+      </p:sp>
+      <p:cxnSp>
+        <p:nvCxnSpPr>
+          <p:cNvPr id="49" name="Conector reto 48">
+            <a:extLst>
+              <a:ext uri="{FF2B5EF4-FFF2-40B4-BE49-F238E27FC236}">
+                <a16:creationId xmlns:a16="http://schemas.microsoft.com/office/drawing/2014/main" id="{A6E40CA9-A92D-4AEF-BE8A-6E460D59CD7A}"/>
+              </a:ext>
+            </a:extLst>
+          </p:cNvPr>
+          <p:cNvCxnSpPr>
+            <a:cxnSpLocks/>
+          </p:cNvCxnSpPr>
+          <p:nvPr/>
+        </p:nvCxnSpPr>
+        <p:spPr>
+          <a:xfrm flipV="1">
+            <a:off x="3020038" y="4350510"/>
+            <a:ext cx="106543" cy="1"/>
+          </a:xfrm>
+          <a:prstGeom prst="line">
+            <a:avLst/>
+          </a:prstGeom>
+        </p:spPr>
+        <p:style>
+          <a:lnRef idx="1">
+            <a:schemeClr val="dk1"/>
+          </a:lnRef>
+          <a:fillRef idx="0">
+            <a:schemeClr val="dk1"/>
+          </a:fillRef>
+          <a:effectRef idx="0">
+            <a:schemeClr val="dk1"/>
+          </a:effectRef>
+          <a:fontRef idx="minor">
+            <a:schemeClr val="tx1"/>
+          </a:fontRef>
+        </p:style>
+      </p:cxnSp>
+      <p:cxnSp>
+        <p:nvCxnSpPr>
+          <p:cNvPr id="51" name="Conector reto 50">
+            <a:extLst>
+              <a:ext uri="{FF2B5EF4-FFF2-40B4-BE49-F238E27FC236}">
+                <a16:creationId xmlns:a16="http://schemas.microsoft.com/office/drawing/2014/main" id="{F9AA3001-0BDE-453D-A690-9F13708628F5}"/>
+              </a:ext>
+            </a:extLst>
+          </p:cNvPr>
+          <p:cNvCxnSpPr>
+            <a:cxnSpLocks/>
+          </p:cNvCxnSpPr>
+          <p:nvPr/>
+        </p:nvCxnSpPr>
+        <p:spPr>
+          <a:xfrm flipV="1">
+            <a:off x="3126581" y="4348151"/>
+            <a:ext cx="0" cy="1482723"/>
+          </a:xfrm>
+          <a:prstGeom prst="line">
+            <a:avLst/>
+          </a:prstGeom>
+        </p:spPr>
+        <p:style>
+          <a:lnRef idx="1">
+            <a:schemeClr val="dk1"/>
+          </a:lnRef>
+          <a:fillRef idx="0">
+            <a:schemeClr val="dk1"/>
+          </a:fillRef>
+          <a:effectRef idx="0">
+            <a:schemeClr val="dk1"/>
+          </a:effectRef>
+          <a:fontRef idx="minor">
+            <a:schemeClr val="tx1"/>
+          </a:fontRef>
+        </p:style>
+      </p:cxnSp>
+      <p:grpSp>
+        <p:nvGrpSpPr>
+          <p:cNvPr id="83" name="Agrupar 82">
+            <a:extLst>
+              <a:ext uri="{FF2B5EF4-FFF2-40B4-BE49-F238E27FC236}">
+                <a16:creationId xmlns:a16="http://schemas.microsoft.com/office/drawing/2014/main" id="{2F232EA5-C841-442B-8CB3-1D30FF7BD26D}"/>
+              </a:ext>
+            </a:extLst>
+          </p:cNvPr>
+          <p:cNvGrpSpPr/>
+          <p:nvPr/>
+        </p:nvGrpSpPr>
+        <p:grpSpPr>
+          <a:xfrm flipH="1">
+            <a:off x="3607776" y="1309674"/>
+            <a:ext cx="808378" cy="4523573"/>
+            <a:chOff x="3655401" y="1319199"/>
+            <a:chExt cx="808378" cy="4523573"/>
+          </a:xfrm>
+        </p:grpSpPr>
+        <p:sp>
+          <p:nvSpPr>
+            <p:cNvPr id="61" name="Retângulo 60">
+              <a:extLst>
+                <a:ext uri="{FF2B5EF4-FFF2-40B4-BE49-F238E27FC236}">
+                  <a16:creationId xmlns:a16="http://schemas.microsoft.com/office/drawing/2014/main" id="{BCE836DA-2354-42D8-A997-1A988DEE23F8}"/>
+                </a:ext>
+              </a:extLst>
+            </p:cNvPr>
+            <p:cNvSpPr/>
+            <p:nvPr/>
+          </p:nvSpPr>
+          <p:spPr>
+            <a:xfrm flipH="1">
+              <a:off x="4338950" y="4256074"/>
+              <a:ext cx="103994" cy="1586649"/>
+            </a:xfrm>
+            <a:prstGeom prst="rect">
+              <a:avLst/>
+            </a:prstGeom>
+            <a:solidFill>
+              <a:schemeClr val="tx1">
+                <a:lumMod val="50000"/>
+                <a:lumOff val="50000"/>
+              </a:schemeClr>
+            </a:solidFill>
+            <a:ln>
+              <a:noFill/>
+            </a:ln>
+          </p:spPr>
+          <p:style>
+            <a:lnRef idx="2">
+              <a:schemeClr val="accent1">
+                <a:shade val="50000"/>
+              </a:schemeClr>
+            </a:lnRef>
+            <a:fillRef idx="1">
+              <a:schemeClr val="accent1"/>
+            </a:fillRef>
+            <a:effectRef idx="0">
+              <a:schemeClr val="accent1"/>
+            </a:effectRef>
+            <a:fontRef idx="minor">
+              <a:schemeClr val="lt1"/>
+            </a:fontRef>
+          </p:style>
+          <p:txBody>
+            <a:bodyPr rtlCol="0" anchor="ctr"/>
+            <a:lstStyle/>
+            <a:p>
+              <a:pPr algn="ctr"/>
+              <a:endParaRPr lang="pt-BR"/>
+            </a:p>
+          </p:txBody>
+        </p:sp>
+        <p:sp>
+          <p:nvSpPr>
+            <p:cNvPr id="62" name="Retângulo 61">
+              <a:extLst>
+                <a:ext uri="{FF2B5EF4-FFF2-40B4-BE49-F238E27FC236}">
+                  <a16:creationId xmlns:a16="http://schemas.microsoft.com/office/drawing/2014/main" id="{0D295F06-1EED-4F5D-8875-8E41E4BADCC9}"/>
+                </a:ext>
+              </a:extLst>
+            </p:cNvPr>
+            <p:cNvSpPr/>
+            <p:nvPr/>
+          </p:nvSpPr>
+          <p:spPr>
+            <a:xfrm flipH="1">
+              <a:off x="4300167" y="3462325"/>
+              <a:ext cx="155794" cy="897681"/>
+            </a:xfrm>
+            <a:prstGeom prst="rect">
+              <a:avLst/>
+            </a:prstGeom>
+            <a:solidFill>
+              <a:schemeClr val="tx1">
+                <a:lumMod val="50000"/>
+                <a:lumOff val="50000"/>
+              </a:schemeClr>
+            </a:solidFill>
+            <a:ln>
+              <a:noFill/>
+            </a:ln>
+          </p:spPr>
+          <p:style>
+            <a:lnRef idx="2">
+              <a:schemeClr val="accent1">
+                <a:shade val="50000"/>
+              </a:schemeClr>
+            </a:lnRef>
+            <a:fillRef idx="1">
+              <a:schemeClr val="accent1"/>
+            </a:fillRef>
+            <a:effectRef idx="0">
+              <a:schemeClr val="accent1"/>
+            </a:effectRef>
+            <a:fontRef idx="minor">
+              <a:schemeClr val="lt1"/>
+            </a:fontRef>
+          </p:style>
+          <p:txBody>
+            <a:bodyPr rtlCol="0" anchor="ctr"/>
+            <a:lstStyle/>
+            <a:p>
+              <a:pPr algn="ctr"/>
+              <a:endParaRPr lang="pt-BR"/>
+            </a:p>
+          </p:txBody>
+        </p:sp>
+        <p:sp>
+          <p:nvSpPr>
+            <p:cNvPr id="63" name="Retângulo 62">
+              <a:extLst>
+                <a:ext uri="{FF2B5EF4-FFF2-40B4-BE49-F238E27FC236}">
+                  <a16:creationId xmlns:a16="http://schemas.microsoft.com/office/drawing/2014/main" id="{6B46F3ED-EC4E-44F9-BAE5-7B7E86316B83}"/>
+                </a:ext>
+              </a:extLst>
+            </p:cNvPr>
+            <p:cNvSpPr/>
+            <p:nvPr/>
+          </p:nvSpPr>
+          <p:spPr>
+            <a:xfrm flipH="1">
+              <a:off x="4134438" y="2567780"/>
+              <a:ext cx="155794" cy="278586"/>
+            </a:xfrm>
+            <a:prstGeom prst="rect">
+              <a:avLst/>
+            </a:prstGeom>
+            <a:solidFill>
+              <a:schemeClr val="tx1">
+                <a:lumMod val="50000"/>
+                <a:lumOff val="50000"/>
+              </a:schemeClr>
+            </a:solidFill>
+            <a:ln>
+              <a:noFill/>
+            </a:ln>
+          </p:spPr>
+          <p:style>
+            <a:lnRef idx="2">
+              <a:schemeClr val="accent1">
+                <a:shade val="50000"/>
+              </a:schemeClr>
+            </a:lnRef>
+            <a:fillRef idx="1">
+              <a:schemeClr val="accent1"/>
+            </a:fillRef>
+            <a:effectRef idx="0">
+              <a:schemeClr val="accent1"/>
+            </a:effectRef>
+            <a:fontRef idx="minor">
+              <a:schemeClr val="lt1"/>
+            </a:fontRef>
+          </p:style>
+          <p:txBody>
+            <a:bodyPr rtlCol="0" anchor="ctr"/>
+            <a:lstStyle/>
+            <a:p>
+              <a:pPr algn="ctr"/>
+              <a:endParaRPr lang="pt-BR"/>
+            </a:p>
+          </p:txBody>
+        </p:sp>
+        <p:sp>
+          <p:nvSpPr>
+            <p:cNvPr id="64" name="Retângulo 63">
+              <a:extLst>
+                <a:ext uri="{FF2B5EF4-FFF2-40B4-BE49-F238E27FC236}">
+                  <a16:creationId xmlns:a16="http://schemas.microsoft.com/office/drawing/2014/main" id="{2D6022B4-A0F4-40CF-A515-5B3AA1C42AE6}"/>
+                </a:ext>
+              </a:extLst>
+            </p:cNvPr>
+            <p:cNvSpPr/>
+            <p:nvPr/>
+          </p:nvSpPr>
+          <p:spPr>
+            <a:xfrm flipH="1">
+              <a:off x="3964476" y="1340626"/>
+              <a:ext cx="155268" cy="1504945"/>
+            </a:xfrm>
+            <a:prstGeom prst="rect">
+              <a:avLst/>
+            </a:prstGeom>
+            <a:solidFill>
+              <a:schemeClr val="tx1">
+                <a:lumMod val="50000"/>
+                <a:lumOff val="50000"/>
+              </a:schemeClr>
+            </a:solidFill>
+            <a:ln>
+              <a:noFill/>
+            </a:ln>
+          </p:spPr>
+          <p:style>
+            <a:lnRef idx="2">
+              <a:schemeClr val="accent1">
+                <a:shade val="50000"/>
+              </a:schemeClr>
+            </a:lnRef>
+            <a:fillRef idx="1">
+              <a:schemeClr val="accent1"/>
+            </a:fillRef>
+            <a:effectRef idx="0">
+              <a:schemeClr val="accent1"/>
+            </a:effectRef>
+            <a:fontRef idx="minor">
+              <a:schemeClr val="lt1"/>
+            </a:fontRef>
+          </p:style>
+          <p:txBody>
+            <a:bodyPr rtlCol="0" anchor="ctr"/>
+            <a:lstStyle/>
+            <a:p>
+              <a:pPr algn="ctr"/>
+              <a:endParaRPr lang="pt-BR"/>
+            </a:p>
+          </p:txBody>
+        </p:sp>
+        <p:sp>
+          <p:nvSpPr>
+            <p:cNvPr id="65" name="Retângulo 64">
+              <a:extLst>
+                <a:ext uri="{FF2B5EF4-FFF2-40B4-BE49-F238E27FC236}">
+                  <a16:creationId xmlns:a16="http://schemas.microsoft.com/office/drawing/2014/main" id="{8A133C1A-4731-4495-B943-B4C3710A7812}"/>
+                </a:ext>
+              </a:extLst>
+            </p:cNvPr>
+            <p:cNvSpPr/>
+            <p:nvPr/>
+          </p:nvSpPr>
+          <p:spPr>
+            <a:xfrm flipH="1">
+              <a:off x="3659684" y="1321579"/>
+              <a:ext cx="304793" cy="171442"/>
+            </a:xfrm>
+            <a:prstGeom prst="rect">
+              <a:avLst/>
+            </a:prstGeom>
+            <a:solidFill>
+              <a:schemeClr val="tx1">
+                <a:lumMod val="50000"/>
+                <a:lumOff val="50000"/>
+              </a:schemeClr>
+            </a:solidFill>
+            <a:ln>
+              <a:noFill/>
+            </a:ln>
+          </p:spPr>
+          <p:style>
+            <a:lnRef idx="2">
+              <a:schemeClr val="accent1">
+                <a:shade val="50000"/>
+              </a:schemeClr>
+            </a:lnRef>
+            <a:fillRef idx="1">
+              <a:schemeClr val="accent1"/>
+            </a:fillRef>
+            <a:effectRef idx="0">
+              <a:schemeClr val="accent1"/>
+            </a:effectRef>
+            <a:fontRef idx="minor">
+              <a:schemeClr val="lt1"/>
+            </a:fontRef>
+          </p:style>
+          <p:txBody>
+            <a:bodyPr rtlCol="0" anchor="ctr"/>
+            <a:lstStyle/>
+            <a:p>
+              <a:pPr algn="ctr"/>
+              <a:endParaRPr lang="pt-BR"/>
+            </a:p>
+          </p:txBody>
+        </p:sp>
+        <p:sp>
+          <p:nvSpPr>
+            <p:cNvPr id="66" name="Retângulo 65">
+              <a:extLst>
+                <a:ext uri="{FF2B5EF4-FFF2-40B4-BE49-F238E27FC236}">
+                  <a16:creationId xmlns:a16="http://schemas.microsoft.com/office/drawing/2014/main" id="{2F7505FA-C0C8-41D6-85B7-20308FC1AF1F}"/>
+                </a:ext>
+              </a:extLst>
+            </p:cNvPr>
+            <p:cNvSpPr/>
+            <p:nvPr/>
+          </p:nvSpPr>
+          <p:spPr>
+            <a:xfrm flipH="1">
+              <a:off x="4230256" y="2564604"/>
+              <a:ext cx="49493" cy="1795445"/>
+            </a:xfrm>
+            <a:prstGeom prst="rect">
+              <a:avLst/>
+            </a:prstGeom>
+            <a:solidFill>
+              <a:schemeClr val="tx1">
+                <a:lumMod val="50000"/>
+                <a:lumOff val="50000"/>
+              </a:schemeClr>
+            </a:solidFill>
+            <a:ln>
+              <a:noFill/>
+            </a:ln>
+          </p:spPr>
+          <p:style>
+            <a:lnRef idx="2">
+              <a:schemeClr val="accent1">
+                <a:shade val="50000"/>
+              </a:schemeClr>
+            </a:lnRef>
+            <a:fillRef idx="1">
+              <a:schemeClr val="accent1"/>
+            </a:fillRef>
+            <a:effectRef idx="0">
+              <a:schemeClr val="accent1"/>
+            </a:effectRef>
+            <a:fontRef idx="minor">
+              <a:schemeClr val="lt1"/>
+            </a:fontRef>
+          </p:style>
+          <p:txBody>
+            <a:bodyPr rtlCol="0" anchor="ctr"/>
+            <a:lstStyle/>
+            <a:p>
+              <a:pPr algn="ctr"/>
+              <a:endParaRPr lang="pt-BR"/>
+            </a:p>
+          </p:txBody>
+        </p:sp>
+        <p:cxnSp>
+          <p:nvCxnSpPr>
+            <p:cNvPr id="67" name="Conector reto 66">
+              <a:extLst>
+                <a:ext uri="{FF2B5EF4-FFF2-40B4-BE49-F238E27FC236}">
+                  <a16:creationId xmlns:a16="http://schemas.microsoft.com/office/drawing/2014/main" id="{CBEB3A0A-1E6A-47D1-AF8D-6A23B5986BC8}"/>
+                </a:ext>
+              </a:extLst>
+            </p:cNvPr>
+            <p:cNvCxnSpPr>
+              <a:cxnSpLocks/>
+            </p:cNvCxnSpPr>
+            <p:nvPr/>
+          </p:nvCxnSpPr>
+          <p:spPr>
+            <a:xfrm flipH="1">
+              <a:off x="4295958" y="1340627"/>
+              <a:ext cx="0" cy="3019425"/>
+            </a:xfrm>
+            <a:prstGeom prst="line">
+              <a:avLst/>
+            </a:prstGeom>
+            <a:ln w="38100">
+              <a:solidFill>
+                <a:srgbClr val="780000"/>
+              </a:solidFill>
+            </a:ln>
+          </p:spPr>
+          <p:style>
+            <a:lnRef idx="1">
+              <a:schemeClr val="accent2"/>
+            </a:lnRef>
+            <a:fillRef idx="0">
+              <a:schemeClr val="accent2"/>
+            </a:fillRef>
+            <a:effectRef idx="0">
+              <a:schemeClr val="accent2"/>
+            </a:effectRef>
+            <a:fontRef idx="minor">
+              <a:schemeClr val="tx1"/>
+            </a:fontRef>
+          </p:style>
+        </p:cxnSp>
+        <p:cxnSp>
+          <p:nvCxnSpPr>
+            <p:cNvPr id="68" name="Conector reto 67">
+              <a:extLst>
+                <a:ext uri="{FF2B5EF4-FFF2-40B4-BE49-F238E27FC236}">
+                  <a16:creationId xmlns:a16="http://schemas.microsoft.com/office/drawing/2014/main" id="{4DBBCF7D-BB5A-4C69-A76D-9C86BD4A01EA}"/>
+                </a:ext>
+              </a:extLst>
+            </p:cNvPr>
+            <p:cNvCxnSpPr>
+              <a:cxnSpLocks/>
+            </p:cNvCxnSpPr>
+            <p:nvPr/>
+          </p:nvCxnSpPr>
+          <p:spPr>
+            <a:xfrm flipH="1">
+              <a:off x="4119745" y="1340627"/>
+              <a:ext cx="0" cy="1504950"/>
+            </a:xfrm>
+            <a:prstGeom prst="line">
+              <a:avLst/>
+            </a:prstGeom>
+            <a:ln w="38100">
+              <a:solidFill>
+                <a:srgbClr val="780000"/>
+              </a:solidFill>
+            </a:ln>
+          </p:spPr>
+          <p:style>
+            <a:lnRef idx="1">
+              <a:schemeClr val="accent2"/>
+            </a:lnRef>
+            <a:fillRef idx="0">
+              <a:schemeClr val="accent2"/>
+            </a:fillRef>
+            <a:effectRef idx="0">
+              <a:schemeClr val="accent2"/>
+            </a:effectRef>
+            <a:fontRef idx="minor">
+              <a:schemeClr val="tx1"/>
+            </a:fontRef>
+          </p:style>
+        </p:cxnSp>
+        <p:cxnSp>
+          <p:nvCxnSpPr>
+            <p:cNvPr id="69" name="Conector reto 68">
+              <a:extLst>
+                <a:ext uri="{FF2B5EF4-FFF2-40B4-BE49-F238E27FC236}">
+                  <a16:creationId xmlns:a16="http://schemas.microsoft.com/office/drawing/2014/main" id="{1301F6D4-5AF5-4DDC-A62C-3F91E19CE701}"/>
+                </a:ext>
+              </a:extLst>
+            </p:cNvPr>
+            <p:cNvCxnSpPr>
+              <a:cxnSpLocks/>
+            </p:cNvCxnSpPr>
+            <p:nvPr/>
+          </p:nvCxnSpPr>
+          <p:spPr>
+            <a:xfrm flipH="1">
+              <a:off x="3833995" y="1340627"/>
+              <a:ext cx="0" cy="152400"/>
+            </a:xfrm>
+            <a:prstGeom prst="line">
+              <a:avLst/>
+            </a:prstGeom>
+            <a:ln w="38100">
+              <a:solidFill>
+                <a:srgbClr val="780000"/>
+              </a:solidFill>
+            </a:ln>
+          </p:spPr>
+          <p:style>
+            <a:lnRef idx="1">
+              <a:schemeClr val="accent2"/>
+            </a:lnRef>
+            <a:fillRef idx="0">
+              <a:schemeClr val="accent2"/>
+            </a:fillRef>
+            <a:effectRef idx="0">
+              <a:schemeClr val="accent2"/>
+            </a:effectRef>
+            <a:fontRef idx="minor">
+              <a:schemeClr val="tx1"/>
+            </a:fontRef>
+          </p:style>
+        </p:cxnSp>
+        <p:sp>
+          <p:nvSpPr>
+            <p:cNvPr id="70" name="Triângulo Retângulo 69">
+              <a:extLst>
+                <a:ext uri="{FF2B5EF4-FFF2-40B4-BE49-F238E27FC236}">
+                  <a16:creationId xmlns:a16="http://schemas.microsoft.com/office/drawing/2014/main" id="{F6661FBC-6710-4B5C-85C3-6EED127551E5}"/>
+                </a:ext>
+              </a:extLst>
+            </p:cNvPr>
+            <p:cNvSpPr/>
+            <p:nvPr/>
+          </p:nvSpPr>
+          <p:spPr>
+            <a:xfrm flipH="1">
+              <a:off x="3762557" y="1414446"/>
+              <a:ext cx="71438" cy="71438"/>
+            </a:xfrm>
+            <a:prstGeom prst="rtTriangle">
+              <a:avLst/>
+            </a:prstGeom>
+            <a:solidFill>
+              <a:srgbClr val="780000"/>
+            </a:solidFill>
+            <a:ln>
+              <a:solidFill>
+                <a:srgbClr val="780000"/>
+              </a:solidFill>
+            </a:ln>
+          </p:spPr>
+          <p:style>
+            <a:lnRef idx="2">
+              <a:schemeClr val="accent1">
+                <a:shade val="50000"/>
+              </a:schemeClr>
+            </a:lnRef>
+            <a:fillRef idx="1">
+              <a:schemeClr val="accent1"/>
+            </a:fillRef>
+            <a:effectRef idx="0">
+              <a:schemeClr val="accent1"/>
+            </a:effectRef>
+            <a:fontRef idx="minor">
+              <a:schemeClr val="lt1"/>
+            </a:fontRef>
+          </p:style>
+          <p:txBody>
+            <a:bodyPr rtlCol="0" anchor="ctr"/>
+            <a:lstStyle/>
+            <a:p>
+              <a:pPr algn="ctr"/>
+              <a:endParaRPr lang="pt-BR"/>
+            </a:p>
+          </p:txBody>
+        </p:sp>
+        <p:sp>
+          <p:nvSpPr>
+            <p:cNvPr id="71" name="Triângulo Retângulo 70">
+              <a:extLst>
+                <a:ext uri="{FF2B5EF4-FFF2-40B4-BE49-F238E27FC236}">
+                  <a16:creationId xmlns:a16="http://schemas.microsoft.com/office/drawing/2014/main" id="{3EA06F17-56FF-4F2C-8EF0-FCD19A0F1580}"/>
+                </a:ext>
+              </a:extLst>
+            </p:cNvPr>
+            <p:cNvSpPr/>
+            <p:nvPr/>
+          </p:nvSpPr>
+          <p:spPr>
+            <a:xfrm flipH="1">
+              <a:off x="4048307" y="2766995"/>
+              <a:ext cx="71438" cy="71438"/>
+            </a:xfrm>
+            <a:prstGeom prst="rtTriangle">
+              <a:avLst/>
+            </a:prstGeom>
+            <a:solidFill>
+              <a:srgbClr val="780000"/>
+            </a:solidFill>
+            <a:ln>
+              <a:solidFill>
+                <a:srgbClr val="780000"/>
+              </a:solidFill>
+            </a:ln>
+          </p:spPr>
+          <p:style>
+            <a:lnRef idx="2">
+              <a:schemeClr val="accent1">
+                <a:shade val="50000"/>
+              </a:schemeClr>
+            </a:lnRef>
+            <a:fillRef idx="1">
+              <a:schemeClr val="accent1"/>
+            </a:fillRef>
+            <a:effectRef idx="0">
+              <a:schemeClr val="accent1"/>
+            </a:effectRef>
+            <a:fontRef idx="minor">
+              <a:schemeClr val="lt1"/>
+            </a:fontRef>
+          </p:style>
+          <p:txBody>
+            <a:bodyPr rtlCol="0" anchor="ctr"/>
+            <a:lstStyle/>
+            <a:p>
+              <a:pPr algn="ctr"/>
+              <a:endParaRPr lang="pt-BR"/>
+            </a:p>
+          </p:txBody>
+        </p:sp>
+        <p:sp>
+          <p:nvSpPr>
+            <p:cNvPr id="72" name="Triângulo Retângulo 71">
+              <a:extLst>
+                <a:ext uri="{FF2B5EF4-FFF2-40B4-BE49-F238E27FC236}">
+                  <a16:creationId xmlns:a16="http://schemas.microsoft.com/office/drawing/2014/main" id="{42186AE5-FC30-475D-AF03-995BCF9F5199}"/>
+                </a:ext>
+              </a:extLst>
+            </p:cNvPr>
+            <p:cNvSpPr/>
+            <p:nvPr/>
+          </p:nvSpPr>
+          <p:spPr>
+            <a:xfrm flipH="1">
+              <a:off x="4235961" y="4281471"/>
+              <a:ext cx="71438" cy="71438"/>
+            </a:xfrm>
+            <a:prstGeom prst="rtTriangle">
+              <a:avLst/>
+            </a:prstGeom>
+            <a:solidFill>
+              <a:srgbClr val="780000"/>
+            </a:solidFill>
+            <a:ln>
+              <a:solidFill>
+                <a:srgbClr val="780000"/>
+              </a:solidFill>
+            </a:ln>
+          </p:spPr>
+          <p:style>
+            <a:lnRef idx="2">
+              <a:schemeClr val="accent1">
+                <a:shade val="50000"/>
+              </a:schemeClr>
+            </a:lnRef>
+            <a:fillRef idx="1">
+              <a:schemeClr val="accent1"/>
+            </a:fillRef>
+            <a:effectRef idx="0">
+              <a:schemeClr val="accent1"/>
+            </a:effectRef>
+            <a:fontRef idx="minor">
+              <a:schemeClr val="lt1"/>
+            </a:fontRef>
+          </p:style>
+          <p:txBody>
+            <a:bodyPr rtlCol="0" anchor="ctr"/>
+            <a:lstStyle/>
+            <a:p>
+              <a:pPr algn="ctr"/>
+              <a:endParaRPr lang="pt-BR"/>
+            </a:p>
+          </p:txBody>
+        </p:sp>
+        <p:cxnSp>
+          <p:nvCxnSpPr>
+            <p:cNvPr id="73" name="Conector reto 72">
+              <a:extLst>
+                <a:ext uri="{FF2B5EF4-FFF2-40B4-BE49-F238E27FC236}">
+                  <a16:creationId xmlns:a16="http://schemas.microsoft.com/office/drawing/2014/main" id="{895ED414-0E57-4855-9A69-78D9328C07CC}"/>
+                </a:ext>
+              </a:extLst>
+            </p:cNvPr>
+            <p:cNvCxnSpPr>
+              <a:cxnSpLocks/>
+            </p:cNvCxnSpPr>
+            <p:nvPr/>
+          </p:nvCxnSpPr>
+          <p:spPr>
+            <a:xfrm flipH="1">
+              <a:off x="3819707" y="1340627"/>
+              <a:ext cx="644072" cy="0"/>
+            </a:xfrm>
+            <a:prstGeom prst="line">
+              <a:avLst/>
+            </a:prstGeom>
+            <a:ln w="38100">
+              <a:solidFill>
+                <a:srgbClr val="780000"/>
+              </a:solidFill>
+            </a:ln>
+          </p:spPr>
+          <p:style>
+            <a:lnRef idx="1">
+              <a:schemeClr val="accent2"/>
+            </a:lnRef>
+            <a:fillRef idx="0">
+              <a:schemeClr val="accent2"/>
+            </a:fillRef>
+            <a:effectRef idx="0">
+              <a:schemeClr val="accent2"/>
+            </a:effectRef>
+            <a:fontRef idx="minor">
+              <a:schemeClr val="tx1"/>
+            </a:fontRef>
+          </p:style>
+        </p:cxnSp>
+        <p:cxnSp>
+          <p:nvCxnSpPr>
+            <p:cNvPr id="74" name="Conector reto 73">
+              <a:extLst>
+                <a:ext uri="{FF2B5EF4-FFF2-40B4-BE49-F238E27FC236}">
+                  <a16:creationId xmlns:a16="http://schemas.microsoft.com/office/drawing/2014/main" id="{8F5E4EF7-15C7-4ABE-95E3-CB502075CD17}"/>
+                </a:ext>
+              </a:extLst>
+            </p:cNvPr>
+            <p:cNvCxnSpPr>
+              <a:cxnSpLocks/>
+            </p:cNvCxnSpPr>
+            <p:nvPr/>
+          </p:nvCxnSpPr>
+          <p:spPr>
+            <a:xfrm flipH="1" flipV="1">
+              <a:off x="4230259" y="2845577"/>
+              <a:ext cx="0" cy="1519233"/>
+            </a:xfrm>
+            <a:prstGeom prst="line">
+              <a:avLst/>
+            </a:prstGeom>
+          </p:spPr>
+          <p:style>
+            <a:lnRef idx="1">
+              <a:schemeClr val="dk1"/>
+            </a:lnRef>
+            <a:fillRef idx="0">
+              <a:schemeClr val="dk1"/>
+            </a:fillRef>
+            <a:effectRef idx="0">
+              <a:schemeClr val="dk1"/>
+            </a:effectRef>
+            <a:fontRef idx="minor">
+              <a:schemeClr val="tx1"/>
+            </a:fontRef>
+          </p:style>
+        </p:cxnSp>
+        <p:cxnSp>
+          <p:nvCxnSpPr>
+            <p:cNvPr id="75" name="Conector reto 74">
+              <a:extLst>
+                <a:ext uri="{FF2B5EF4-FFF2-40B4-BE49-F238E27FC236}">
+                  <a16:creationId xmlns:a16="http://schemas.microsoft.com/office/drawing/2014/main" id="{4B78AFBF-3388-4E32-A385-177CB70D2015}"/>
+                </a:ext>
+              </a:extLst>
+            </p:cNvPr>
+            <p:cNvCxnSpPr>
+              <a:cxnSpLocks/>
+            </p:cNvCxnSpPr>
+            <p:nvPr/>
+          </p:nvCxnSpPr>
+          <p:spPr>
+            <a:xfrm flipH="1" flipV="1">
+              <a:off x="3964476" y="1493022"/>
+              <a:ext cx="0" cy="1352549"/>
+            </a:xfrm>
+            <a:prstGeom prst="line">
+              <a:avLst/>
+            </a:prstGeom>
+          </p:spPr>
+          <p:style>
+            <a:lnRef idx="1">
+              <a:schemeClr val="dk1"/>
+            </a:lnRef>
+            <a:fillRef idx="0">
+              <a:schemeClr val="dk1"/>
+            </a:fillRef>
+            <a:effectRef idx="0">
+              <a:schemeClr val="dk1"/>
+            </a:effectRef>
+            <a:fontRef idx="minor">
+              <a:schemeClr val="tx1"/>
+            </a:fontRef>
+          </p:style>
+        </p:cxnSp>
+        <p:cxnSp>
+          <p:nvCxnSpPr>
+            <p:cNvPr id="76" name="Conector reto 75">
+              <a:extLst>
+                <a:ext uri="{FF2B5EF4-FFF2-40B4-BE49-F238E27FC236}">
+                  <a16:creationId xmlns:a16="http://schemas.microsoft.com/office/drawing/2014/main" id="{F6781D1B-DA46-4A8A-9690-898DAE9BDCC6}"/>
+                </a:ext>
+              </a:extLst>
+            </p:cNvPr>
+            <p:cNvCxnSpPr>
+              <a:cxnSpLocks/>
+            </p:cNvCxnSpPr>
+            <p:nvPr/>
+          </p:nvCxnSpPr>
+          <p:spPr>
+            <a:xfrm flipV="1">
+              <a:off x="3655401" y="1493016"/>
+              <a:ext cx="309074" cy="5"/>
+            </a:xfrm>
+            <a:prstGeom prst="line">
+              <a:avLst/>
+            </a:prstGeom>
+          </p:spPr>
+          <p:style>
+            <a:lnRef idx="1">
+              <a:schemeClr val="dk1"/>
+            </a:lnRef>
+            <a:fillRef idx="0">
+              <a:schemeClr val="dk1"/>
+            </a:fillRef>
+            <a:effectRef idx="0">
+              <a:schemeClr val="dk1"/>
+            </a:effectRef>
+            <a:fontRef idx="minor">
+              <a:schemeClr val="tx1"/>
+            </a:fontRef>
+          </p:style>
+        </p:cxnSp>
+        <p:cxnSp>
+          <p:nvCxnSpPr>
+            <p:cNvPr id="77" name="Conector reto 76">
+              <a:extLst>
+                <a:ext uri="{FF2B5EF4-FFF2-40B4-BE49-F238E27FC236}">
+                  <a16:creationId xmlns:a16="http://schemas.microsoft.com/office/drawing/2014/main" id="{CC64F976-19E0-4099-BF9B-7C1EFB6418BE}"/>
+                </a:ext>
+              </a:extLst>
+            </p:cNvPr>
+            <p:cNvCxnSpPr>
+              <a:cxnSpLocks/>
+            </p:cNvCxnSpPr>
+            <p:nvPr/>
+          </p:nvCxnSpPr>
+          <p:spPr>
+            <a:xfrm flipH="1" flipV="1">
+              <a:off x="3656814" y="1319199"/>
+              <a:ext cx="1" cy="180000"/>
+            </a:xfrm>
+            <a:prstGeom prst="line">
+              <a:avLst/>
+            </a:prstGeom>
+          </p:spPr>
+          <p:style>
+            <a:lnRef idx="1">
+              <a:schemeClr val="dk1"/>
+            </a:lnRef>
+            <a:fillRef idx="0">
+              <a:schemeClr val="dk1"/>
+            </a:fillRef>
+            <a:effectRef idx="0">
+              <a:schemeClr val="dk1"/>
+            </a:effectRef>
+            <a:fontRef idx="minor">
+              <a:schemeClr val="tx1"/>
+            </a:fontRef>
+          </p:style>
+        </p:cxnSp>
+        <p:cxnSp>
+          <p:nvCxnSpPr>
+            <p:cNvPr id="78" name="Conector reto 77">
+              <a:extLst>
+                <a:ext uri="{FF2B5EF4-FFF2-40B4-BE49-F238E27FC236}">
+                  <a16:creationId xmlns:a16="http://schemas.microsoft.com/office/drawing/2014/main" id="{28737AAD-CE78-4DF1-8EB2-44BB79061580}"/>
+                </a:ext>
+              </a:extLst>
+            </p:cNvPr>
+            <p:cNvCxnSpPr>
+              <a:cxnSpLocks/>
+            </p:cNvCxnSpPr>
+            <p:nvPr/>
+          </p:nvCxnSpPr>
+          <p:spPr>
+            <a:xfrm flipV="1">
+              <a:off x="3957844" y="2845569"/>
+              <a:ext cx="273443" cy="1"/>
+            </a:xfrm>
+            <a:prstGeom prst="line">
+              <a:avLst/>
+            </a:prstGeom>
+          </p:spPr>
+          <p:style>
+            <a:lnRef idx="1">
+              <a:schemeClr val="dk1"/>
+            </a:lnRef>
+            <a:fillRef idx="0">
+              <a:schemeClr val="dk1"/>
+            </a:fillRef>
+            <a:effectRef idx="0">
+              <a:schemeClr val="dk1"/>
+            </a:effectRef>
+            <a:fontRef idx="minor">
+              <a:schemeClr val="tx1"/>
+            </a:fontRef>
+          </p:style>
+        </p:cxnSp>
+        <p:cxnSp>
+          <p:nvCxnSpPr>
+            <p:cNvPr id="79" name="Conector reto 78">
+              <a:extLst>
+                <a:ext uri="{FF2B5EF4-FFF2-40B4-BE49-F238E27FC236}">
+                  <a16:creationId xmlns:a16="http://schemas.microsoft.com/office/drawing/2014/main" id="{7074274F-220D-4EA3-BF41-47EBEBB9A7D8}"/>
+                </a:ext>
+              </a:extLst>
+            </p:cNvPr>
+            <p:cNvCxnSpPr>
+              <a:cxnSpLocks/>
+            </p:cNvCxnSpPr>
+            <p:nvPr/>
+          </p:nvCxnSpPr>
+          <p:spPr>
+            <a:xfrm>
+              <a:off x="4448358" y="1340626"/>
+              <a:ext cx="0" cy="4495796"/>
+            </a:xfrm>
+            <a:prstGeom prst="line">
+              <a:avLst/>
+            </a:prstGeom>
+            <a:ln w="38100">
+              <a:solidFill>
+                <a:srgbClr val="780000"/>
+              </a:solidFill>
+            </a:ln>
+          </p:spPr>
+          <p:style>
+            <a:lnRef idx="1">
+              <a:schemeClr val="accent2"/>
+            </a:lnRef>
+            <a:fillRef idx="0">
+              <a:schemeClr val="accent2"/>
+            </a:fillRef>
+            <a:effectRef idx="0">
+              <a:schemeClr val="accent2"/>
+            </a:effectRef>
+            <a:fontRef idx="minor">
+              <a:schemeClr val="tx1"/>
+            </a:fontRef>
+          </p:style>
+        </p:cxnSp>
+        <p:sp>
+          <p:nvSpPr>
+            <p:cNvPr id="80" name="Triângulo Retângulo 79">
+              <a:extLst>
+                <a:ext uri="{FF2B5EF4-FFF2-40B4-BE49-F238E27FC236}">
+                  <a16:creationId xmlns:a16="http://schemas.microsoft.com/office/drawing/2014/main" id="{59AC2AE8-2B90-4D31-8B66-F7564C103F19}"/>
+                </a:ext>
+              </a:extLst>
+            </p:cNvPr>
+            <p:cNvSpPr/>
+            <p:nvPr/>
+          </p:nvSpPr>
+          <p:spPr>
+            <a:xfrm flipH="1">
+              <a:off x="4387579" y="5762607"/>
+              <a:ext cx="71438" cy="71438"/>
+            </a:xfrm>
+            <a:prstGeom prst="rtTriangle">
+              <a:avLst/>
+            </a:prstGeom>
+            <a:solidFill>
+              <a:srgbClr val="780000"/>
+            </a:solidFill>
+            <a:ln>
+              <a:solidFill>
+                <a:srgbClr val="780000"/>
+              </a:solidFill>
+            </a:ln>
+          </p:spPr>
+          <p:style>
+            <a:lnRef idx="2">
+              <a:schemeClr val="accent1">
+                <a:shade val="50000"/>
+              </a:schemeClr>
+            </a:lnRef>
+            <a:fillRef idx="1">
+              <a:schemeClr val="accent1"/>
+            </a:fillRef>
+            <a:effectRef idx="0">
+              <a:schemeClr val="accent1"/>
+            </a:effectRef>
+            <a:fontRef idx="minor">
+              <a:schemeClr val="lt1"/>
+            </a:fontRef>
+          </p:style>
+          <p:txBody>
+            <a:bodyPr rtlCol="0" anchor="ctr"/>
+            <a:lstStyle/>
+            <a:p>
+              <a:pPr algn="ctr"/>
+              <a:endParaRPr lang="pt-BR"/>
+            </a:p>
+          </p:txBody>
+        </p:sp>
+        <p:cxnSp>
+          <p:nvCxnSpPr>
+            <p:cNvPr id="81" name="Conector reto 80">
+              <a:extLst>
+                <a:ext uri="{FF2B5EF4-FFF2-40B4-BE49-F238E27FC236}">
+                  <a16:creationId xmlns:a16="http://schemas.microsoft.com/office/drawing/2014/main" id="{305D6F3E-9EDB-446F-93AD-90D9CB1AF004}"/>
+                </a:ext>
+              </a:extLst>
+            </p:cNvPr>
+            <p:cNvCxnSpPr>
+              <a:cxnSpLocks/>
+            </p:cNvCxnSpPr>
+            <p:nvPr/>
+          </p:nvCxnSpPr>
+          <p:spPr>
+            <a:xfrm flipV="1">
+              <a:off x="4230256" y="4362408"/>
+              <a:ext cx="106543" cy="1"/>
+            </a:xfrm>
+            <a:prstGeom prst="line">
+              <a:avLst/>
+            </a:prstGeom>
+          </p:spPr>
+          <p:style>
+            <a:lnRef idx="1">
+              <a:schemeClr val="dk1"/>
+            </a:lnRef>
+            <a:fillRef idx="0">
+              <a:schemeClr val="dk1"/>
+            </a:fillRef>
+            <a:effectRef idx="0">
+              <a:schemeClr val="dk1"/>
+            </a:effectRef>
+            <a:fontRef idx="minor">
+              <a:schemeClr val="tx1"/>
+            </a:fontRef>
+          </p:style>
+        </p:cxnSp>
+        <p:cxnSp>
+          <p:nvCxnSpPr>
+            <p:cNvPr id="82" name="Conector reto 81">
+              <a:extLst>
+                <a:ext uri="{FF2B5EF4-FFF2-40B4-BE49-F238E27FC236}">
+                  <a16:creationId xmlns:a16="http://schemas.microsoft.com/office/drawing/2014/main" id="{450826E4-39AB-4389-A264-65010422D94B}"/>
+                </a:ext>
+              </a:extLst>
+            </p:cNvPr>
+            <p:cNvCxnSpPr>
+              <a:cxnSpLocks/>
+            </p:cNvCxnSpPr>
+            <p:nvPr/>
+          </p:nvCxnSpPr>
+          <p:spPr>
+            <a:xfrm flipV="1">
+              <a:off x="4336799" y="4360049"/>
+              <a:ext cx="0" cy="1482723"/>
+            </a:xfrm>
+            <a:prstGeom prst="line">
+              <a:avLst/>
+            </a:prstGeom>
+          </p:spPr>
+          <p:style>
+            <a:lnRef idx="1">
+              <a:schemeClr val="dk1"/>
+            </a:lnRef>
+            <a:fillRef idx="0">
+              <a:schemeClr val="dk1"/>
+            </a:fillRef>
+            <a:effectRef idx="0">
+              <a:schemeClr val="dk1"/>
+            </a:effectRef>
+            <a:fontRef idx="minor">
+              <a:schemeClr val="tx1"/>
+            </a:fontRef>
+          </p:style>
+        </p:cxnSp>
+      </p:grpSp>
+      <p:cxnSp>
+        <p:nvCxnSpPr>
+          <p:cNvPr id="40" name="Conector reto 39">
+            <a:extLst>
+              <a:ext uri="{FF2B5EF4-FFF2-40B4-BE49-F238E27FC236}">
+                <a16:creationId xmlns:a16="http://schemas.microsoft.com/office/drawing/2014/main" id="{E8CA3320-15D3-4EF9-8B63-B215DDE999C2}"/>
+              </a:ext>
+            </a:extLst>
+          </p:cNvPr>
+          <p:cNvCxnSpPr>
+            <a:cxnSpLocks/>
+          </p:cNvCxnSpPr>
+          <p:nvPr/>
+        </p:nvCxnSpPr>
+        <p:spPr>
+          <a:xfrm>
+            <a:off x="3126581" y="5830874"/>
+            <a:ext cx="606024" cy="0"/>
+          </a:xfrm>
+          <a:prstGeom prst="line">
+            <a:avLst/>
+          </a:prstGeom>
+        </p:spPr>
+        <p:style>
+          <a:lnRef idx="1">
+            <a:schemeClr val="dk1"/>
+          </a:lnRef>
+          <a:fillRef idx="0">
+            <a:schemeClr val="dk1"/>
+          </a:fillRef>
+          <a:effectRef idx="0">
+            <a:schemeClr val="dk1"/>
+          </a:effectRef>
+          <a:fontRef idx="minor">
+            <a:schemeClr val="tx1"/>
+          </a:fontRef>
+        </p:style>
+      </p:cxnSp>
+      <p:sp>
+        <p:nvSpPr>
+          <p:cNvPr id="85" name="CaixaDeTexto 84">
+            <a:extLst>
+              <a:ext uri="{FF2B5EF4-FFF2-40B4-BE49-F238E27FC236}">
+                <a16:creationId xmlns:a16="http://schemas.microsoft.com/office/drawing/2014/main" id="{4BE99D89-BDC6-4FDB-A8B2-49EA12FFC693}"/>
+              </a:ext>
+            </a:extLst>
+          </p:cNvPr>
+          <p:cNvSpPr txBox="1"/>
+          <p:nvPr/>
+        </p:nvSpPr>
+        <p:spPr>
+          <a:xfrm>
+            <a:off x="3824980" y="4756430"/>
+            <a:ext cx="2836033" cy="646331"/>
+          </a:xfrm>
+          <a:prstGeom prst="rect">
+            <a:avLst/>
+          </a:prstGeom>
+          <a:noFill/>
+        </p:spPr>
+        <p:txBody>
+          <a:bodyPr wrap="none" rtlCol="0">
+            <a:spAutoFit/>
+          </a:bodyPr>
+          <a:lstStyle/>
+          <a:p>
+            <a:r>
+              <a:rPr lang="pt-BR" dirty="0"/>
+              <a:t>3400,00 m 5” – C75, 18 </a:t>
+            </a:r>
+            <a:r>
+              <a:rPr lang="pt-BR" dirty="0" err="1"/>
+              <a:t>lb</a:t>
+            </a:r>
+            <a:r>
+              <a:rPr lang="pt-BR" dirty="0"/>
+              <a:t>/</a:t>
+            </a:r>
+            <a:r>
+              <a:rPr lang="pt-BR" dirty="0" err="1"/>
+              <a:t>ft</a:t>
+            </a:r>
+            <a:br>
+              <a:rPr lang="pt-BR" dirty="0"/>
+            </a:br>
+            <a:r>
+              <a:rPr lang="pt-BR" dirty="0"/>
+              <a:t>Revestimento de Produção</a:t>
+            </a:r>
+          </a:p>
+        </p:txBody>
+      </p:sp>
+      <p:sp>
+        <p:nvSpPr>
+          <p:cNvPr id="86" name="CaixaDeTexto 85">
+            <a:extLst>
+              <a:ext uri="{FF2B5EF4-FFF2-40B4-BE49-F238E27FC236}">
+                <a16:creationId xmlns:a16="http://schemas.microsoft.com/office/drawing/2014/main" id="{7B8CA8CB-7E1A-4E9A-BB39-3B51CFD67C16}"/>
+              </a:ext>
+            </a:extLst>
+          </p:cNvPr>
+          <p:cNvSpPr txBox="1"/>
+          <p:nvPr/>
+        </p:nvSpPr>
+        <p:spPr>
+          <a:xfrm>
+            <a:off x="1421823" y="3260995"/>
+            <a:ext cx="1616020" cy="369332"/>
+          </a:xfrm>
+          <a:prstGeom prst="rect">
+            <a:avLst/>
+          </a:prstGeom>
+          <a:noFill/>
+        </p:spPr>
+        <p:txBody>
+          <a:bodyPr wrap="none" rtlCol="0">
+            <a:spAutoFit/>
+          </a:bodyPr>
+          <a:lstStyle/>
+          <a:p>
+            <a:r>
+              <a:rPr lang="pt-BR" dirty="0"/>
+              <a:t>TOC 1700,00 m</a:t>
+            </a:r>
+          </a:p>
+        </p:txBody>
+      </p:sp>
+    </p:spTree>
+    <p:extLst>
+      <p:ext uri="{BB962C8B-B14F-4D97-AF65-F5344CB8AC3E}">
+        <p14:creationId xmlns:p14="http://schemas.microsoft.com/office/powerpoint/2010/main" val="122677663"/>
+      </p:ext>
+    </p:extLst>
+  </p:cSld>
+  <p:clrMapOvr>
+    <a:masterClrMapping/>
+  </p:clrMapOvr>
+</p:sld>
+</file>
+
 <file path=ppt/theme/theme1.xml><?xml version="1.0" encoding="utf-8"?>
 <a:theme xmlns:a="http://schemas.openxmlformats.org/drawingml/2006/main" name="Tema do Office">
   <a:themeElements>
@@ -5653,21 +8087,6 @@
 </file>
 
 <file path=customXml/item1.xml><?xml version="1.0" encoding="utf-8"?>
-<p:properties xmlns:p="http://schemas.microsoft.com/office/2006/metadata/properties" xmlns:xsi="http://www.w3.org/2001/XMLSchema-instance" xmlns:pc="http://schemas.microsoft.com/office/infopath/2007/PartnerControls">
-  <documentManagement/>
-</p:properties>
-</file>
-
-<file path=customXml/item2.xml><?xml version="1.0" encoding="utf-8"?>
-<?mso-contentType ?>
-<FormTemplates xmlns="http://schemas.microsoft.com/sharepoint/v3/contenttype/forms">
-  <Display>DocumentLibraryForm</Display>
-  <Edit>DocumentLibraryForm</Edit>
-  <New>DocumentLibraryForm</New>
-</FormTemplates>
-</file>
-
-<file path=customXml/item3.xml><?xml version="1.0" encoding="utf-8"?>
 <ct:contentTypeSchema xmlns:ct="http://schemas.microsoft.com/office/2006/metadata/contentType" xmlns:ma="http://schemas.microsoft.com/office/2006/metadata/properties/metaAttributes" ct:_="" ma:_="" ma:contentTypeName="Documento" ma:contentTypeID="0x010100081710BB376E7941914DCE66FEA91E1F" ma:contentTypeVersion="10" ma:contentTypeDescription="Crie um novo documento." ma:contentTypeScope="" ma:versionID="58913e177e8a955f1d199717620b7ded">
   <xsd:schema xmlns:xsd="http://www.w3.org/2001/XMLSchema" xmlns:xs="http://www.w3.org/2001/XMLSchema" xmlns:p="http://schemas.microsoft.com/office/2006/metadata/properties" xmlns:ns3="f62671e9-89eb-4f99-a5f6-db3359988c00" xmlns:ns4="4134815b-eabf-46ac-844d-9b0690bd8711" targetNamespace="http://schemas.microsoft.com/office/2006/metadata/properties" ma:root="true" ma:fieldsID="8959957db32c8c64e0ce54d1c5e443a9" ns3:_="" ns4:_="">
     <xsd:import namespace="f62671e9-89eb-4f99-a5f6-db3359988c00"/>
@@ -5870,32 +8289,22 @@
 </ct:contentTypeSchema>
 </file>
 
-<file path=customXml/itemProps1.xml><?xml version="1.0" encoding="utf-8"?>
-<ds:datastoreItem xmlns:ds="http://schemas.openxmlformats.org/officeDocument/2006/customXml" ds:itemID="{EF9B0293-AE68-4754-86B7-17138D7CE134}">
-  <ds:schemaRefs>
-    <ds:schemaRef ds:uri="http://schemas.openxmlformats.org/package/2006/metadata/core-properties"/>
-    <ds:schemaRef ds:uri="http://purl.org/dc/elements/1.1/"/>
-    <ds:schemaRef ds:uri="http://schemas.microsoft.com/office/2006/metadata/properties"/>
-    <ds:schemaRef ds:uri="http://schemas.microsoft.com/office/2006/documentManagement/types"/>
-    <ds:schemaRef ds:uri="f62671e9-89eb-4f99-a5f6-db3359988c00"/>
-    <ds:schemaRef ds:uri="http://www.w3.org/XML/1998/namespace"/>
-    <ds:schemaRef ds:uri="http://purl.org/dc/terms/"/>
-    <ds:schemaRef ds:uri="http://schemas.microsoft.com/office/infopath/2007/PartnerControls"/>
-    <ds:schemaRef ds:uri="4134815b-eabf-46ac-844d-9b0690bd8711"/>
-    <ds:schemaRef ds:uri="http://purl.org/dc/dcmitype/"/>
-  </ds:schemaRefs>
-</ds:datastoreItem>
+<file path=customXml/item2.xml><?xml version="1.0" encoding="utf-8"?>
+<?mso-contentType ?>
+<FormTemplates xmlns="http://schemas.microsoft.com/sharepoint/v3/contenttype/forms">
+  <Display>DocumentLibraryForm</Display>
+  <Edit>DocumentLibraryForm</Edit>
+  <New>DocumentLibraryForm</New>
+</FormTemplates>
 </file>
 
-<file path=customXml/itemProps2.xml><?xml version="1.0" encoding="utf-8"?>
-<ds:datastoreItem xmlns:ds="http://schemas.openxmlformats.org/officeDocument/2006/customXml" ds:itemID="{8B91528D-EFA8-4E4A-B420-BD2A0D21BF73}">
-  <ds:schemaRefs>
-    <ds:schemaRef ds:uri="http://schemas.microsoft.com/sharepoint/v3/contenttype/forms"/>
-  </ds:schemaRefs>
-</ds:datastoreItem>
+<file path=customXml/item3.xml><?xml version="1.0" encoding="utf-8"?>
+<p:properties xmlns:p="http://schemas.microsoft.com/office/2006/metadata/properties" xmlns:xsi="http://www.w3.org/2001/XMLSchema-instance" xmlns:pc="http://schemas.microsoft.com/office/infopath/2007/PartnerControls">
+  <documentManagement/>
+</p:properties>
 </file>
 
-<file path=customXml/itemProps3.xml><?xml version="1.0" encoding="utf-8"?>
+<file path=customXml/itemProps1.xml><?xml version="1.0" encoding="utf-8"?>
 <ds:datastoreItem xmlns:ds="http://schemas.openxmlformats.org/officeDocument/2006/customXml" ds:itemID="{8C35DC09-B6BC-4815-8006-072362A6FB71}">
   <ds:schemaRefs>
     <ds:schemaRef ds:uri="http://schemas.microsoft.com/office/2006/metadata/contentType"/>
@@ -5912,4 +8321,29 @@
     <ds:schemaRef ds:uri="http://schemas.microsoft.com/internal/obd"/>
   </ds:schemaRefs>
 </ds:datastoreItem>
+</file>
+
+<file path=customXml/itemProps2.xml><?xml version="1.0" encoding="utf-8"?>
+<ds:datastoreItem xmlns:ds="http://schemas.openxmlformats.org/officeDocument/2006/customXml" ds:itemID="{8B91528D-EFA8-4E4A-B420-BD2A0D21BF73}">
+  <ds:schemaRefs>
+    <ds:schemaRef ds:uri="http://schemas.microsoft.com/sharepoint/v3/contenttype/forms"/>
+  </ds:schemaRefs>
+</ds:datastoreItem>
+</file>
+
+<file path=customXml/itemProps3.xml><?xml version="1.0" encoding="utf-8"?>
+<ds:datastoreItem xmlns:ds="http://schemas.openxmlformats.org/officeDocument/2006/customXml" ds:itemID="{EF9B0293-AE68-4754-86B7-17138D7CE134}">
+  <ds:schemaRefs>
+    <ds:schemaRef ds:uri="http://schemas.openxmlformats.org/package/2006/metadata/core-properties"/>
+    <ds:schemaRef ds:uri="http://purl.org/dc/elements/1.1/"/>
+    <ds:schemaRef ds:uri="http://schemas.microsoft.com/office/2006/metadata/properties"/>
+    <ds:schemaRef ds:uri="http://schemas.microsoft.com/office/2006/documentManagement/types"/>
+    <ds:schemaRef ds:uri="f62671e9-89eb-4f99-a5f6-db3359988c00"/>
+    <ds:schemaRef ds:uri="http://www.w3.org/XML/1998/namespace"/>
+    <ds:schemaRef ds:uri="http://purl.org/dc/terms/"/>
+    <ds:schemaRef ds:uri="http://schemas.microsoft.com/office/infopath/2007/PartnerControls"/>
+    <ds:schemaRef ds:uri="4134815b-eabf-46ac-844d-9b0690bd8711"/>
+    <ds:schemaRef ds:uri="http://purl.org/dc/dcmitype/"/>
+  </ds:schemaRefs>
+</ds:datastoreItem>
 </file>
</xml_diff>